<commit_message>
Adds 4th graph and updates PPT
</commit_message>
<xml_diff>
--- a/gOGOGAGA.pptx
+++ b/gOGOGAGA.pptx
@@ -5,17 +5,18 @@
     <p:sldMasterId id="2147483673" r:id="rId4"/>
   </p:sldMasterIdLst>
   <p:notesMasterIdLst>
-    <p:notesMasterId r:id="rId13"/>
+    <p:notesMasterId r:id="rId14"/>
   </p:notesMasterIdLst>
   <p:sldIdLst>
     <p:sldId id="257" r:id="rId5"/>
     <p:sldId id="262" r:id="rId6"/>
     <p:sldId id="261" r:id="rId7"/>
-    <p:sldId id="268" r:id="rId8"/>
-    <p:sldId id="264" r:id="rId9"/>
-    <p:sldId id="265" r:id="rId10"/>
-    <p:sldId id="267" r:id="rId11"/>
-    <p:sldId id="266" r:id="rId12"/>
+    <p:sldId id="270" r:id="rId8"/>
+    <p:sldId id="271" r:id="rId9"/>
+    <p:sldId id="272" r:id="rId10"/>
+    <p:sldId id="265" r:id="rId11"/>
+    <p:sldId id="267" r:id="rId12"/>
+    <p:sldId id="266" r:id="rId13"/>
   </p:sldIdLst>
   <p:sldSz cx="12192000" cy="6858000"/>
   <p:notesSz cx="6858000" cy="9144000"/>
@@ -130,460 +131,6 @@
 </p1510:revInfo>
 </file>
 
-<file path=ppt/changesInfos/changesInfo1.xml><?xml version="1.0" encoding="utf-8"?>
-<pc:chgInfo xmlns:a="http://schemas.openxmlformats.org/drawingml/2006/main" xmlns:r="http://schemas.openxmlformats.org/officeDocument/2006/relationships" xmlns:ac="http://schemas.microsoft.com/office/drawing/2013/main/command" xmlns:pc="http://schemas.microsoft.com/office/powerpoint/2013/main/command">
-  <pc:docChgLst>
-    <pc:chgData name="Jennifer Lamoureux" userId="df8978671778c259" providerId="LiveId" clId="{4CA6EE96-F28A-424A-9353-249280B29811}"/>
-    <pc:docChg chg="undo redo custSel mod addSld delSld modSld sldOrd">
-      <pc:chgData name="Jennifer Lamoureux" userId="df8978671778c259" providerId="LiveId" clId="{4CA6EE96-F28A-424A-9353-249280B29811}" dt="2021-01-20T01:51:44.945" v="2062" actId="20577"/>
-      <pc:docMkLst>
-        <pc:docMk/>
-      </pc:docMkLst>
-      <pc:sldChg chg="modSp mod">
-        <pc:chgData name="Jennifer Lamoureux" userId="df8978671778c259" providerId="LiveId" clId="{4CA6EE96-F28A-424A-9353-249280B29811}" dt="2021-01-20T01:23:58.330" v="947" actId="27636"/>
-        <pc:sldMkLst>
-          <pc:docMk/>
-          <pc:sldMk cId="2584280759" sldId="257"/>
-        </pc:sldMkLst>
-        <pc:spChg chg="mod">
-          <ac:chgData name="Jennifer Lamoureux" userId="df8978671778c259" providerId="LiveId" clId="{4CA6EE96-F28A-424A-9353-249280B29811}" dt="2021-01-20T01:23:58.330" v="947" actId="27636"/>
-          <ac:spMkLst>
-            <pc:docMk/>
-            <pc:sldMk cId="2584280759" sldId="257"/>
-            <ac:spMk id="2" creationId="{18C3B467-088C-4F3D-A9A7-105C4E1E20CD}"/>
-          </ac:spMkLst>
-        </pc:spChg>
-      </pc:sldChg>
-      <pc:sldChg chg="modSp">
-        <pc:chgData name="Jennifer Lamoureux" userId="df8978671778c259" providerId="LiveId" clId="{4CA6EE96-F28A-424A-9353-249280B29811}" dt="2021-01-20T01:08:35.456" v="122" actId="20577"/>
-        <pc:sldMkLst>
-          <pc:docMk/>
-          <pc:sldMk cId="183243182" sldId="261"/>
-        </pc:sldMkLst>
-        <pc:graphicFrameChg chg="mod">
-          <ac:chgData name="Jennifer Lamoureux" userId="df8978671778c259" providerId="LiveId" clId="{4CA6EE96-F28A-424A-9353-249280B29811}" dt="2021-01-20T01:08:35.456" v="122" actId="20577"/>
-          <ac:graphicFrameMkLst>
-            <pc:docMk/>
-            <pc:sldMk cId="183243182" sldId="261"/>
-            <ac:graphicFrameMk id="5" creationId="{91DB1382-7276-49FA-9632-38D558F457E3}"/>
-          </ac:graphicFrameMkLst>
-        </pc:graphicFrameChg>
-      </pc:sldChg>
-      <pc:sldChg chg="addSp delSp modSp del mod modClrScheme chgLayout">
-        <pc:chgData name="Jennifer Lamoureux" userId="df8978671778c259" providerId="LiveId" clId="{4CA6EE96-F28A-424A-9353-249280B29811}" dt="2021-01-20T01:35:11.963" v="1333" actId="2696"/>
-        <pc:sldMkLst>
-          <pc:docMk/>
-          <pc:sldMk cId="3141047123" sldId="263"/>
-        </pc:sldMkLst>
-        <pc:spChg chg="mod">
-          <ac:chgData name="Jennifer Lamoureux" userId="df8978671778c259" providerId="LiveId" clId="{4CA6EE96-F28A-424A-9353-249280B29811}" dt="2021-01-20T01:34:29.369" v="1300" actId="26606"/>
-          <ac:spMkLst>
-            <pc:docMk/>
-            <pc:sldMk cId="3141047123" sldId="263"/>
-            <ac:spMk id="2" creationId="{3C9A4B96-B8E5-4B43-AE48-290C1948FE7C}"/>
-          </ac:spMkLst>
-        </pc:spChg>
-        <pc:spChg chg="mod">
-          <ac:chgData name="Jennifer Lamoureux" userId="df8978671778c259" providerId="LiveId" clId="{4CA6EE96-F28A-424A-9353-249280B29811}" dt="2021-01-20T01:35:05.650" v="1331" actId="21"/>
-          <ac:spMkLst>
-            <pc:docMk/>
-            <pc:sldMk cId="3141047123" sldId="263"/>
-            <ac:spMk id="3" creationId="{E5CAED68-9FA0-4081-A23F-AD55A8F35D17}"/>
-          </ac:spMkLst>
-        </pc:spChg>
-        <pc:spChg chg="add del mod">
-          <ac:chgData name="Jennifer Lamoureux" userId="df8978671778c259" providerId="LiveId" clId="{4CA6EE96-F28A-424A-9353-249280B29811}" dt="2021-01-20T01:33:19.594" v="1260" actId="21"/>
-          <ac:spMkLst>
-            <pc:docMk/>
-            <pc:sldMk cId="3141047123" sldId="263"/>
-            <ac:spMk id="4" creationId="{066C8A80-3D6D-4EA4-BA32-67C749F893C6}"/>
-          </ac:spMkLst>
-        </pc:spChg>
-        <pc:spChg chg="add del mod">
-          <ac:chgData name="Jennifer Lamoureux" userId="df8978671778c259" providerId="LiveId" clId="{4CA6EE96-F28A-424A-9353-249280B29811}" dt="2021-01-20T01:33:34.008" v="1267" actId="478"/>
-          <ac:spMkLst>
-            <pc:docMk/>
-            <pc:sldMk cId="3141047123" sldId="263"/>
-            <ac:spMk id="5" creationId="{4C50E843-7C50-4738-9B09-95A53BC1B079}"/>
-          </ac:spMkLst>
-        </pc:spChg>
-        <pc:spChg chg="add del mod">
-          <ac:chgData name="Jennifer Lamoureux" userId="df8978671778c259" providerId="LiveId" clId="{4CA6EE96-F28A-424A-9353-249280B29811}" dt="2021-01-20T01:34:07.577" v="1285" actId="26606"/>
-          <ac:spMkLst>
-            <pc:docMk/>
-            <pc:sldMk cId="3141047123" sldId="263"/>
-            <ac:spMk id="8" creationId="{CB06E3B7-A750-4BDD-8C3A-E0B9814CA7AF}"/>
-          </ac:spMkLst>
-        </pc:spChg>
-        <pc:spChg chg="add del mod">
-          <ac:chgData name="Jennifer Lamoureux" userId="df8978671778c259" providerId="LiveId" clId="{4CA6EE96-F28A-424A-9353-249280B29811}" dt="2021-01-20T01:34:07.577" v="1285" actId="26606"/>
-          <ac:spMkLst>
-            <pc:docMk/>
-            <pc:sldMk cId="3141047123" sldId="263"/>
-            <ac:spMk id="10" creationId="{04E4D641-8423-4AD7-83E5-9D765BB5DB6F}"/>
-          </ac:spMkLst>
-        </pc:spChg>
-        <pc:spChg chg="add del mod">
-          <ac:chgData name="Jennifer Lamoureux" userId="df8978671778c259" providerId="LiveId" clId="{4CA6EE96-F28A-424A-9353-249280B29811}" dt="2021-01-20T01:34:07.577" v="1285" actId="26606"/>
-          <ac:spMkLst>
-            <pc:docMk/>
-            <pc:sldMk cId="3141047123" sldId="263"/>
-            <ac:spMk id="12" creationId="{2F0E4A57-0F84-4AD8-8049-BD690F9CAAB7}"/>
-          </ac:spMkLst>
-        </pc:spChg>
-        <pc:spChg chg="add del mod">
-          <ac:chgData name="Jennifer Lamoureux" userId="df8978671778c259" providerId="LiveId" clId="{4CA6EE96-F28A-424A-9353-249280B29811}" dt="2021-01-20T01:34:09.855" v="1287" actId="26606"/>
-          <ac:spMkLst>
-            <pc:docMk/>
-            <pc:sldMk cId="3141047123" sldId="263"/>
-            <ac:spMk id="14" creationId="{8F59EAEB-9717-46AC-B77A-2517C8C5DDB1}"/>
-          </ac:spMkLst>
-        </pc:spChg>
-        <pc:spChg chg="add del mod">
-          <ac:chgData name="Jennifer Lamoureux" userId="df8978671778c259" providerId="LiveId" clId="{4CA6EE96-F28A-424A-9353-249280B29811}" dt="2021-01-20T01:34:17.834" v="1289" actId="26606"/>
-          <ac:spMkLst>
-            <pc:docMk/>
-            <pc:sldMk cId="3141047123" sldId="263"/>
-            <ac:spMk id="16" creationId="{7D354348-D16E-4865-9B48-41379004AB80}"/>
-          </ac:spMkLst>
-        </pc:spChg>
-        <pc:spChg chg="add del mod">
-          <ac:chgData name="Jennifer Lamoureux" userId="df8978671778c259" providerId="LiveId" clId="{4CA6EE96-F28A-424A-9353-249280B29811}" dt="2021-01-20T01:34:19.133" v="1291" actId="26606"/>
-          <ac:spMkLst>
-            <pc:docMk/>
-            <pc:sldMk cId="3141047123" sldId="263"/>
-            <ac:spMk id="18" creationId="{8F59EAEB-9717-46AC-B77A-2517C8C5DDB1}"/>
-          </ac:spMkLst>
-        </pc:spChg>
-        <pc:spChg chg="add del mod">
-          <ac:chgData name="Jennifer Lamoureux" userId="df8978671778c259" providerId="LiveId" clId="{4CA6EE96-F28A-424A-9353-249280B29811}" dt="2021-01-20T01:34:20.663" v="1293" actId="26606"/>
-          <ac:spMkLst>
-            <pc:docMk/>
-            <pc:sldMk cId="3141047123" sldId="263"/>
-            <ac:spMk id="20" creationId="{CB06E3B7-A750-4BDD-8C3A-E0B9814CA7AF}"/>
-          </ac:spMkLst>
-        </pc:spChg>
-        <pc:spChg chg="add del mod">
-          <ac:chgData name="Jennifer Lamoureux" userId="df8978671778c259" providerId="LiveId" clId="{4CA6EE96-F28A-424A-9353-249280B29811}" dt="2021-01-20T01:34:20.663" v="1293" actId="26606"/>
-          <ac:spMkLst>
-            <pc:docMk/>
-            <pc:sldMk cId="3141047123" sldId="263"/>
-            <ac:spMk id="21" creationId="{04E4D641-8423-4AD7-83E5-9D765BB5DB6F}"/>
-          </ac:spMkLst>
-        </pc:spChg>
-        <pc:spChg chg="add del mod">
-          <ac:chgData name="Jennifer Lamoureux" userId="df8978671778c259" providerId="LiveId" clId="{4CA6EE96-F28A-424A-9353-249280B29811}" dt="2021-01-20T01:34:20.663" v="1293" actId="26606"/>
-          <ac:spMkLst>
-            <pc:docMk/>
-            <pc:sldMk cId="3141047123" sldId="263"/>
-            <ac:spMk id="22" creationId="{2F0E4A57-0F84-4AD8-8049-BD690F9CAAB7}"/>
-          </ac:spMkLst>
-        </pc:spChg>
-        <pc:spChg chg="add del mod">
-          <ac:chgData name="Jennifer Lamoureux" userId="df8978671778c259" providerId="LiveId" clId="{4CA6EE96-F28A-424A-9353-249280B29811}" dt="2021-01-20T01:34:21.115" v="1295" actId="26606"/>
-          <ac:spMkLst>
-            <pc:docMk/>
-            <pc:sldMk cId="3141047123" sldId="263"/>
-            <ac:spMk id="24" creationId="{8F59EAEB-9717-46AC-B77A-2517C8C5DDB1}"/>
-          </ac:spMkLst>
-        </pc:spChg>
-        <pc:spChg chg="add del mod">
-          <ac:chgData name="Jennifer Lamoureux" userId="df8978671778c259" providerId="LiveId" clId="{4CA6EE96-F28A-424A-9353-249280B29811}" dt="2021-01-20T01:34:28.506" v="1297" actId="26606"/>
-          <ac:spMkLst>
-            <pc:docMk/>
-            <pc:sldMk cId="3141047123" sldId="263"/>
-            <ac:spMk id="26" creationId="{7D354348-D16E-4865-9B48-41379004AB80}"/>
-          </ac:spMkLst>
-        </pc:spChg>
-        <pc:spChg chg="add del mod">
-          <ac:chgData name="Jennifer Lamoureux" userId="df8978671778c259" providerId="LiveId" clId="{4CA6EE96-F28A-424A-9353-249280B29811}" dt="2021-01-20T01:34:29.355" v="1299" actId="26606"/>
-          <ac:spMkLst>
-            <pc:docMk/>
-            <pc:sldMk cId="3141047123" sldId="263"/>
-            <ac:spMk id="28" creationId="{8F59EAEB-9717-46AC-B77A-2517C8C5DDB1}"/>
-          </ac:spMkLst>
-        </pc:spChg>
-        <pc:spChg chg="add mod">
-          <ac:chgData name="Jennifer Lamoureux" userId="df8978671778c259" providerId="LiveId" clId="{4CA6EE96-F28A-424A-9353-249280B29811}" dt="2021-01-20T01:34:29.369" v="1300" actId="26606"/>
-          <ac:spMkLst>
-            <pc:docMk/>
-            <pc:sldMk cId="3141047123" sldId="263"/>
-            <ac:spMk id="30" creationId="{CB06E3B7-A750-4BDD-8C3A-E0B9814CA7AF}"/>
-          </ac:spMkLst>
-        </pc:spChg>
-        <pc:spChg chg="add mod">
-          <ac:chgData name="Jennifer Lamoureux" userId="df8978671778c259" providerId="LiveId" clId="{4CA6EE96-F28A-424A-9353-249280B29811}" dt="2021-01-20T01:34:29.369" v="1300" actId="26606"/>
-          <ac:spMkLst>
-            <pc:docMk/>
-            <pc:sldMk cId="3141047123" sldId="263"/>
-            <ac:spMk id="31" creationId="{04E4D641-8423-4AD7-83E5-9D765BB5DB6F}"/>
-          </ac:spMkLst>
-        </pc:spChg>
-        <pc:spChg chg="add mod">
-          <ac:chgData name="Jennifer Lamoureux" userId="df8978671778c259" providerId="LiveId" clId="{4CA6EE96-F28A-424A-9353-249280B29811}" dt="2021-01-20T01:34:29.369" v="1300" actId="26606"/>
-          <ac:spMkLst>
-            <pc:docMk/>
-            <pc:sldMk cId="3141047123" sldId="263"/>
-            <ac:spMk id="32" creationId="{2F0E4A57-0F84-4AD8-8049-BD690F9CAAB7}"/>
-          </ac:spMkLst>
-        </pc:spChg>
-      </pc:sldChg>
-      <pc:sldChg chg="addSp modSp mod">
-        <pc:chgData name="Jennifer Lamoureux" userId="df8978671778c259" providerId="LiveId" clId="{4CA6EE96-F28A-424A-9353-249280B29811}" dt="2021-01-20T01:37:10.552" v="1548" actId="20577"/>
-        <pc:sldMkLst>
-          <pc:docMk/>
-          <pc:sldMk cId="2919240769" sldId="264"/>
-        </pc:sldMkLst>
-        <pc:spChg chg="mod">
-          <ac:chgData name="Jennifer Lamoureux" userId="df8978671778c259" providerId="LiveId" clId="{4CA6EE96-F28A-424A-9353-249280B29811}" dt="2021-01-20T01:37:10.552" v="1548" actId="20577"/>
-          <ac:spMkLst>
-            <pc:docMk/>
-            <pc:sldMk cId="2919240769" sldId="264"/>
-            <ac:spMk id="3" creationId="{FBDAC0CB-370F-4931-8483-DDA8916CF95B}"/>
-          </ac:spMkLst>
-        </pc:spChg>
-        <pc:picChg chg="add mod">
-          <ac:chgData name="Jennifer Lamoureux" userId="df8978671778c259" providerId="LiveId" clId="{4CA6EE96-F28A-424A-9353-249280B29811}" dt="2021-01-20T01:36:38.517" v="1458" actId="1076"/>
-          <ac:picMkLst>
-            <pc:docMk/>
-            <pc:sldMk cId="2919240769" sldId="264"/>
-            <ac:picMk id="1026" creationId="{C9E949B0-15FA-40D7-B479-895D56618AD1}"/>
-          </ac:picMkLst>
-        </pc:picChg>
-      </pc:sldChg>
-      <pc:sldChg chg="addSp delSp modSp mod modClrScheme chgLayout modNotesTx">
-        <pc:chgData name="Jennifer Lamoureux" userId="df8978671778c259" providerId="LiveId" clId="{4CA6EE96-F28A-424A-9353-249280B29811}" dt="2021-01-20T01:46:42.672" v="1948" actId="20577"/>
-        <pc:sldMkLst>
-          <pc:docMk/>
-          <pc:sldMk cId="433095225" sldId="265"/>
-        </pc:sldMkLst>
-        <pc:spChg chg="mod">
-          <ac:chgData name="Jennifer Lamoureux" userId="df8978671778c259" providerId="LiveId" clId="{4CA6EE96-F28A-424A-9353-249280B29811}" dt="2021-01-20T01:17:12.609" v="410" actId="26606"/>
-          <ac:spMkLst>
-            <pc:docMk/>
-            <pc:sldMk cId="433095225" sldId="265"/>
-            <ac:spMk id="2" creationId="{5F484F91-D050-4B1E-BC62-3AD56D875FB7}"/>
-          </ac:spMkLst>
-        </pc:spChg>
-        <pc:spChg chg="del">
-          <ac:chgData name="Jennifer Lamoureux" userId="df8978671778c259" providerId="LiveId" clId="{4CA6EE96-F28A-424A-9353-249280B29811}" dt="2021-01-20T01:16:17.623" v="402" actId="26606"/>
-          <ac:spMkLst>
-            <pc:docMk/>
-            <pc:sldMk cId="433095225" sldId="265"/>
-            <ac:spMk id="3" creationId="{6EFCB0A1-DBEB-4F76-B65A-CAE912F0D8F2}"/>
-          </ac:spMkLst>
-        </pc:spChg>
-        <pc:spChg chg="add del mod">
-          <ac:chgData name="Jennifer Lamoureux" userId="df8978671778c259" providerId="LiveId" clId="{4CA6EE96-F28A-424A-9353-249280B29811}" dt="2021-01-20T01:16:45.334" v="405" actId="26606"/>
-          <ac:spMkLst>
-            <pc:docMk/>
-            <pc:sldMk cId="433095225" sldId="265"/>
-            <ac:spMk id="5" creationId="{0A74130A-646D-47F1-8F06-B363A1A367FB}"/>
-          </ac:spMkLst>
-        </pc:spChg>
-        <pc:spChg chg="add del mod">
-          <ac:chgData name="Jennifer Lamoureux" userId="df8978671778c259" providerId="LiveId" clId="{4CA6EE96-F28A-424A-9353-249280B29811}" dt="2021-01-20T01:16:34.608" v="403" actId="478"/>
-          <ac:spMkLst>
-            <pc:docMk/>
-            <pc:sldMk cId="433095225" sldId="265"/>
-            <ac:spMk id="8" creationId="{4D114619-CB96-4A8B-9337-A145F5D8748A}"/>
-          </ac:spMkLst>
-        </pc:spChg>
-        <pc:spChg chg="add del mod">
-          <ac:chgData name="Jennifer Lamoureux" userId="df8978671778c259" providerId="LiveId" clId="{4CA6EE96-F28A-424A-9353-249280B29811}" dt="2021-01-20T01:16:53.465" v="407" actId="26606"/>
-          <ac:spMkLst>
-            <pc:docMk/>
-            <pc:sldMk cId="433095225" sldId="265"/>
-            <ac:spMk id="9" creationId="{C98F5643-A160-43AA-BB09-A0D22941BAD7}"/>
-          </ac:spMkLst>
-        </pc:spChg>
-        <pc:spChg chg="add del mod">
-          <ac:chgData name="Jennifer Lamoureux" userId="df8978671778c259" providerId="LiveId" clId="{4CA6EE96-F28A-424A-9353-249280B29811}" dt="2021-01-20T01:17:12.601" v="409" actId="26606"/>
-          <ac:spMkLst>
-            <pc:docMk/>
-            <pc:sldMk cId="433095225" sldId="265"/>
-            <ac:spMk id="12" creationId="{0A74130A-646D-47F1-8F06-B363A1A367FB}"/>
-          </ac:spMkLst>
-        </pc:spChg>
-        <pc:spChg chg="add del mod">
-          <ac:chgData name="Jennifer Lamoureux" userId="df8978671778c259" providerId="LiveId" clId="{4CA6EE96-F28A-424A-9353-249280B29811}" dt="2021-01-20T01:17:16.681" v="411" actId="478"/>
-          <ac:spMkLst>
-            <pc:docMk/>
-            <pc:sldMk cId="433095225" sldId="265"/>
-            <ac:spMk id="14" creationId="{A3020511-7E06-4346-8717-25530D820306}"/>
-          </ac:spMkLst>
-        </pc:spChg>
-        <pc:picChg chg="add del">
-          <ac:chgData name="Jennifer Lamoureux" userId="df8978671778c259" providerId="LiveId" clId="{4CA6EE96-F28A-424A-9353-249280B29811}" dt="2021-01-20T01:16:45.334" v="405" actId="26606"/>
-          <ac:picMkLst>
-            <pc:docMk/>
-            <pc:sldMk cId="433095225" sldId="265"/>
-            <ac:picMk id="4" creationId="{372CACDE-CD07-455F-A143-BE5C1322CF9B}"/>
-          </ac:picMkLst>
-        </pc:picChg>
-        <pc:picChg chg="add del">
-          <ac:chgData name="Jennifer Lamoureux" userId="df8978671778c259" providerId="LiveId" clId="{4CA6EE96-F28A-424A-9353-249280B29811}" dt="2021-01-20T01:16:53.465" v="407" actId="26606"/>
-          <ac:picMkLst>
-            <pc:docMk/>
-            <pc:sldMk cId="433095225" sldId="265"/>
-            <ac:picMk id="7" creationId="{9AB3ED27-6DD6-4A27-8997-66C144188A67}"/>
-          </ac:picMkLst>
-        </pc:picChg>
-        <pc:picChg chg="add del">
-          <ac:chgData name="Jennifer Lamoureux" userId="df8978671778c259" providerId="LiveId" clId="{4CA6EE96-F28A-424A-9353-249280B29811}" dt="2021-01-20T01:17:12.601" v="409" actId="26606"/>
-          <ac:picMkLst>
-            <pc:docMk/>
-            <pc:sldMk cId="433095225" sldId="265"/>
-            <ac:picMk id="11" creationId="{372CACDE-CD07-455F-A143-BE5C1322CF9B}"/>
-          </ac:picMkLst>
-        </pc:picChg>
-      </pc:sldChg>
-      <pc:sldChg chg="addSp modSp mod">
-        <pc:chgData name="Jennifer Lamoureux" userId="df8978671778c259" providerId="LiveId" clId="{4CA6EE96-F28A-424A-9353-249280B29811}" dt="2021-01-20T01:39:34.484" v="1562" actId="26606"/>
-        <pc:sldMkLst>
-          <pc:docMk/>
-          <pc:sldMk cId="2104656030" sldId="266"/>
-        </pc:sldMkLst>
-        <pc:spChg chg="mod">
-          <ac:chgData name="Jennifer Lamoureux" userId="df8978671778c259" providerId="LiveId" clId="{4CA6EE96-F28A-424A-9353-249280B29811}" dt="2021-01-20T01:39:34.484" v="1562" actId="26606"/>
-          <ac:spMkLst>
-            <pc:docMk/>
-            <pc:sldMk cId="2104656030" sldId="266"/>
-            <ac:spMk id="3" creationId="{BDD8104A-71DC-4F1F-AD4A-24A7547F0421}"/>
-          </ac:spMkLst>
-        </pc:spChg>
-        <pc:picChg chg="add mod">
-          <ac:chgData name="Jennifer Lamoureux" userId="df8978671778c259" providerId="LiveId" clId="{4CA6EE96-F28A-424A-9353-249280B29811}" dt="2021-01-20T01:39:34.484" v="1562" actId="26606"/>
-          <ac:picMkLst>
-            <pc:docMk/>
-            <pc:sldMk cId="2104656030" sldId="266"/>
-            <ac:picMk id="4" creationId="{189975E6-B1B4-4FDA-BCAD-76DDFD4680BD}"/>
-          </ac:picMkLst>
-        </pc:picChg>
-      </pc:sldChg>
-      <pc:sldChg chg="delSp modSp add mod ord">
-        <pc:chgData name="Jennifer Lamoureux" userId="df8978671778c259" providerId="LiveId" clId="{4CA6EE96-F28A-424A-9353-249280B29811}" dt="2021-01-20T01:51:44.945" v="2062" actId="20577"/>
-        <pc:sldMkLst>
-          <pc:docMk/>
-          <pc:sldMk cId="3169973273" sldId="267"/>
-        </pc:sldMkLst>
-        <pc:spChg chg="mod">
-          <ac:chgData name="Jennifer Lamoureux" userId="df8978671778c259" providerId="LiveId" clId="{4CA6EE96-F28A-424A-9353-249280B29811}" dt="2021-01-20T01:17:57.388" v="434" actId="20577"/>
-          <ac:spMkLst>
-            <pc:docMk/>
-            <pc:sldMk cId="3169973273" sldId="267"/>
-            <ac:spMk id="2" creationId="{FF542261-D78D-4175-A189-3975CF514FA9}"/>
-          </ac:spMkLst>
-        </pc:spChg>
-        <pc:spChg chg="mod">
-          <ac:chgData name="Jennifer Lamoureux" userId="df8978671778c259" providerId="LiveId" clId="{4CA6EE96-F28A-424A-9353-249280B29811}" dt="2021-01-20T01:51:44.945" v="2062" actId="20577"/>
-          <ac:spMkLst>
-            <pc:docMk/>
-            <pc:sldMk cId="3169973273" sldId="267"/>
-            <ac:spMk id="3" creationId="{FBDAC0CB-370F-4931-8483-DDA8916CF95B}"/>
-          </ac:spMkLst>
-        </pc:spChg>
-        <pc:picChg chg="del">
-          <ac:chgData name="Jennifer Lamoureux" userId="df8978671778c259" providerId="LiveId" clId="{4CA6EE96-F28A-424A-9353-249280B29811}" dt="2021-01-20T01:17:43.008" v="415" actId="478"/>
-          <ac:picMkLst>
-            <pc:docMk/>
-            <pc:sldMk cId="3169973273" sldId="267"/>
-            <ac:picMk id="1026" creationId="{C9E949B0-15FA-40D7-B479-895D56618AD1}"/>
-          </ac:picMkLst>
-        </pc:picChg>
-      </pc:sldChg>
-      <pc:sldChg chg="addSp delSp modSp new mod modClrScheme chgLayout">
-        <pc:chgData name="Jennifer Lamoureux" userId="df8978671778c259" providerId="LiveId" clId="{4CA6EE96-F28A-424A-9353-249280B29811}" dt="2021-01-20T01:41:24.859" v="1566" actId="20577"/>
-        <pc:sldMkLst>
-          <pc:docMk/>
-          <pc:sldMk cId="2357490765" sldId="268"/>
-        </pc:sldMkLst>
-        <pc:spChg chg="add del">
-          <ac:chgData name="Jennifer Lamoureux" userId="df8978671778c259" providerId="LiveId" clId="{4CA6EE96-F28A-424A-9353-249280B29811}" dt="2021-01-20T01:34:40.276" v="1304" actId="26606"/>
-          <ac:spMkLst>
-            <pc:docMk/>
-            <pc:sldMk cId="2357490765" sldId="268"/>
-            <ac:spMk id="2" creationId="{968F4C46-B91F-4FB9-B13A-3B5550198249}"/>
-          </ac:spMkLst>
-        </pc:spChg>
-        <pc:spChg chg="add del">
-          <ac:chgData name="Jennifer Lamoureux" userId="df8978671778c259" providerId="LiveId" clId="{4CA6EE96-F28A-424A-9353-249280B29811}" dt="2021-01-20T01:34:40.276" v="1304" actId="26606"/>
-          <ac:spMkLst>
-            <pc:docMk/>
-            <pc:sldMk cId="2357490765" sldId="268"/>
-            <ac:spMk id="3" creationId="{2BA5FE50-B433-47B5-B546-A7C104B5F15C}"/>
-          </ac:spMkLst>
-        </pc:spChg>
-        <pc:spChg chg="add del">
-          <ac:chgData name="Jennifer Lamoureux" userId="df8978671778c259" providerId="LiveId" clId="{4CA6EE96-F28A-424A-9353-249280B29811}" dt="2021-01-20T01:34:40.276" v="1304" actId="26606"/>
-          <ac:spMkLst>
-            <pc:docMk/>
-            <pc:sldMk cId="2357490765" sldId="268"/>
-            <ac:spMk id="4" creationId="{334B3D58-2B89-4663-B110-10CB64F6C918}"/>
-          </ac:spMkLst>
-        </pc:spChg>
-        <pc:spChg chg="add del">
-          <ac:chgData name="Jennifer Lamoureux" userId="df8978671778c259" providerId="LiveId" clId="{4CA6EE96-F28A-424A-9353-249280B29811}" dt="2021-01-20T01:34:40.276" v="1304" actId="26606"/>
-          <ac:spMkLst>
-            <pc:docMk/>
-            <pc:sldMk cId="2357490765" sldId="268"/>
-            <ac:spMk id="5" creationId="{22E0E57B-EF3B-4093-8FC4-56D05A216E8B}"/>
-          </ac:spMkLst>
-        </pc:spChg>
-        <pc:spChg chg="add del">
-          <ac:chgData name="Jennifer Lamoureux" userId="df8978671778c259" providerId="LiveId" clId="{4CA6EE96-F28A-424A-9353-249280B29811}" dt="2021-01-20T01:34:40.276" v="1304" actId="26606"/>
-          <ac:spMkLst>
-            <pc:docMk/>
-            <pc:sldMk cId="2357490765" sldId="268"/>
-            <ac:spMk id="6" creationId="{3BDCB6C6-2B94-4D82-9F56-D6C31CA20829}"/>
-          </ac:spMkLst>
-        </pc:spChg>
-        <pc:spChg chg="add del mod">
-          <ac:chgData name="Jennifer Lamoureux" userId="df8978671778c259" providerId="LiveId" clId="{4CA6EE96-F28A-424A-9353-249280B29811}" dt="2021-01-20T01:34:40.269" v="1303" actId="26606"/>
-          <ac:spMkLst>
-            <pc:docMk/>
-            <pc:sldMk cId="2357490765" sldId="268"/>
-            <ac:spMk id="11" creationId="{4E90C60C-B4C4-4244-A9A7-4ABD141BF68B}"/>
-          </ac:spMkLst>
-        </pc:spChg>
-        <pc:spChg chg="add del mod">
-          <ac:chgData name="Jennifer Lamoureux" userId="df8978671778c259" providerId="LiveId" clId="{4CA6EE96-F28A-424A-9353-249280B29811}" dt="2021-01-20T01:34:40.269" v="1303" actId="26606"/>
-          <ac:spMkLst>
-            <pc:docMk/>
-            <pc:sldMk cId="2357490765" sldId="268"/>
-            <ac:spMk id="13" creationId="{A0C8CBF5-419B-47AD-9C38-AC2AB6075222}"/>
-          </ac:spMkLst>
-        </pc:spChg>
-        <pc:spChg chg="add mod">
-          <ac:chgData name="Jennifer Lamoureux" userId="df8978671778c259" providerId="LiveId" clId="{4CA6EE96-F28A-424A-9353-249280B29811}" dt="2021-01-20T01:35:08.813" v="1332"/>
-          <ac:spMkLst>
-            <pc:docMk/>
-            <pc:sldMk cId="2357490765" sldId="268"/>
-            <ac:spMk id="15" creationId="{C7E8F2D0-8A8B-4CBD-930E-6F650C7B13D6}"/>
-          </ac:spMkLst>
-        </pc:spChg>
-        <pc:spChg chg="add mod">
-          <ac:chgData name="Jennifer Lamoureux" userId="df8978671778c259" providerId="LiveId" clId="{4CA6EE96-F28A-424A-9353-249280B29811}" dt="2021-01-20T01:34:51.840" v="1328" actId="20577"/>
-          <ac:spMkLst>
-            <pc:docMk/>
-            <pc:sldMk cId="2357490765" sldId="268"/>
-            <ac:spMk id="16" creationId="{153C6905-8C50-4B2F-BAFC-B39170C1347C}"/>
-          </ac:spMkLst>
-        </pc:spChg>
-        <pc:spChg chg="add mod">
-          <ac:chgData name="Jennifer Lamoureux" userId="df8978671778c259" providerId="LiveId" clId="{4CA6EE96-F28A-424A-9353-249280B29811}" dt="2021-01-20T01:41:24.859" v="1566" actId="20577"/>
-          <ac:spMkLst>
-            <pc:docMk/>
-            <pc:sldMk cId="2357490765" sldId="268"/>
-            <ac:spMk id="17" creationId="{AAFD940F-400A-4980-81DB-A55005E9B8D1}"/>
-          </ac:spMkLst>
-        </pc:spChg>
-      </pc:sldChg>
-    </pc:docChg>
-  </pc:docChgLst>
-</pc:chgInfo>
-</file>
-
 <file path=ppt/diagrams/colors1.xml><?xml version="1.0" encoding="utf-8"?>
 <dgm:colorsDef xmlns:dgm="http://schemas.openxmlformats.org/drawingml/2006/diagram" xmlns:a="http://schemas.openxmlformats.org/drawingml/2006/main" uniqueId="urn:microsoft.com/office/officeart/2018/5/colors/Iconchunking_neutralicon_colorful1">
   <dgm:title val=""/>
@@ -1505,11 +1052,758 @@
 </dgm:colorsDef>
 </file>
 
+<file path=ppt/diagrams/colors2.xml><?xml version="1.0" encoding="utf-8"?>
+<dgm:colorsDef xmlns:dgm="http://schemas.openxmlformats.org/drawingml/2006/diagram" xmlns:a="http://schemas.openxmlformats.org/drawingml/2006/main" uniqueId="urn:microsoft.com/office/officeart/2005/8/colors/accent3_2">
+  <dgm:title val=""/>
+  <dgm:desc val=""/>
+  <dgm:catLst>
+    <dgm:cat type="accent3" pri="11200"/>
+  </dgm:catLst>
+  <dgm:styleLbl name="node0">
+    <dgm:fillClrLst meth="repeat">
+      <a:schemeClr val="accent3"/>
+    </dgm:fillClrLst>
+    <dgm:linClrLst meth="repeat">
+      <a:schemeClr val="lt1"/>
+    </dgm:linClrLst>
+    <dgm:effectClrLst/>
+    <dgm:txLinClrLst/>
+    <dgm:txFillClrLst/>
+    <dgm:txEffectClrLst/>
+  </dgm:styleLbl>
+  <dgm:styleLbl name="node1">
+    <dgm:fillClrLst meth="repeat">
+      <a:schemeClr val="accent3"/>
+    </dgm:fillClrLst>
+    <dgm:linClrLst meth="repeat">
+      <a:schemeClr val="lt1"/>
+    </dgm:linClrLst>
+    <dgm:effectClrLst/>
+    <dgm:txLinClrLst/>
+    <dgm:txFillClrLst/>
+    <dgm:txEffectClrLst/>
+  </dgm:styleLbl>
+  <dgm:styleLbl name="alignNode1">
+    <dgm:fillClrLst meth="repeat">
+      <a:schemeClr val="accent3"/>
+    </dgm:fillClrLst>
+    <dgm:linClrLst meth="repeat">
+      <a:schemeClr val="accent3"/>
+    </dgm:linClrLst>
+    <dgm:effectClrLst/>
+    <dgm:txLinClrLst/>
+    <dgm:txFillClrLst/>
+    <dgm:txEffectClrLst/>
+  </dgm:styleLbl>
+  <dgm:styleLbl name="lnNode1">
+    <dgm:fillClrLst meth="repeat">
+      <a:schemeClr val="accent3"/>
+    </dgm:fillClrLst>
+    <dgm:linClrLst meth="repeat">
+      <a:schemeClr val="lt1"/>
+    </dgm:linClrLst>
+    <dgm:effectClrLst/>
+    <dgm:txLinClrLst/>
+    <dgm:txFillClrLst/>
+    <dgm:txEffectClrLst/>
+  </dgm:styleLbl>
+  <dgm:styleLbl name="vennNode1">
+    <dgm:fillClrLst meth="repeat">
+      <a:schemeClr val="accent3">
+        <a:alpha val="50000"/>
+      </a:schemeClr>
+    </dgm:fillClrLst>
+    <dgm:linClrLst meth="repeat">
+      <a:schemeClr val="lt1"/>
+    </dgm:linClrLst>
+    <dgm:effectClrLst/>
+    <dgm:txLinClrLst/>
+    <dgm:txFillClrLst/>
+    <dgm:txEffectClrLst/>
+  </dgm:styleLbl>
+  <dgm:styleLbl name="node2">
+    <dgm:fillClrLst meth="repeat">
+      <a:schemeClr val="accent3"/>
+    </dgm:fillClrLst>
+    <dgm:linClrLst meth="repeat">
+      <a:schemeClr val="lt1"/>
+    </dgm:linClrLst>
+    <dgm:effectClrLst/>
+    <dgm:txLinClrLst/>
+    <dgm:txFillClrLst/>
+    <dgm:txEffectClrLst/>
+  </dgm:styleLbl>
+  <dgm:styleLbl name="node3">
+    <dgm:fillClrLst meth="repeat">
+      <a:schemeClr val="accent3"/>
+    </dgm:fillClrLst>
+    <dgm:linClrLst meth="repeat">
+      <a:schemeClr val="lt1"/>
+    </dgm:linClrLst>
+    <dgm:effectClrLst/>
+    <dgm:txLinClrLst/>
+    <dgm:txFillClrLst/>
+    <dgm:txEffectClrLst/>
+  </dgm:styleLbl>
+  <dgm:styleLbl name="node4">
+    <dgm:fillClrLst meth="repeat">
+      <a:schemeClr val="accent3"/>
+    </dgm:fillClrLst>
+    <dgm:linClrLst meth="repeat">
+      <a:schemeClr val="lt1"/>
+    </dgm:linClrLst>
+    <dgm:effectClrLst/>
+    <dgm:txLinClrLst/>
+    <dgm:txFillClrLst/>
+    <dgm:txEffectClrLst/>
+  </dgm:styleLbl>
+  <dgm:styleLbl name="fgImgPlace1">
+    <dgm:fillClrLst meth="repeat">
+      <a:schemeClr val="accent3">
+        <a:tint val="50000"/>
+      </a:schemeClr>
+    </dgm:fillClrLst>
+    <dgm:linClrLst meth="repeat">
+      <a:schemeClr val="lt1"/>
+    </dgm:linClrLst>
+    <dgm:effectClrLst/>
+    <dgm:txLinClrLst/>
+    <dgm:txFillClrLst meth="repeat">
+      <a:schemeClr val="lt1"/>
+    </dgm:txFillClrLst>
+    <dgm:txEffectClrLst/>
+  </dgm:styleLbl>
+  <dgm:styleLbl name="alignImgPlace1">
+    <dgm:fillClrLst meth="repeat">
+      <a:schemeClr val="accent3">
+        <a:tint val="50000"/>
+      </a:schemeClr>
+    </dgm:fillClrLst>
+    <dgm:linClrLst meth="repeat">
+      <a:schemeClr val="lt1"/>
+    </dgm:linClrLst>
+    <dgm:effectClrLst/>
+    <dgm:txLinClrLst/>
+    <dgm:txFillClrLst meth="repeat">
+      <a:schemeClr val="lt1"/>
+    </dgm:txFillClrLst>
+    <dgm:txEffectClrLst/>
+  </dgm:styleLbl>
+  <dgm:styleLbl name="bgImgPlace1">
+    <dgm:fillClrLst meth="repeat">
+      <a:schemeClr val="accent3">
+        <a:tint val="50000"/>
+      </a:schemeClr>
+    </dgm:fillClrLst>
+    <dgm:linClrLst meth="repeat">
+      <a:schemeClr val="lt1"/>
+    </dgm:linClrLst>
+    <dgm:effectClrLst/>
+    <dgm:txLinClrLst/>
+    <dgm:txFillClrLst meth="repeat">
+      <a:schemeClr val="lt1"/>
+    </dgm:txFillClrLst>
+    <dgm:txEffectClrLst/>
+  </dgm:styleLbl>
+  <dgm:styleLbl name="sibTrans2D1">
+    <dgm:fillClrLst meth="repeat">
+      <a:schemeClr val="accent3">
+        <a:tint val="60000"/>
+      </a:schemeClr>
+    </dgm:fillClrLst>
+    <dgm:linClrLst meth="repeat">
+      <a:schemeClr val="accent3">
+        <a:tint val="60000"/>
+      </a:schemeClr>
+    </dgm:linClrLst>
+    <dgm:effectClrLst/>
+    <dgm:txLinClrLst/>
+    <dgm:txFillClrLst/>
+    <dgm:txEffectClrLst/>
+  </dgm:styleLbl>
+  <dgm:styleLbl name="fgSibTrans2D1">
+    <dgm:fillClrLst meth="repeat">
+      <a:schemeClr val="accent3">
+        <a:tint val="60000"/>
+      </a:schemeClr>
+    </dgm:fillClrLst>
+    <dgm:linClrLst meth="repeat">
+      <a:schemeClr val="accent3">
+        <a:tint val="60000"/>
+      </a:schemeClr>
+    </dgm:linClrLst>
+    <dgm:effectClrLst/>
+    <dgm:txLinClrLst/>
+    <dgm:txFillClrLst/>
+    <dgm:txEffectClrLst/>
+  </dgm:styleLbl>
+  <dgm:styleLbl name="bgSibTrans2D1">
+    <dgm:fillClrLst meth="repeat">
+      <a:schemeClr val="accent3">
+        <a:tint val="60000"/>
+      </a:schemeClr>
+    </dgm:fillClrLst>
+    <dgm:linClrLst meth="repeat">
+      <a:schemeClr val="accent3">
+        <a:tint val="60000"/>
+      </a:schemeClr>
+    </dgm:linClrLst>
+    <dgm:effectClrLst/>
+    <dgm:txLinClrLst/>
+    <dgm:txFillClrLst/>
+    <dgm:txEffectClrLst/>
+  </dgm:styleLbl>
+  <dgm:styleLbl name="sibTrans1D1">
+    <dgm:fillClrLst meth="repeat">
+      <a:schemeClr val="accent3"/>
+    </dgm:fillClrLst>
+    <dgm:linClrLst meth="repeat">
+      <a:schemeClr val="accent3"/>
+    </dgm:linClrLst>
+    <dgm:effectClrLst/>
+    <dgm:txLinClrLst/>
+    <dgm:txFillClrLst meth="repeat">
+      <a:schemeClr val="tx1"/>
+    </dgm:txFillClrLst>
+    <dgm:txEffectClrLst/>
+  </dgm:styleLbl>
+  <dgm:styleLbl name="callout">
+    <dgm:fillClrLst meth="repeat">
+      <a:schemeClr val="accent3"/>
+    </dgm:fillClrLst>
+    <dgm:linClrLst meth="repeat">
+      <a:schemeClr val="accent3">
+        <a:tint val="50000"/>
+      </a:schemeClr>
+    </dgm:linClrLst>
+    <dgm:effectClrLst/>
+    <dgm:txLinClrLst/>
+    <dgm:txFillClrLst meth="repeat">
+      <a:schemeClr val="tx1"/>
+    </dgm:txFillClrLst>
+    <dgm:txEffectClrLst/>
+  </dgm:styleLbl>
+  <dgm:styleLbl name="asst0">
+    <dgm:fillClrLst meth="repeat">
+      <a:schemeClr val="accent3"/>
+    </dgm:fillClrLst>
+    <dgm:linClrLst meth="repeat">
+      <a:schemeClr val="lt1"/>
+    </dgm:linClrLst>
+    <dgm:effectClrLst/>
+    <dgm:txLinClrLst/>
+    <dgm:txFillClrLst/>
+    <dgm:txEffectClrLst/>
+  </dgm:styleLbl>
+  <dgm:styleLbl name="asst1">
+    <dgm:fillClrLst meth="repeat">
+      <a:schemeClr val="accent3"/>
+    </dgm:fillClrLst>
+    <dgm:linClrLst meth="repeat">
+      <a:schemeClr val="lt1"/>
+    </dgm:linClrLst>
+    <dgm:effectClrLst/>
+    <dgm:txLinClrLst/>
+    <dgm:txFillClrLst/>
+    <dgm:txEffectClrLst/>
+  </dgm:styleLbl>
+  <dgm:styleLbl name="asst2">
+    <dgm:fillClrLst meth="repeat">
+      <a:schemeClr val="accent3"/>
+    </dgm:fillClrLst>
+    <dgm:linClrLst meth="repeat">
+      <a:schemeClr val="lt1"/>
+    </dgm:linClrLst>
+    <dgm:effectClrLst/>
+    <dgm:txLinClrLst/>
+    <dgm:txFillClrLst/>
+    <dgm:txEffectClrLst/>
+  </dgm:styleLbl>
+  <dgm:styleLbl name="asst3">
+    <dgm:fillClrLst meth="repeat">
+      <a:schemeClr val="accent3"/>
+    </dgm:fillClrLst>
+    <dgm:linClrLst meth="repeat">
+      <a:schemeClr val="lt1"/>
+    </dgm:linClrLst>
+    <dgm:effectClrLst/>
+    <dgm:txLinClrLst/>
+    <dgm:txFillClrLst/>
+    <dgm:txEffectClrLst/>
+  </dgm:styleLbl>
+  <dgm:styleLbl name="asst4">
+    <dgm:fillClrLst meth="repeat">
+      <a:schemeClr val="accent3"/>
+    </dgm:fillClrLst>
+    <dgm:linClrLst meth="repeat">
+      <a:schemeClr val="lt1"/>
+    </dgm:linClrLst>
+    <dgm:effectClrLst/>
+    <dgm:txLinClrLst/>
+    <dgm:txFillClrLst/>
+    <dgm:txEffectClrLst/>
+  </dgm:styleLbl>
+  <dgm:styleLbl name="parChTrans2D1">
+    <dgm:fillClrLst meth="repeat">
+      <a:schemeClr val="accent3">
+        <a:tint val="60000"/>
+      </a:schemeClr>
+    </dgm:fillClrLst>
+    <dgm:linClrLst meth="repeat">
+      <a:schemeClr val="accent3">
+        <a:tint val="60000"/>
+      </a:schemeClr>
+    </dgm:linClrLst>
+    <dgm:effectClrLst/>
+    <dgm:txLinClrLst/>
+    <dgm:txFillClrLst meth="repeat">
+      <a:schemeClr val="lt1"/>
+    </dgm:txFillClrLst>
+    <dgm:txEffectClrLst/>
+  </dgm:styleLbl>
+  <dgm:styleLbl name="parChTrans2D2">
+    <dgm:fillClrLst meth="repeat">
+      <a:schemeClr val="accent3"/>
+    </dgm:fillClrLst>
+    <dgm:linClrLst meth="repeat">
+      <a:schemeClr val="accent3"/>
+    </dgm:linClrLst>
+    <dgm:effectClrLst/>
+    <dgm:txLinClrLst/>
+    <dgm:txFillClrLst meth="repeat">
+      <a:schemeClr val="lt1"/>
+    </dgm:txFillClrLst>
+    <dgm:txEffectClrLst/>
+  </dgm:styleLbl>
+  <dgm:styleLbl name="parChTrans2D3">
+    <dgm:fillClrLst meth="repeat">
+      <a:schemeClr val="accent3"/>
+    </dgm:fillClrLst>
+    <dgm:linClrLst meth="repeat">
+      <a:schemeClr val="accent3"/>
+    </dgm:linClrLst>
+    <dgm:effectClrLst/>
+    <dgm:txLinClrLst/>
+    <dgm:txFillClrLst meth="repeat">
+      <a:schemeClr val="lt1"/>
+    </dgm:txFillClrLst>
+    <dgm:txEffectClrLst/>
+  </dgm:styleLbl>
+  <dgm:styleLbl name="parChTrans2D4">
+    <dgm:fillClrLst meth="repeat">
+      <a:schemeClr val="accent3"/>
+    </dgm:fillClrLst>
+    <dgm:linClrLst meth="repeat">
+      <a:schemeClr val="accent3"/>
+    </dgm:linClrLst>
+    <dgm:effectClrLst/>
+    <dgm:txLinClrLst/>
+    <dgm:txFillClrLst meth="repeat">
+      <a:schemeClr val="lt1"/>
+    </dgm:txFillClrLst>
+    <dgm:txEffectClrLst/>
+  </dgm:styleLbl>
+  <dgm:styleLbl name="parChTrans1D1">
+    <dgm:fillClrLst meth="repeat">
+      <a:schemeClr val="accent3"/>
+    </dgm:fillClrLst>
+    <dgm:linClrLst meth="repeat">
+      <a:schemeClr val="accent3">
+        <a:shade val="60000"/>
+      </a:schemeClr>
+    </dgm:linClrLst>
+    <dgm:effectClrLst/>
+    <dgm:txLinClrLst/>
+    <dgm:txFillClrLst meth="repeat">
+      <a:schemeClr val="tx1"/>
+    </dgm:txFillClrLst>
+    <dgm:txEffectClrLst/>
+  </dgm:styleLbl>
+  <dgm:styleLbl name="parChTrans1D2">
+    <dgm:fillClrLst meth="repeat">
+      <a:schemeClr val="accent3"/>
+    </dgm:fillClrLst>
+    <dgm:linClrLst meth="repeat">
+      <a:schemeClr val="accent3">
+        <a:shade val="60000"/>
+      </a:schemeClr>
+    </dgm:linClrLst>
+    <dgm:effectClrLst/>
+    <dgm:txLinClrLst/>
+    <dgm:txFillClrLst meth="repeat">
+      <a:schemeClr val="tx1"/>
+    </dgm:txFillClrLst>
+    <dgm:txEffectClrLst/>
+  </dgm:styleLbl>
+  <dgm:styleLbl name="parChTrans1D3">
+    <dgm:fillClrLst meth="repeat">
+      <a:schemeClr val="accent3"/>
+    </dgm:fillClrLst>
+    <dgm:linClrLst meth="repeat">
+      <a:schemeClr val="accent3">
+        <a:shade val="80000"/>
+      </a:schemeClr>
+    </dgm:linClrLst>
+    <dgm:effectClrLst/>
+    <dgm:txLinClrLst/>
+    <dgm:txFillClrLst meth="repeat">
+      <a:schemeClr val="tx1"/>
+    </dgm:txFillClrLst>
+    <dgm:txEffectClrLst/>
+  </dgm:styleLbl>
+  <dgm:styleLbl name="parChTrans1D4">
+    <dgm:fillClrLst meth="repeat">
+      <a:schemeClr val="accent3"/>
+    </dgm:fillClrLst>
+    <dgm:linClrLst meth="repeat">
+      <a:schemeClr val="accent3">
+        <a:shade val="80000"/>
+      </a:schemeClr>
+    </dgm:linClrLst>
+    <dgm:effectClrLst/>
+    <dgm:txLinClrLst/>
+    <dgm:txFillClrLst meth="repeat">
+      <a:schemeClr val="tx1"/>
+    </dgm:txFillClrLst>
+    <dgm:txEffectClrLst/>
+  </dgm:styleLbl>
+  <dgm:styleLbl name="fgAcc1">
+    <dgm:fillClrLst meth="repeat">
+      <a:schemeClr val="lt1">
+        <a:alpha val="90000"/>
+      </a:schemeClr>
+    </dgm:fillClrLst>
+    <dgm:linClrLst meth="repeat">
+      <a:schemeClr val="accent3"/>
+    </dgm:linClrLst>
+    <dgm:effectClrLst/>
+    <dgm:txLinClrLst/>
+    <dgm:txFillClrLst meth="repeat">
+      <a:schemeClr val="dk1"/>
+    </dgm:txFillClrLst>
+    <dgm:txEffectClrLst/>
+  </dgm:styleLbl>
+  <dgm:styleLbl name="conFgAcc1">
+    <dgm:fillClrLst meth="repeat">
+      <a:schemeClr val="lt1">
+        <a:alpha val="90000"/>
+      </a:schemeClr>
+    </dgm:fillClrLst>
+    <dgm:linClrLst meth="repeat">
+      <a:schemeClr val="accent3"/>
+    </dgm:linClrLst>
+    <dgm:effectClrLst/>
+    <dgm:txLinClrLst/>
+    <dgm:txFillClrLst meth="repeat">
+      <a:schemeClr val="dk1"/>
+    </dgm:txFillClrLst>
+    <dgm:txEffectClrLst/>
+  </dgm:styleLbl>
+  <dgm:styleLbl name="alignAcc1">
+    <dgm:fillClrLst meth="repeat">
+      <a:schemeClr val="lt1">
+        <a:alpha val="90000"/>
+      </a:schemeClr>
+    </dgm:fillClrLst>
+    <dgm:linClrLst meth="repeat">
+      <a:schemeClr val="accent3"/>
+    </dgm:linClrLst>
+    <dgm:effectClrLst/>
+    <dgm:txLinClrLst/>
+    <dgm:txFillClrLst meth="repeat">
+      <a:schemeClr val="dk1"/>
+    </dgm:txFillClrLst>
+    <dgm:txEffectClrLst/>
+  </dgm:styleLbl>
+  <dgm:styleLbl name="trAlignAcc1">
+    <dgm:fillClrLst meth="repeat">
+      <a:schemeClr val="lt1">
+        <a:alpha val="40000"/>
+      </a:schemeClr>
+    </dgm:fillClrLst>
+    <dgm:linClrLst meth="repeat">
+      <a:schemeClr val="accent3"/>
+    </dgm:linClrLst>
+    <dgm:effectClrLst/>
+    <dgm:txLinClrLst/>
+    <dgm:txFillClrLst meth="repeat">
+      <a:schemeClr val="dk1"/>
+    </dgm:txFillClrLst>
+    <dgm:txEffectClrLst/>
+  </dgm:styleLbl>
+  <dgm:styleLbl name="bgAcc1">
+    <dgm:fillClrLst meth="repeat">
+      <a:schemeClr val="lt1">
+        <a:alpha val="90000"/>
+      </a:schemeClr>
+    </dgm:fillClrLst>
+    <dgm:linClrLst meth="repeat">
+      <a:schemeClr val="accent3"/>
+    </dgm:linClrLst>
+    <dgm:effectClrLst/>
+    <dgm:txLinClrLst/>
+    <dgm:txFillClrLst meth="repeat">
+      <a:schemeClr val="dk1"/>
+    </dgm:txFillClrLst>
+    <dgm:txEffectClrLst/>
+  </dgm:styleLbl>
+  <dgm:styleLbl name="solidFgAcc1">
+    <dgm:fillClrLst meth="repeat">
+      <a:schemeClr val="lt1"/>
+    </dgm:fillClrLst>
+    <dgm:linClrLst meth="repeat">
+      <a:schemeClr val="accent3"/>
+    </dgm:linClrLst>
+    <dgm:effectClrLst/>
+    <dgm:txLinClrLst/>
+    <dgm:txFillClrLst meth="repeat">
+      <a:schemeClr val="dk1"/>
+    </dgm:txFillClrLst>
+    <dgm:txEffectClrLst/>
+  </dgm:styleLbl>
+  <dgm:styleLbl name="solidAlignAcc1">
+    <dgm:fillClrLst meth="repeat">
+      <a:schemeClr val="lt1"/>
+    </dgm:fillClrLst>
+    <dgm:linClrLst meth="repeat">
+      <a:schemeClr val="accent3"/>
+    </dgm:linClrLst>
+    <dgm:effectClrLst/>
+    <dgm:txLinClrLst/>
+    <dgm:txFillClrLst meth="repeat">
+      <a:schemeClr val="dk1"/>
+    </dgm:txFillClrLst>
+    <dgm:txEffectClrLst/>
+  </dgm:styleLbl>
+  <dgm:styleLbl name="solidBgAcc1">
+    <dgm:fillClrLst meth="repeat">
+      <a:schemeClr val="lt1"/>
+    </dgm:fillClrLst>
+    <dgm:linClrLst meth="repeat">
+      <a:schemeClr val="accent3"/>
+    </dgm:linClrLst>
+    <dgm:effectClrLst/>
+    <dgm:txLinClrLst/>
+    <dgm:txFillClrLst meth="repeat">
+      <a:schemeClr val="dk1"/>
+    </dgm:txFillClrLst>
+    <dgm:txEffectClrLst/>
+  </dgm:styleLbl>
+  <dgm:styleLbl name="fgAccFollowNode1">
+    <dgm:fillClrLst meth="repeat">
+      <a:schemeClr val="accent3">
+        <a:alpha val="90000"/>
+        <a:tint val="40000"/>
+      </a:schemeClr>
+    </dgm:fillClrLst>
+    <dgm:linClrLst meth="repeat">
+      <a:schemeClr val="accent3">
+        <a:alpha val="90000"/>
+        <a:tint val="40000"/>
+      </a:schemeClr>
+    </dgm:linClrLst>
+    <dgm:effectClrLst/>
+    <dgm:txLinClrLst/>
+    <dgm:txFillClrLst meth="repeat">
+      <a:schemeClr val="dk1"/>
+    </dgm:txFillClrLst>
+    <dgm:txEffectClrLst/>
+  </dgm:styleLbl>
+  <dgm:styleLbl name="alignAccFollowNode1">
+    <dgm:fillClrLst meth="repeat">
+      <a:schemeClr val="accent3">
+        <a:alpha val="90000"/>
+        <a:tint val="40000"/>
+      </a:schemeClr>
+    </dgm:fillClrLst>
+    <dgm:linClrLst meth="repeat">
+      <a:schemeClr val="accent3">
+        <a:alpha val="90000"/>
+        <a:tint val="40000"/>
+      </a:schemeClr>
+    </dgm:linClrLst>
+    <dgm:effectClrLst/>
+    <dgm:txLinClrLst/>
+    <dgm:txFillClrLst meth="repeat">
+      <a:schemeClr val="dk1"/>
+    </dgm:txFillClrLst>
+    <dgm:txEffectClrLst/>
+  </dgm:styleLbl>
+  <dgm:styleLbl name="bgAccFollowNode1">
+    <dgm:fillClrLst meth="repeat">
+      <a:schemeClr val="accent3">
+        <a:alpha val="90000"/>
+        <a:tint val="40000"/>
+      </a:schemeClr>
+    </dgm:fillClrLst>
+    <dgm:linClrLst meth="repeat">
+      <a:schemeClr val="accent3">
+        <a:alpha val="90000"/>
+        <a:tint val="40000"/>
+      </a:schemeClr>
+    </dgm:linClrLst>
+    <dgm:effectClrLst/>
+    <dgm:txLinClrLst/>
+    <dgm:txFillClrLst meth="repeat">
+      <a:schemeClr val="dk1"/>
+    </dgm:txFillClrLst>
+    <dgm:txEffectClrLst/>
+  </dgm:styleLbl>
+  <dgm:styleLbl name="fgAcc0">
+    <dgm:fillClrLst meth="repeat">
+      <a:schemeClr val="lt1">
+        <a:alpha val="90000"/>
+      </a:schemeClr>
+    </dgm:fillClrLst>
+    <dgm:linClrLst meth="repeat">
+      <a:schemeClr val="accent3"/>
+    </dgm:linClrLst>
+    <dgm:effectClrLst/>
+    <dgm:txLinClrLst/>
+    <dgm:txFillClrLst meth="repeat">
+      <a:schemeClr val="dk1"/>
+    </dgm:txFillClrLst>
+    <dgm:txEffectClrLst/>
+  </dgm:styleLbl>
+  <dgm:styleLbl name="fgAcc2">
+    <dgm:fillClrLst meth="repeat">
+      <a:schemeClr val="lt1">
+        <a:alpha val="90000"/>
+      </a:schemeClr>
+    </dgm:fillClrLst>
+    <dgm:linClrLst meth="repeat">
+      <a:schemeClr val="accent3"/>
+    </dgm:linClrLst>
+    <dgm:effectClrLst/>
+    <dgm:txLinClrLst/>
+    <dgm:txFillClrLst meth="repeat">
+      <a:schemeClr val="dk1"/>
+    </dgm:txFillClrLst>
+    <dgm:txEffectClrLst/>
+  </dgm:styleLbl>
+  <dgm:styleLbl name="fgAcc3">
+    <dgm:fillClrLst meth="repeat">
+      <a:schemeClr val="lt1">
+        <a:alpha val="90000"/>
+      </a:schemeClr>
+    </dgm:fillClrLst>
+    <dgm:linClrLst meth="repeat">
+      <a:schemeClr val="accent3"/>
+    </dgm:linClrLst>
+    <dgm:effectClrLst/>
+    <dgm:txLinClrLst/>
+    <dgm:txFillClrLst meth="repeat">
+      <a:schemeClr val="dk1"/>
+    </dgm:txFillClrLst>
+    <dgm:txEffectClrLst/>
+  </dgm:styleLbl>
+  <dgm:styleLbl name="fgAcc4">
+    <dgm:fillClrLst meth="repeat">
+      <a:schemeClr val="lt1">
+        <a:alpha val="90000"/>
+      </a:schemeClr>
+    </dgm:fillClrLst>
+    <dgm:linClrLst meth="repeat">
+      <a:schemeClr val="accent3"/>
+    </dgm:linClrLst>
+    <dgm:effectClrLst/>
+    <dgm:txLinClrLst/>
+    <dgm:txFillClrLst meth="repeat">
+      <a:schemeClr val="dk1"/>
+    </dgm:txFillClrLst>
+    <dgm:txEffectClrLst/>
+  </dgm:styleLbl>
+  <dgm:styleLbl name="bgShp">
+    <dgm:fillClrLst meth="repeat">
+      <a:schemeClr val="accent3">
+        <a:tint val="40000"/>
+      </a:schemeClr>
+    </dgm:fillClrLst>
+    <dgm:linClrLst meth="repeat">
+      <a:schemeClr val="accent3"/>
+    </dgm:linClrLst>
+    <dgm:effectClrLst/>
+    <dgm:txLinClrLst/>
+    <dgm:txFillClrLst meth="repeat">
+      <a:schemeClr val="dk1"/>
+    </dgm:txFillClrLst>
+    <dgm:txEffectClrLst/>
+  </dgm:styleLbl>
+  <dgm:styleLbl name="dkBgShp">
+    <dgm:fillClrLst meth="repeat">
+      <a:schemeClr val="accent3">
+        <a:shade val="80000"/>
+      </a:schemeClr>
+    </dgm:fillClrLst>
+    <dgm:linClrLst meth="repeat">
+      <a:schemeClr val="accent3"/>
+    </dgm:linClrLst>
+    <dgm:effectClrLst/>
+    <dgm:txLinClrLst/>
+    <dgm:txFillClrLst meth="repeat">
+      <a:schemeClr val="lt1"/>
+    </dgm:txFillClrLst>
+    <dgm:txEffectClrLst/>
+  </dgm:styleLbl>
+  <dgm:styleLbl name="trBgShp">
+    <dgm:fillClrLst meth="repeat">
+      <a:schemeClr val="accent3">
+        <a:tint val="50000"/>
+        <a:alpha val="40000"/>
+      </a:schemeClr>
+    </dgm:fillClrLst>
+    <dgm:linClrLst meth="repeat">
+      <a:schemeClr val="accent3"/>
+    </dgm:linClrLst>
+    <dgm:effectClrLst/>
+    <dgm:txLinClrLst/>
+    <dgm:txFillClrLst meth="repeat">
+      <a:schemeClr val="lt1"/>
+    </dgm:txFillClrLst>
+    <dgm:txEffectClrLst/>
+  </dgm:styleLbl>
+  <dgm:styleLbl name="fgShp">
+    <dgm:fillClrLst meth="repeat">
+      <a:schemeClr val="accent3">
+        <a:tint val="60000"/>
+      </a:schemeClr>
+    </dgm:fillClrLst>
+    <dgm:linClrLst meth="repeat">
+      <a:schemeClr val="lt1"/>
+    </dgm:linClrLst>
+    <dgm:effectClrLst/>
+    <dgm:txLinClrLst/>
+    <dgm:txFillClrLst meth="repeat">
+      <a:schemeClr val="dk1"/>
+    </dgm:txFillClrLst>
+    <dgm:txEffectClrLst/>
+  </dgm:styleLbl>
+  <dgm:styleLbl name="revTx">
+    <dgm:fillClrLst meth="repeat">
+      <a:schemeClr val="lt1">
+        <a:alpha val="0"/>
+      </a:schemeClr>
+    </dgm:fillClrLst>
+    <dgm:linClrLst meth="repeat">
+      <a:schemeClr val="dk1">
+        <a:alpha val="0"/>
+      </a:schemeClr>
+    </dgm:linClrLst>
+    <dgm:effectClrLst/>
+    <dgm:txLinClrLst/>
+    <dgm:txFillClrLst meth="repeat">
+      <a:schemeClr val="tx1"/>
+    </dgm:txFillClrLst>
+    <dgm:txEffectClrLst/>
+  </dgm:styleLbl>
+</dgm:colorsDef>
+</file>
+
 <file path=ppt/diagrams/data1.xml><?xml version="1.0" encoding="utf-8"?>
 <dgm:dataModel xmlns:dgm="http://schemas.openxmlformats.org/drawingml/2006/diagram" xmlns:a="http://schemas.openxmlformats.org/drawingml/2006/main">
   <dgm:ptLst>
     <dgm:pt modelId="{01A66772-F185-4D58-B8BB-E9370D7A7A2B}" type="doc">
-      <dgm:prSet loTypeId="urn:microsoft.com/office/officeart/2018/5/layout/IconCircleLabelList" loCatId="icon" qsTypeId="urn:microsoft.com/office/officeart/2005/8/quickstyle/simple1" qsCatId="simple" csTypeId="urn:microsoft.com/office/officeart/2018/5/colors/Iconchunking_neutralicon_colorful1" csCatId="colorful" phldr="1"/>
+      <dgm:prSet loTypeId="urn:microsoft.com/office/officeart/2018/5/layout/IconCircleLabelList" loCatId="icon" qsTypeId="urn:microsoft.com/office/officeart/2005/8/quickstyle/simple4" qsCatId="simple" csTypeId="urn:microsoft.com/office/officeart/2018/5/colors/Iconchunking_neutralicon_colorful1" csCatId="colorful" phldr="1"/>
       <dgm:spPr/>
       <dgm:t>
         <a:bodyPr/>
@@ -1534,7 +1828,7 @@
           </a:pPr>
           <a:r>
             <a:rPr lang="en-US" dirty="0"/>
-            <a:t>What we were trying to accomplish	</a:t>
+            <a:t>    The Goal	</a:t>
           </a:r>
         </a:p>
       </dgm:t>
@@ -1681,9 +1975,6 @@
             <a:fillRect/>
           </a:stretch>
         </a:blipFill>
-        <a:ln>
-          <a:noFill/>
-        </a:ln>
       </dgm:spPr>
       <dgm:extLst>
         <a:ext uri="{E40237B7-FDA0-4F09-8148-C483321AD2D9}">
@@ -1696,7 +1987,7 @@
       <dgm:spPr/>
     </dgm:pt>
     <dgm:pt modelId="{127117FB-F8A7-4A20-A8A7-EC686DDC76D0}" type="pres">
-      <dgm:prSet presAssocID="{40FC4FFE-8987-4A26-B7F4-8A516F18ADAE}" presName="textRect" presStyleLbl="revTx" presStyleIdx="0" presStyleCnt="3">
+      <dgm:prSet presAssocID="{40FC4FFE-8987-4A26-B7F4-8A516F18ADAE}" presName="textRect" presStyleLbl="revTx" presStyleIdx="0" presStyleCnt="3" custScaleY="110360">
         <dgm:presLayoutVars>
           <dgm:chMax val="1"/>
           <dgm:chPref val="1"/>
@@ -1735,9 +2026,6 @@
             <a:fillRect/>
           </a:stretch>
         </a:blipFill>
-        <a:ln>
-          <a:noFill/>
-        </a:ln>
       </dgm:spPr>
       <dgm:extLst>
         <a:ext uri="{E40237B7-FDA0-4F09-8148-C483321AD2D9}">
@@ -1789,9 +2077,6 @@
             <a:fillRect/>
           </a:stretch>
         </a:blipFill>
-        <a:ln>
-          <a:noFill/>
-        </a:ln>
       </dgm:spPr>
       <dgm:extLst>
         <a:ext uri="{E40237B7-FDA0-4F09-8148-C483321AD2D9}">
@@ -1849,6 +2134,353 @@
 </dgm:dataModel>
 </file>
 
+<file path=ppt/diagrams/data2.xml><?xml version="1.0" encoding="utf-8"?>
+<dgm:dataModel xmlns:dgm="http://schemas.openxmlformats.org/drawingml/2006/diagram" xmlns:a="http://schemas.openxmlformats.org/drawingml/2006/main">
+  <dgm:ptLst>
+    <dgm:pt modelId="{EAB6B3E1-FC6F-4045-B7A5-E003D0B3E5FD}" type="doc">
+      <dgm:prSet loTypeId="urn:microsoft.com/office/officeart/2018/2/layout/IconVerticalSolidList" loCatId="icon" qsTypeId="urn:microsoft.com/office/officeart/2005/8/quickstyle/simple1" qsCatId="simple" csTypeId="urn:microsoft.com/office/officeart/2005/8/colors/accent3_2" csCatId="accent3" phldr="1"/>
+      <dgm:spPr/>
+      <dgm:t>
+        <a:bodyPr/>
+        <a:lstStyle/>
+        <a:p>
+          <a:endParaRPr lang="en-US"/>
+        </a:p>
+      </dgm:t>
+    </dgm:pt>
+    <dgm:pt modelId="{CEF04553-33BD-490D-827B-92CDD36DD082}">
+      <dgm:prSet/>
+      <dgm:spPr/>
+      <dgm:t>
+        <a:bodyPr/>
+        <a:lstStyle/>
+        <a:p>
+          <a:pPr>
+            <a:lnSpc>
+              <a:spcPct val="100000"/>
+            </a:lnSpc>
+          </a:pPr>
+          <a:r>
+            <a:rPr lang="en-US" dirty="0"/>
+            <a:t>Jeni – Clean up/Flask connection/Charts</a:t>
+          </a:r>
+        </a:p>
+      </dgm:t>
+    </dgm:pt>
+    <dgm:pt modelId="{A09AB217-180A-410F-9471-85CC9510E087}" type="parTrans" cxnId="{0811B91C-F3FF-4BA6-8C22-23F20CF8152D}">
+      <dgm:prSet/>
+      <dgm:spPr/>
+      <dgm:t>
+        <a:bodyPr/>
+        <a:lstStyle/>
+        <a:p>
+          <a:endParaRPr lang="en-US"/>
+        </a:p>
+      </dgm:t>
+    </dgm:pt>
+    <dgm:pt modelId="{3978BDBD-4E1C-4960-B133-9D1BBA849AB6}" type="sibTrans" cxnId="{0811B91C-F3FF-4BA6-8C22-23F20CF8152D}">
+      <dgm:prSet/>
+      <dgm:spPr/>
+      <dgm:t>
+        <a:bodyPr/>
+        <a:lstStyle/>
+        <a:p>
+          <a:endParaRPr lang="en-US"/>
+        </a:p>
+      </dgm:t>
+    </dgm:pt>
+    <dgm:pt modelId="{26AE1A82-6AE8-4C17-BF99-9B5BE49DE943}">
+      <dgm:prSet/>
+      <dgm:spPr/>
+      <dgm:t>
+        <a:bodyPr/>
+        <a:lstStyle/>
+        <a:p>
+          <a:pPr>
+            <a:lnSpc>
+              <a:spcPct val="100000"/>
+            </a:lnSpc>
+          </a:pPr>
+          <a:r>
+            <a:rPr lang="en-US" dirty="0"/>
+            <a:t>Allison – Java for table/Flask set up</a:t>
+          </a:r>
+        </a:p>
+      </dgm:t>
+    </dgm:pt>
+    <dgm:pt modelId="{D0A2CE73-B537-4658-B4EA-04F7EA60BA8A}" type="parTrans" cxnId="{6758F020-C819-450E-81AC-4A7563CD4D83}">
+      <dgm:prSet/>
+      <dgm:spPr/>
+      <dgm:t>
+        <a:bodyPr/>
+        <a:lstStyle/>
+        <a:p>
+          <a:endParaRPr lang="en-US"/>
+        </a:p>
+      </dgm:t>
+    </dgm:pt>
+    <dgm:pt modelId="{B3505980-7ECD-48AC-8F8D-2A6C13870A81}" type="sibTrans" cxnId="{6758F020-C819-450E-81AC-4A7563CD4D83}">
+      <dgm:prSet/>
+      <dgm:spPr/>
+      <dgm:t>
+        <a:bodyPr/>
+        <a:lstStyle/>
+        <a:p>
+          <a:endParaRPr lang="en-US"/>
+        </a:p>
+      </dgm:t>
+    </dgm:pt>
+    <dgm:pt modelId="{6DF9174E-15E7-4665-AFB0-1D5BC31DAE7A}">
+      <dgm:prSet/>
+      <dgm:spPr/>
+      <dgm:t>
+        <a:bodyPr/>
+        <a:lstStyle/>
+        <a:p>
+          <a:pPr>
+            <a:lnSpc>
+              <a:spcPct val="100000"/>
+            </a:lnSpc>
+          </a:pPr>
+          <a:r>
+            <a:rPr lang="en-US" dirty="0" err="1"/>
+            <a:t>Lenn</a:t>
+          </a:r>
+          <a:r>
+            <a:rPr lang="en-US" dirty="0"/>
+            <a:t> – Html design/Incorporating Anime </a:t>
+          </a:r>
+          <a:r>
+            <a:rPr lang="en-US" dirty="0" err="1"/>
+            <a:t>js</a:t>
+          </a:r>
+          <a:endParaRPr lang="en-US" dirty="0"/>
+        </a:p>
+      </dgm:t>
+    </dgm:pt>
+    <dgm:pt modelId="{950CBB3B-AF1D-4510-839B-3C68536CBAC9}" type="parTrans" cxnId="{85F89738-F4F4-45B2-9687-2B810BDCE243}">
+      <dgm:prSet/>
+      <dgm:spPr/>
+      <dgm:t>
+        <a:bodyPr/>
+        <a:lstStyle/>
+        <a:p>
+          <a:endParaRPr lang="en-US"/>
+        </a:p>
+      </dgm:t>
+    </dgm:pt>
+    <dgm:pt modelId="{0CE95A67-CE00-423B-9B92-22E22F56EC04}" type="sibTrans" cxnId="{85F89738-F4F4-45B2-9687-2B810BDCE243}">
+      <dgm:prSet/>
+      <dgm:spPr/>
+      <dgm:t>
+        <a:bodyPr/>
+        <a:lstStyle/>
+        <a:p>
+          <a:endParaRPr lang="en-US"/>
+        </a:p>
+      </dgm:t>
+    </dgm:pt>
+    <dgm:pt modelId="{EA5BF9C6-66B2-4F11-A1D4-66FFD936B7C8}" type="pres">
+      <dgm:prSet presAssocID="{EAB6B3E1-FC6F-4045-B7A5-E003D0B3E5FD}" presName="root" presStyleCnt="0">
+        <dgm:presLayoutVars>
+          <dgm:dir/>
+          <dgm:resizeHandles val="exact"/>
+        </dgm:presLayoutVars>
+      </dgm:prSet>
+      <dgm:spPr/>
+    </dgm:pt>
+    <dgm:pt modelId="{CC27E8B5-57C3-4B54-85FD-E6FFF5BF53E4}" type="pres">
+      <dgm:prSet presAssocID="{CEF04553-33BD-490D-827B-92CDD36DD082}" presName="compNode" presStyleCnt="0"/>
+      <dgm:spPr/>
+    </dgm:pt>
+    <dgm:pt modelId="{4A907126-A2CA-425C-AF0F-029F662155AA}" type="pres">
+      <dgm:prSet presAssocID="{CEF04553-33BD-490D-827B-92CDD36DD082}" presName="bgRect" presStyleLbl="bgShp" presStyleIdx="0" presStyleCnt="3"/>
+      <dgm:spPr/>
+    </dgm:pt>
+    <dgm:pt modelId="{296E88AA-81AD-4AF7-8842-3E467216F618}" type="pres">
+      <dgm:prSet presAssocID="{CEF04553-33BD-490D-827B-92CDD36DD082}" presName="iconRect" presStyleLbl="node1" presStyleIdx="0" presStyleCnt="3"/>
+      <dgm:spPr>
+        <a:blipFill>
+          <a:blip xmlns:r="http://schemas.openxmlformats.org/officeDocument/2006/relationships" r:embed="rId1">
+            <a:extLst>
+              <a:ext uri="{28A0092B-C50C-407E-A947-70E740481C1C}">
+                <a14:useLocalDpi xmlns:a14="http://schemas.microsoft.com/office/drawing/2010/main" val="0"/>
+              </a:ext>
+              <a:ext uri="{96DAC541-7B7A-43D3-8B79-37D633B846F1}">
+                <asvg:svgBlip xmlns:asvg="http://schemas.microsoft.com/office/drawing/2016/SVG/main" r:embed="rId2"/>
+              </a:ext>
+            </a:extLst>
+          </a:blip>
+          <a:stretch>
+            <a:fillRect/>
+          </a:stretch>
+        </a:blipFill>
+        <a:ln>
+          <a:noFill/>
+        </a:ln>
+      </dgm:spPr>
+      <dgm:extLst>
+        <a:ext uri="{E40237B7-FDA0-4F09-8148-C483321AD2D9}">
+          <dgm14:cNvPr xmlns:dgm14="http://schemas.microsoft.com/office/drawing/2010/diagram" id="0" name="" descr="Flask"/>
+        </a:ext>
+      </dgm:extLst>
+    </dgm:pt>
+    <dgm:pt modelId="{32EF15A6-18A1-43A4-AC27-1BDEB7B51F40}" type="pres">
+      <dgm:prSet presAssocID="{CEF04553-33BD-490D-827B-92CDD36DD082}" presName="spaceRect" presStyleCnt="0"/>
+      <dgm:spPr/>
+    </dgm:pt>
+    <dgm:pt modelId="{9C3D3724-B26E-4135-982E-E09DFC02CBB2}" type="pres">
+      <dgm:prSet presAssocID="{CEF04553-33BD-490D-827B-92CDD36DD082}" presName="parTx" presStyleLbl="revTx" presStyleIdx="0" presStyleCnt="3" custScaleX="108503">
+        <dgm:presLayoutVars>
+          <dgm:chMax val="0"/>
+          <dgm:chPref val="0"/>
+        </dgm:presLayoutVars>
+      </dgm:prSet>
+      <dgm:spPr/>
+    </dgm:pt>
+    <dgm:pt modelId="{D1F980E9-D6CB-488D-8C57-F5067BC39E50}" type="pres">
+      <dgm:prSet presAssocID="{3978BDBD-4E1C-4960-B133-9D1BBA849AB6}" presName="sibTrans" presStyleCnt="0"/>
+      <dgm:spPr/>
+    </dgm:pt>
+    <dgm:pt modelId="{E08F7039-F93F-451C-B0A9-A14C2F2BBE5E}" type="pres">
+      <dgm:prSet presAssocID="{26AE1A82-6AE8-4C17-BF99-9B5BE49DE943}" presName="compNode" presStyleCnt="0"/>
+      <dgm:spPr/>
+    </dgm:pt>
+    <dgm:pt modelId="{1C052A02-AD1E-4A07-82A5-6D182D275BC2}" type="pres">
+      <dgm:prSet presAssocID="{26AE1A82-6AE8-4C17-BF99-9B5BE49DE943}" presName="bgRect" presStyleLbl="bgShp" presStyleIdx="1" presStyleCnt="3"/>
+      <dgm:spPr/>
+    </dgm:pt>
+    <dgm:pt modelId="{75C54B5A-B6C1-4DB4-9C5A-D0125E6084A0}" type="pres">
+      <dgm:prSet presAssocID="{26AE1A82-6AE8-4C17-BF99-9B5BE49DE943}" presName="iconRect" presStyleLbl="node1" presStyleIdx="1" presStyleCnt="3"/>
+      <dgm:spPr>
+        <a:blipFill>
+          <a:blip xmlns:r="http://schemas.openxmlformats.org/officeDocument/2006/relationships" r:embed="rId3">
+            <a:extLst>
+              <a:ext uri="{28A0092B-C50C-407E-A947-70E740481C1C}">
+                <a14:useLocalDpi xmlns:a14="http://schemas.microsoft.com/office/drawing/2010/main" val="0"/>
+              </a:ext>
+              <a:ext uri="{96DAC541-7B7A-43D3-8B79-37D633B846F1}">
+                <asvg:svgBlip xmlns:asvg="http://schemas.microsoft.com/office/drawing/2016/SVG/main" r:embed="rId4"/>
+              </a:ext>
+            </a:extLst>
+          </a:blip>
+          <a:stretch>
+            <a:fillRect/>
+          </a:stretch>
+        </a:blipFill>
+        <a:ln>
+          <a:noFill/>
+        </a:ln>
+      </dgm:spPr>
+      <dgm:extLst>
+        <a:ext uri="{E40237B7-FDA0-4F09-8148-C483321AD2D9}">
+          <dgm14:cNvPr xmlns:dgm14="http://schemas.microsoft.com/office/drawing/2010/diagram" id="0" name="" descr="Scientist"/>
+        </a:ext>
+      </dgm:extLst>
+    </dgm:pt>
+    <dgm:pt modelId="{F7212059-E43C-46A8-87A3-65F9A830AE46}" type="pres">
+      <dgm:prSet presAssocID="{26AE1A82-6AE8-4C17-BF99-9B5BE49DE943}" presName="spaceRect" presStyleCnt="0"/>
+      <dgm:spPr/>
+    </dgm:pt>
+    <dgm:pt modelId="{177AEF78-C31B-46E7-8450-985BDAA525F8}" type="pres">
+      <dgm:prSet presAssocID="{26AE1A82-6AE8-4C17-BF99-9B5BE49DE943}" presName="parTx" presStyleLbl="revTx" presStyleIdx="1" presStyleCnt="3" custScaleX="106995">
+        <dgm:presLayoutVars>
+          <dgm:chMax val="0"/>
+          <dgm:chPref val="0"/>
+        </dgm:presLayoutVars>
+      </dgm:prSet>
+      <dgm:spPr/>
+    </dgm:pt>
+    <dgm:pt modelId="{4C1849FE-1DC4-4F25-B2B5-CE0A4421CAED}" type="pres">
+      <dgm:prSet presAssocID="{B3505980-7ECD-48AC-8F8D-2A6C13870A81}" presName="sibTrans" presStyleCnt="0"/>
+      <dgm:spPr/>
+    </dgm:pt>
+    <dgm:pt modelId="{55E0C6C4-58E3-4296-924D-4CFBBE977C95}" type="pres">
+      <dgm:prSet presAssocID="{6DF9174E-15E7-4665-AFB0-1D5BC31DAE7A}" presName="compNode" presStyleCnt="0"/>
+      <dgm:spPr/>
+    </dgm:pt>
+    <dgm:pt modelId="{9AED59AB-AACC-4AFE-920B-B76A856BEB87}" type="pres">
+      <dgm:prSet presAssocID="{6DF9174E-15E7-4665-AFB0-1D5BC31DAE7A}" presName="bgRect" presStyleLbl="bgShp" presStyleIdx="2" presStyleCnt="3"/>
+      <dgm:spPr/>
+    </dgm:pt>
+    <dgm:pt modelId="{CA0E6411-0528-45E6-A2EE-35C4C92AAED1}" type="pres">
+      <dgm:prSet presAssocID="{6DF9174E-15E7-4665-AFB0-1D5BC31DAE7A}" presName="iconRect" presStyleLbl="node1" presStyleIdx="2" presStyleCnt="3"/>
+      <dgm:spPr>
+        <a:blipFill>
+          <a:blip xmlns:r="http://schemas.openxmlformats.org/officeDocument/2006/relationships" r:embed="rId5">
+            <a:extLst>
+              <a:ext uri="{28A0092B-C50C-407E-A947-70E740481C1C}">
+                <a14:useLocalDpi xmlns:a14="http://schemas.microsoft.com/office/drawing/2010/main" val="0"/>
+              </a:ext>
+              <a:ext uri="{96DAC541-7B7A-43D3-8B79-37D633B846F1}">
+                <asvg:svgBlip xmlns:asvg="http://schemas.microsoft.com/office/drawing/2016/SVG/main" r:embed="rId6"/>
+              </a:ext>
+            </a:extLst>
+          </a:blip>
+          <a:stretch>
+            <a:fillRect/>
+          </a:stretch>
+        </a:blipFill>
+        <a:ln>
+          <a:noFill/>
+        </a:ln>
+      </dgm:spPr>
+      <dgm:extLst>
+        <a:ext uri="{E40237B7-FDA0-4F09-8148-C483321AD2D9}">
+          <dgm14:cNvPr xmlns:dgm14="http://schemas.microsoft.com/office/drawing/2010/diagram" id="0" name="" descr="Web Design"/>
+        </a:ext>
+      </dgm:extLst>
+    </dgm:pt>
+    <dgm:pt modelId="{D121E0F5-49BB-48A9-8C8B-FE609F7B717F}" type="pres">
+      <dgm:prSet presAssocID="{6DF9174E-15E7-4665-AFB0-1D5BC31DAE7A}" presName="spaceRect" presStyleCnt="0"/>
+      <dgm:spPr/>
+    </dgm:pt>
+    <dgm:pt modelId="{EC78EAE9-1A6D-491C-BB03-FA59FE1F5346}" type="pres">
+      <dgm:prSet presAssocID="{6DF9174E-15E7-4665-AFB0-1D5BC31DAE7A}" presName="parTx" presStyleLbl="revTx" presStyleIdx="2" presStyleCnt="3" custScaleX="105131">
+        <dgm:presLayoutVars>
+          <dgm:chMax val="0"/>
+          <dgm:chPref val="0"/>
+        </dgm:presLayoutVars>
+      </dgm:prSet>
+      <dgm:spPr/>
+    </dgm:pt>
+  </dgm:ptLst>
+  <dgm:cxnLst>
+    <dgm:cxn modelId="{B03CFB01-7450-44AD-B2E5-2960706706B9}" type="presOf" srcId="{6DF9174E-15E7-4665-AFB0-1D5BC31DAE7A}" destId="{EC78EAE9-1A6D-491C-BB03-FA59FE1F5346}" srcOrd="0" destOrd="0" presId="urn:microsoft.com/office/officeart/2018/2/layout/IconVerticalSolidList"/>
+    <dgm:cxn modelId="{0811B91C-F3FF-4BA6-8C22-23F20CF8152D}" srcId="{EAB6B3E1-FC6F-4045-B7A5-E003D0B3E5FD}" destId="{CEF04553-33BD-490D-827B-92CDD36DD082}" srcOrd="0" destOrd="0" parTransId="{A09AB217-180A-410F-9471-85CC9510E087}" sibTransId="{3978BDBD-4E1C-4960-B133-9D1BBA849AB6}"/>
+    <dgm:cxn modelId="{6758F020-C819-450E-81AC-4A7563CD4D83}" srcId="{EAB6B3E1-FC6F-4045-B7A5-E003D0B3E5FD}" destId="{26AE1A82-6AE8-4C17-BF99-9B5BE49DE943}" srcOrd="1" destOrd="0" parTransId="{D0A2CE73-B537-4658-B4EA-04F7EA60BA8A}" sibTransId="{B3505980-7ECD-48AC-8F8D-2A6C13870A81}"/>
+    <dgm:cxn modelId="{85F89738-F4F4-45B2-9687-2B810BDCE243}" srcId="{EAB6B3E1-FC6F-4045-B7A5-E003D0B3E5FD}" destId="{6DF9174E-15E7-4665-AFB0-1D5BC31DAE7A}" srcOrd="2" destOrd="0" parTransId="{950CBB3B-AF1D-4510-839B-3C68536CBAC9}" sibTransId="{0CE95A67-CE00-423B-9B92-22E22F56EC04}"/>
+    <dgm:cxn modelId="{BAD9F23A-19AF-4F63-BCBF-9F0AF233F7F0}" type="presOf" srcId="{26AE1A82-6AE8-4C17-BF99-9B5BE49DE943}" destId="{177AEF78-C31B-46E7-8450-985BDAA525F8}" srcOrd="0" destOrd="0" presId="urn:microsoft.com/office/officeart/2018/2/layout/IconVerticalSolidList"/>
+    <dgm:cxn modelId="{9DDB3E60-3306-4413-AD88-C508FBB76805}" type="presOf" srcId="{CEF04553-33BD-490D-827B-92CDD36DD082}" destId="{9C3D3724-B26E-4135-982E-E09DFC02CBB2}" srcOrd="0" destOrd="0" presId="urn:microsoft.com/office/officeart/2018/2/layout/IconVerticalSolidList"/>
+    <dgm:cxn modelId="{89D87EC6-9BF8-442E-9DA6-AC72E83CFE8E}" type="presOf" srcId="{EAB6B3E1-FC6F-4045-B7A5-E003D0B3E5FD}" destId="{EA5BF9C6-66B2-4F11-A1D4-66FFD936B7C8}" srcOrd="0" destOrd="0" presId="urn:microsoft.com/office/officeart/2018/2/layout/IconVerticalSolidList"/>
+    <dgm:cxn modelId="{433D5157-8A5C-4D48-AC83-F784BF4728B1}" type="presParOf" srcId="{EA5BF9C6-66B2-4F11-A1D4-66FFD936B7C8}" destId="{CC27E8B5-57C3-4B54-85FD-E6FFF5BF53E4}" srcOrd="0" destOrd="0" presId="urn:microsoft.com/office/officeart/2018/2/layout/IconVerticalSolidList"/>
+    <dgm:cxn modelId="{4201FC0A-7000-4F14-BBEC-07E836EC9241}" type="presParOf" srcId="{CC27E8B5-57C3-4B54-85FD-E6FFF5BF53E4}" destId="{4A907126-A2CA-425C-AF0F-029F662155AA}" srcOrd="0" destOrd="0" presId="urn:microsoft.com/office/officeart/2018/2/layout/IconVerticalSolidList"/>
+    <dgm:cxn modelId="{51324439-EBF8-4402-9C11-7022871832A2}" type="presParOf" srcId="{CC27E8B5-57C3-4B54-85FD-E6FFF5BF53E4}" destId="{296E88AA-81AD-4AF7-8842-3E467216F618}" srcOrd="1" destOrd="0" presId="urn:microsoft.com/office/officeart/2018/2/layout/IconVerticalSolidList"/>
+    <dgm:cxn modelId="{7BA6F284-BDC6-49F8-B6A9-F740E022ADE1}" type="presParOf" srcId="{CC27E8B5-57C3-4B54-85FD-E6FFF5BF53E4}" destId="{32EF15A6-18A1-43A4-AC27-1BDEB7B51F40}" srcOrd="2" destOrd="0" presId="urn:microsoft.com/office/officeart/2018/2/layout/IconVerticalSolidList"/>
+    <dgm:cxn modelId="{78343F4F-C3EB-48B9-8A05-F9CE32D510DB}" type="presParOf" srcId="{CC27E8B5-57C3-4B54-85FD-E6FFF5BF53E4}" destId="{9C3D3724-B26E-4135-982E-E09DFC02CBB2}" srcOrd="3" destOrd="0" presId="urn:microsoft.com/office/officeart/2018/2/layout/IconVerticalSolidList"/>
+    <dgm:cxn modelId="{C8C58E26-EBA6-4CFE-96EB-5348E7C91ACD}" type="presParOf" srcId="{EA5BF9C6-66B2-4F11-A1D4-66FFD936B7C8}" destId="{D1F980E9-D6CB-488D-8C57-F5067BC39E50}" srcOrd="1" destOrd="0" presId="urn:microsoft.com/office/officeart/2018/2/layout/IconVerticalSolidList"/>
+    <dgm:cxn modelId="{0CCC0FE4-7224-4A56-BB6D-5EEAF140F880}" type="presParOf" srcId="{EA5BF9C6-66B2-4F11-A1D4-66FFD936B7C8}" destId="{E08F7039-F93F-451C-B0A9-A14C2F2BBE5E}" srcOrd="2" destOrd="0" presId="urn:microsoft.com/office/officeart/2018/2/layout/IconVerticalSolidList"/>
+    <dgm:cxn modelId="{5A521B47-F803-475C-AC7D-B23DADCEB463}" type="presParOf" srcId="{E08F7039-F93F-451C-B0A9-A14C2F2BBE5E}" destId="{1C052A02-AD1E-4A07-82A5-6D182D275BC2}" srcOrd="0" destOrd="0" presId="urn:microsoft.com/office/officeart/2018/2/layout/IconVerticalSolidList"/>
+    <dgm:cxn modelId="{5737D82B-DD46-455A-943B-DD57C29A5865}" type="presParOf" srcId="{E08F7039-F93F-451C-B0A9-A14C2F2BBE5E}" destId="{75C54B5A-B6C1-4DB4-9C5A-D0125E6084A0}" srcOrd="1" destOrd="0" presId="urn:microsoft.com/office/officeart/2018/2/layout/IconVerticalSolidList"/>
+    <dgm:cxn modelId="{364E7BDE-A45F-41AD-82D9-5F24E0755081}" type="presParOf" srcId="{E08F7039-F93F-451C-B0A9-A14C2F2BBE5E}" destId="{F7212059-E43C-46A8-87A3-65F9A830AE46}" srcOrd="2" destOrd="0" presId="urn:microsoft.com/office/officeart/2018/2/layout/IconVerticalSolidList"/>
+    <dgm:cxn modelId="{AB287C18-D68B-479D-8B08-13DCBAC02629}" type="presParOf" srcId="{E08F7039-F93F-451C-B0A9-A14C2F2BBE5E}" destId="{177AEF78-C31B-46E7-8450-985BDAA525F8}" srcOrd="3" destOrd="0" presId="urn:microsoft.com/office/officeart/2018/2/layout/IconVerticalSolidList"/>
+    <dgm:cxn modelId="{96BE6670-22FF-4D09-9E91-EBF8A5C7A6A7}" type="presParOf" srcId="{EA5BF9C6-66B2-4F11-A1D4-66FFD936B7C8}" destId="{4C1849FE-1DC4-4F25-B2B5-CE0A4421CAED}" srcOrd="3" destOrd="0" presId="urn:microsoft.com/office/officeart/2018/2/layout/IconVerticalSolidList"/>
+    <dgm:cxn modelId="{DE1FE895-033C-4E18-B80E-8EB1045E70D0}" type="presParOf" srcId="{EA5BF9C6-66B2-4F11-A1D4-66FFD936B7C8}" destId="{55E0C6C4-58E3-4296-924D-4CFBBE977C95}" srcOrd="4" destOrd="0" presId="urn:microsoft.com/office/officeart/2018/2/layout/IconVerticalSolidList"/>
+    <dgm:cxn modelId="{23BA98BD-AEF2-4596-8270-C4D59DD00355}" type="presParOf" srcId="{55E0C6C4-58E3-4296-924D-4CFBBE977C95}" destId="{9AED59AB-AACC-4AFE-920B-B76A856BEB87}" srcOrd="0" destOrd="0" presId="urn:microsoft.com/office/officeart/2018/2/layout/IconVerticalSolidList"/>
+    <dgm:cxn modelId="{3F104113-24D5-4519-9613-16790B51132E}" type="presParOf" srcId="{55E0C6C4-58E3-4296-924D-4CFBBE977C95}" destId="{CA0E6411-0528-45E6-A2EE-35C4C92AAED1}" srcOrd="1" destOrd="0" presId="urn:microsoft.com/office/officeart/2018/2/layout/IconVerticalSolidList"/>
+    <dgm:cxn modelId="{F8A14184-A3F6-4D98-BD3D-FB07755A1F42}" type="presParOf" srcId="{55E0C6C4-58E3-4296-924D-4CFBBE977C95}" destId="{D121E0F5-49BB-48A9-8C8B-FE609F7B717F}" srcOrd="2" destOrd="0" presId="urn:microsoft.com/office/officeart/2018/2/layout/IconVerticalSolidList"/>
+    <dgm:cxn modelId="{A5BA3B5A-6E62-47EF-9FEF-57780F250021}" type="presParOf" srcId="{55E0C6C4-58E3-4296-924D-4CFBBE977C95}" destId="{EC78EAE9-1A6D-491C-BB03-FA59FE1F5346}" srcOrd="3" destOrd="0" presId="urn:microsoft.com/office/officeart/2018/2/layout/IconVerticalSolidList"/>
+  </dgm:cxnLst>
+  <dgm:bg/>
+  <dgm:whole/>
+  <dgm:extLst>
+    <a:ext uri="http://schemas.microsoft.com/office/drawing/2008/diagram">
+      <dsp:dataModelExt xmlns:dsp="http://schemas.microsoft.com/office/drawing/2008/diagram" relId="rId6" minVer="http://schemas.openxmlformats.org/drawingml/2006/diagram"/>
+    </a:ext>
+  </dgm:extLst>
+</dgm:dataModel>
+</file>
+
 <file path=ppt/diagrams/drawing1.xml><?xml version="1.0" encoding="utf-8"?>
 <dsp:drawing xmlns:dgm="http://schemas.openxmlformats.org/drawingml/2006/diagram" xmlns:dsp="http://schemas.microsoft.com/office/drawing/2008/diagram" xmlns:a="http://schemas.openxmlformats.org/drawingml/2006/main">
   <dsp:spTree>
@@ -1864,7 +2496,7 @@
       </dsp:nvSpPr>
       <dsp:spPr>
         <a:xfrm>
-          <a:off x="616949" y="310305"/>
+          <a:off x="616949" y="581984"/>
           <a:ext cx="1818562" cy="1818562"/>
         </a:xfrm>
         <a:prstGeom prst="ellipse">
@@ -1881,7 +2513,13 @@
         <a:ln>
           <a:noFill/>
         </a:ln>
-        <a:effectLst/>
+        <a:effectLst>
+          <a:outerShdw blurRad="38100" dist="12700" dir="5400000" algn="ctr" rotWithShape="0">
+            <a:srgbClr val="000000">
+              <a:alpha val="63000"/>
+            </a:srgbClr>
+          </a:outerShdw>
+        </a:effectLst>
       </dsp:spPr>
       <dsp:style>
         <a:lnRef idx="0">
@@ -1890,7 +2528,7 @@
         <a:fillRef idx="1">
           <a:scrgbClr r="0" g="0" b="0"/>
         </a:fillRef>
-        <a:effectRef idx="0">
+        <a:effectRef idx="2">
           <a:scrgbClr r="0" g="0" b="0"/>
         </a:effectRef>
         <a:fontRef idx="minor"/>
@@ -1903,7 +2541,7 @@
       </dsp:nvSpPr>
       <dsp:spPr>
         <a:xfrm>
-          <a:off x="1004512" y="697868"/>
+          <a:off x="1004512" y="969547"/>
           <a:ext cx="1043437" cy="1043437"/>
         </a:xfrm>
         <a:prstGeom prst="rect">
@@ -1925,20 +2563,25 @@
             <a:fillRect/>
           </a:stretch>
         </a:blipFill>
-        <a:ln w="12700" cap="flat" cmpd="sng" algn="ctr">
+        <a:ln>
           <a:noFill/>
-          <a:prstDash val="solid"/>
         </a:ln>
-        <a:effectLst/>
+        <a:effectLst>
+          <a:outerShdw blurRad="38100" dist="12700" dir="5400000" algn="ctr" rotWithShape="0">
+            <a:srgbClr val="000000">
+              <a:alpha val="63000"/>
+            </a:srgbClr>
+          </a:outerShdw>
+        </a:effectLst>
       </dsp:spPr>
       <dsp:style>
-        <a:lnRef idx="2">
+        <a:lnRef idx="0">
           <a:scrgbClr r="0" g="0" b="0"/>
         </a:lnRef>
-        <a:fillRef idx="1">
+        <a:fillRef idx="3">
           <a:scrgbClr r="0" g="0" b="0"/>
         </a:fillRef>
-        <a:effectRef idx="0">
+        <a:effectRef idx="2">
           <a:scrgbClr r="0" g="0" b="0"/>
         </a:effectRef>
         <a:fontRef idx="minor">
@@ -1953,7 +2596,168 @@
       </dsp:nvSpPr>
       <dsp:spPr>
         <a:xfrm>
-          <a:off x="35606" y="2695306"/>
+          <a:off x="35606" y="2929689"/>
+          <a:ext cx="2981250" cy="794592"/>
+        </a:xfrm>
+        <a:prstGeom prst="rect">
+          <a:avLst/>
+        </a:prstGeom>
+        <a:noFill/>
+        <a:ln>
+          <a:noFill/>
+        </a:ln>
+        <a:effectLst/>
+      </dsp:spPr>
+      <dsp:style>
+        <a:lnRef idx="0">
+          <a:scrgbClr r="0" g="0" b="0"/>
+        </a:lnRef>
+        <a:fillRef idx="0">
+          <a:scrgbClr r="0" g="0" b="0"/>
+        </a:fillRef>
+        <a:effectRef idx="0">
+          <a:scrgbClr r="0" g="0" b="0"/>
+        </a:effectRef>
+        <a:fontRef idx="minor"/>
+      </dsp:style>
+      <dsp:txBody>
+        <a:bodyPr spcFirstLastPara="0" vert="horz" wrap="square" lIns="0" tIns="0" rIns="0" bIns="0" numCol="1" spcCol="1270" anchor="t" anchorCtr="0">
+          <a:noAutofit/>
+        </a:bodyPr>
+        <a:lstStyle/>
+        <a:p>
+          <a:pPr marL="0" lvl="0" indent="0" algn="ctr" defTabSz="1022350">
+            <a:lnSpc>
+              <a:spcPct val="100000"/>
+            </a:lnSpc>
+            <a:spcBef>
+              <a:spcPct val="0"/>
+            </a:spcBef>
+            <a:spcAft>
+              <a:spcPct val="35000"/>
+            </a:spcAft>
+            <a:buNone/>
+            <a:defRPr cap="all"/>
+          </a:pPr>
+          <a:r>
+            <a:rPr lang="en-US" sz="2300" kern="1200" dirty="0"/>
+            <a:t>    The Goal	</a:t>
+          </a:r>
+        </a:p>
+      </dsp:txBody>
+      <dsp:txXfrm>
+        <a:off x="35606" y="2929689"/>
+        <a:ext cx="2981250" cy="794592"/>
+      </dsp:txXfrm>
+    </dsp:sp>
+    <dsp:sp modelId="{BCD8CDD9-0C56-4401-ADB1-8B48DAB2C96F}">
+      <dsp:nvSpPr>
+        <dsp:cNvPr id="0" name=""/>
+        <dsp:cNvSpPr/>
+      </dsp:nvSpPr>
+      <dsp:spPr>
+        <a:xfrm>
+          <a:off x="4119918" y="600632"/>
+          <a:ext cx="1818562" cy="1818562"/>
+        </a:xfrm>
+        <a:prstGeom prst="ellipse">
+          <a:avLst/>
+        </a:prstGeom>
+        <a:solidFill>
+          <a:schemeClr val="accent3">
+            <a:hueOff val="0"/>
+            <a:satOff val="0"/>
+            <a:lumOff val="0"/>
+            <a:alphaOff val="0"/>
+          </a:schemeClr>
+        </a:solidFill>
+        <a:ln>
+          <a:noFill/>
+        </a:ln>
+        <a:effectLst>
+          <a:outerShdw blurRad="38100" dist="12700" dir="5400000" algn="ctr" rotWithShape="0">
+            <a:srgbClr val="000000">
+              <a:alpha val="63000"/>
+            </a:srgbClr>
+          </a:outerShdw>
+        </a:effectLst>
+      </dsp:spPr>
+      <dsp:style>
+        <a:lnRef idx="0">
+          <a:scrgbClr r="0" g="0" b="0"/>
+        </a:lnRef>
+        <a:fillRef idx="1">
+          <a:scrgbClr r="0" g="0" b="0"/>
+        </a:fillRef>
+        <a:effectRef idx="2">
+          <a:scrgbClr r="0" g="0" b="0"/>
+        </a:effectRef>
+        <a:fontRef idx="minor"/>
+      </dsp:style>
+    </dsp:sp>
+    <dsp:sp modelId="{DB4CA7C4-FCA1-4127-B20A-2A5C031A3CF4}">
+      <dsp:nvSpPr>
+        <dsp:cNvPr id="0" name=""/>
+        <dsp:cNvSpPr/>
+      </dsp:nvSpPr>
+      <dsp:spPr>
+        <a:xfrm>
+          <a:off x="4507481" y="988195"/>
+          <a:ext cx="1043437" cy="1043437"/>
+        </a:xfrm>
+        <a:prstGeom prst="rect">
+          <a:avLst/>
+        </a:prstGeom>
+        <a:blipFill>
+          <a:blip xmlns:r="http://schemas.openxmlformats.org/officeDocument/2006/relationships" r:embed="rId3">
+            <a:extLst>
+              <a:ext uri="{28A0092B-C50C-407E-A947-70E740481C1C}">
+                <a14:useLocalDpi xmlns:a14="http://schemas.microsoft.com/office/drawing/2010/main" val="0"/>
+              </a:ext>
+              <a:ext uri="{96DAC541-7B7A-43D3-8B79-37D633B846F1}">
+                <asvg:svgBlip xmlns:asvg="http://schemas.microsoft.com/office/drawing/2016/SVG/main" r:embed="rId4"/>
+              </a:ext>
+            </a:extLst>
+          </a:blip>
+          <a:srcRect/>
+          <a:stretch>
+            <a:fillRect/>
+          </a:stretch>
+        </a:blipFill>
+        <a:ln>
+          <a:noFill/>
+        </a:ln>
+        <a:effectLst>
+          <a:outerShdw blurRad="38100" dist="12700" dir="5400000" algn="ctr" rotWithShape="0">
+            <a:srgbClr val="000000">
+              <a:alpha val="63000"/>
+            </a:srgbClr>
+          </a:outerShdw>
+        </a:effectLst>
+      </dsp:spPr>
+      <dsp:style>
+        <a:lnRef idx="0">
+          <a:scrgbClr r="0" g="0" b="0"/>
+        </a:lnRef>
+        <a:fillRef idx="3">
+          <a:scrgbClr r="0" g="0" b="0"/>
+        </a:fillRef>
+        <a:effectRef idx="2">
+          <a:scrgbClr r="0" g="0" b="0"/>
+        </a:effectRef>
+        <a:fontRef idx="minor">
+          <a:schemeClr val="lt1"/>
+        </a:fontRef>
+      </dsp:style>
+    </dsp:sp>
+    <dsp:sp modelId="{7E6FE37A-5DB0-4899-9FCB-0CE39BC185F8}">
+      <dsp:nvSpPr>
+        <dsp:cNvPr id="0" name=""/>
+        <dsp:cNvSpPr/>
+      </dsp:nvSpPr>
+      <dsp:spPr>
+        <a:xfrm>
+          <a:off x="3538574" y="2985633"/>
           <a:ext cx="2981250" cy="720000"/>
         </a:xfrm>
         <a:prstGeom prst="rect">
@@ -1983,7 +2787,7 @@
         </a:bodyPr>
         <a:lstStyle/>
         <a:p>
-          <a:pPr marL="0" lvl="0" indent="0" algn="ctr" defTabSz="889000">
+          <a:pPr marL="0" lvl="0" indent="0" algn="ctr" defTabSz="1022350">
             <a:lnSpc>
               <a:spcPct val="100000"/>
             </a:lnSpc>
@@ -1997,31 +2801,31 @@
             <a:defRPr cap="all"/>
           </a:pPr>
           <a:r>
-            <a:rPr lang="en-US" sz="2000" kern="1200" dirty="0"/>
-            <a:t>What we were trying to accomplish	</a:t>
+            <a:rPr lang="en-US" sz="2300" kern="1200" dirty="0"/>
+            <a:t>App/Visualization review &amp; learning</a:t>
           </a:r>
         </a:p>
       </dsp:txBody>
       <dsp:txXfrm>
-        <a:off x="35606" y="2695306"/>
+        <a:off x="3538574" y="2985633"/>
         <a:ext cx="2981250" cy="720000"/>
       </dsp:txXfrm>
     </dsp:sp>
-    <dsp:sp modelId="{BCD8CDD9-0C56-4401-ADB1-8B48DAB2C96F}">
+    <dsp:sp modelId="{FF93E135-77D6-48A0-8871-9BC93D705D06}">
       <dsp:nvSpPr>
         <dsp:cNvPr id="0" name=""/>
         <dsp:cNvSpPr/>
       </dsp:nvSpPr>
       <dsp:spPr>
         <a:xfrm>
-          <a:off x="4119918" y="310305"/>
+          <a:off x="7622887" y="600632"/>
           <a:ext cx="1818562" cy="1818562"/>
         </a:xfrm>
         <a:prstGeom prst="ellipse">
           <a:avLst/>
         </a:prstGeom>
         <a:solidFill>
-          <a:schemeClr val="accent3">
+          <a:schemeClr val="accent4">
             <a:hueOff val="0"/>
             <a:satOff val="0"/>
             <a:lumOff val="0"/>
@@ -2031,7 +2835,13 @@
         <a:ln>
           <a:noFill/>
         </a:ln>
-        <a:effectLst/>
+        <a:effectLst>
+          <a:outerShdw blurRad="38100" dist="12700" dir="5400000" algn="ctr" rotWithShape="0">
+            <a:srgbClr val="000000">
+              <a:alpha val="63000"/>
+            </a:srgbClr>
+          </a:outerShdw>
+        </a:effectLst>
       </dsp:spPr>
       <dsp:style>
         <a:lnRef idx="0">
@@ -2040,33 +2850,33 @@
         <a:fillRef idx="1">
           <a:scrgbClr r="0" g="0" b="0"/>
         </a:fillRef>
-        <a:effectRef idx="0">
+        <a:effectRef idx="2">
           <a:scrgbClr r="0" g="0" b="0"/>
         </a:effectRef>
         <a:fontRef idx="minor"/>
       </dsp:style>
     </dsp:sp>
-    <dsp:sp modelId="{DB4CA7C4-FCA1-4127-B20A-2A5C031A3CF4}">
+    <dsp:sp modelId="{39509775-983E-4110-B989-EE2CD6514BE0}">
       <dsp:nvSpPr>
         <dsp:cNvPr id="0" name=""/>
         <dsp:cNvSpPr/>
       </dsp:nvSpPr>
       <dsp:spPr>
         <a:xfrm>
-          <a:off x="4507481" y="697868"/>
+          <a:off x="8010450" y="988195"/>
           <a:ext cx="1043437" cy="1043437"/>
         </a:xfrm>
         <a:prstGeom prst="rect">
           <a:avLst/>
         </a:prstGeom>
         <a:blipFill>
-          <a:blip xmlns:r="http://schemas.openxmlformats.org/officeDocument/2006/relationships" r:embed="rId3">
+          <a:blip xmlns:r="http://schemas.openxmlformats.org/officeDocument/2006/relationships" r:embed="rId5">
             <a:extLst>
               <a:ext uri="{28A0092B-C50C-407E-A947-70E740481C1C}">
                 <a14:useLocalDpi xmlns:a14="http://schemas.microsoft.com/office/drawing/2010/main" val="0"/>
               </a:ext>
               <a:ext uri="{96DAC541-7B7A-43D3-8B79-37D633B846F1}">
-                <asvg:svgBlip xmlns:asvg="http://schemas.microsoft.com/office/drawing/2016/SVG/main" r:embed="rId4"/>
+                <asvg:svgBlip xmlns:asvg="http://schemas.microsoft.com/office/drawing/2016/SVG/main" r:embed="rId6"/>
               </a:ext>
             </a:extLst>
           </a:blip>
@@ -2075,20 +2885,25 @@
             <a:fillRect/>
           </a:stretch>
         </a:blipFill>
-        <a:ln w="12700" cap="flat" cmpd="sng" algn="ctr">
+        <a:ln>
           <a:noFill/>
-          <a:prstDash val="solid"/>
         </a:ln>
-        <a:effectLst/>
+        <a:effectLst>
+          <a:outerShdw blurRad="38100" dist="12700" dir="5400000" algn="ctr" rotWithShape="0">
+            <a:srgbClr val="000000">
+              <a:alpha val="63000"/>
+            </a:srgbClr>
+          </a:outerShdw>
+        </a:effectLst>
       </dsp:spPr>
       <dsp:style>
-        <a:lnRef idx="2">
+        <a:lnRef idx="0">
           <a:scrgbClr r="0" g="0" b="0"/>
         </a:lnRef>
-        <a:fillRef idx="1">
+        <a:fillRef idx="3">
           <a:scrgbClr r="0" g="0" b="0"/>
         </a:fillRef>
-        <a:effectRef idx="0">
+        <a:effectRef idx="2">
           <a:scrgbClr r="0" g="0" b="0"/>
         </a:effectRef>
         <a:fontRef idx="minor">
@@ -2096,14 +2911,14 @@
         </a:fontRef>
       </dsp:style>
     </dsp:sp>
-    <dsp:sp modelId="{7E6FE37A-5DB0-4899-9FCB-0CE39BC185F8}">
+    <dsp:sp modelId="{1AEDC777-00B3-41D7-9AE1-23D741E941C3}">
       <dsp:nvSpPr>
         <dsp:cNvPr id="0" name=""/>
         <dsp:cNvSpPr/>
       </dsp:nvSpPr>
       <dsp:spPr>
         <a:xfrm>
-          <a:off x="3538574" y="2695306"/>
+          <a:off x="7041543" y="2985633"/>
           <a:ext cx="2981250" cy="720000"/>
         </a:xfrm>
         <a:prstGeom prst="rect">
@@ -2133,7 +2948,7 @@
         </a:bodyPr>
         <a:lstStyle/>
         <a:p>
-          <a:pPr marL="0" lvl="0" indent="0" algn="ctr" defTabSz="889000">
+          <a:pPr marL="0" lvl="0" indent="0" algn="ctr" defTabSz="1022350">
             <a:lnSpc>
               <a:spcPct val="100000"/>
             </a:lnSpc>
@@ -2147,31 +2962,46 @@
             <a:defRPr cap="all"/>
           </a:pPr>
           <a:r>
-            <a:rPr lang="en-US" sz="2000" kern="1200" dirty="0"/>
-            <a:t>App/Visualization review &amp; learning</a:t>
+            <a:rPr lang="en-US" sz="2300" kern="1200" dirty="0"/>
+            <a:t>If timed allowed and Questions</a:t>
           </a:r>
         </a:p>
       </dsp:txBody>
       <dsp:txXfrm>
-        <a:off x="3538574" y="2695306"/>
+        <a:off x="7041543" y="2985633"/>
         <a:ext cx="2981250" cy="720000"/>
       </dsp:txXfrm>
     </dsp:sp>
-    <dsp:sp modelId="{FF93E135-77D6-48A0-8871-9BC93D705D06}">
+  </dsp:spTree>
+</dsp:drawing>
+</file>
+
+<file path=ppt/diagrams/drawing2.xml><?xml version="1.0" encoding="utf-8"?>
+<dsp:drawing xmlns:dgm="http://schemas.openxmlformats.org/drawingml/2006/diagram" xmlns:dsp="http://schemas.microsoft.com/office/drawing/2008/diagram" xmlns:a="http://schemas.openxmlformats.org/drawingml/2006/main">
+  <dsp:spTree>
+    <dsp:nvGrpSpPr>
+      <dsp:cNvPr id="0" name=""/>
+      <dsp:cNvGrpSpPr/>
+    </dsp:nvGrpSpPr>
+    <dsp:grpSpPr/>
+    <dsp:sp modelId="{4A907126-A2CA-425C-AF0F-029F662155AA}">
       <dsp:nvSpPr>
         <dsp:cNvPr id="0" name=""/>
         <dsp:cNvSpPr/>
       </dsp:nvSpPr>
       <dsp:spPr>
         <a:xfrm>
-          <a:off x="7622887" y="310305"/>
-          <a:ext cx="1818562" cy="1818562"/>
+          <a:off x="-193141" y="6102"/>
+          <a:ext cx="10412896" cy="1096405"/>
         </a:xfrm>
-        <a:prstGeom prst="ellipse">
-          <a:avLst/>
+        <a:prstGeom prst="roundRect">
+          <a:avLst>
+            <a:gd name="adj" fmla="val 10000"/>
+          </a:avLst>
         </a:prstGeom>
         <a:solidFill>
-          <a:schemeClr val="accent4">
+          <a:schemeClr val="accent3">
+            <a:tint val="40000"/>
             <a:hueOff val="0"/>
             <a:satOff val="0"/>
             <a:lumOff val="0"/>
@@ -2196,31 +3026,30 @@
         <a:fontRef idx="minor"/>
       </dsp:style>
     </dsp:sp>
-    <dsp:sp modelId="{39509775-983E-4110-B989-EE2CD6514BE0}">
+    <dsp:sp modelId="{296E88AA-81AD-4AF7-8842-3E467216F618}">
       <dsp:nvSpPr>
         <dsp:cNvPr id="0" name=""/>
         <dsp:cNvSpPr/>
       </dsp:nvSpPr>
       <dsp:spPr>
         <a:xfrm>
-          <a:off x="8010450" y="697868"/>
-          <a:ext cx="1043437" cy="1043437"/>
+          <a:off x="138521" y="252793"/>
+          <a:ext cx="603023" cy="603023"/>
         </a:xfrm>
         <a:prstGeom prst="rect">
           <a:avLst/>
         </a:prstGeom>
         <a:blipFill>
-          <a:blip xmlns:r="http://schemas.openxmlformats.org/officeDocument/2006/relationships" r:embed="rId5">
+          <a:blip xmlns:r="http://schemas.openxmlformats.org/officeDocument/2006/relationships" r:embed="rId1">
             <a:extLst>
               <a:ext uri="{28A0092B-C50C-407E-A947-70E740481C1C}">
                 <a14:useLocalDpi xmlns:a14="http://schemas.microsoft.com/office/drawing/2010/main" val="0"/>
               </a:ext>
               <a:ext uri="{96DAC541-7B7A-43D3-8B79-37D633B846F1}">
-                <asvg:svgBlip xmlns:asvg="http://schemas.microsoft.com/office/drawing/2016/SVG/main" r:embed="rId6"/>
+                <asvg:svgBlip xmlns:asvg="http://schemas.microsoft.com/office/drawing/2016/SVG/main" r:embed="rId2"/>
               </a:ext>
             </a:extLst>
           </a:blip>
-          <a:srcRect/>
           <a:stretch>
             <a:fillRect/>
           </a:stretch>
@@ -2246,15 +3075,15 @@
         </a:fontRef>
       </dsp:style>
     </dsp:sp>
-    <dsp:sp modelId="{1AEDC777-00B3-41D7-9AE1-23D741E941C3}">
+    <dsp:sp modelId="{9C3D3724-B26E-4135-982E-E09DFC02CBB2}">
       <dsp:nvSpPr>
         <dsp:cNvPr id="0" name=""/>
         <dsp:cNvSpPr/>
       </dsp:nvSpPr>
       <dsp:spPr>
         <a:xfrm>
-          <a:off x="7041543" y="2695306"/>
-          <a:ext cx="2981250" cy="720000"/>
+          <a:off x="684446" y="6102"/>
+          <a:ext cx="9921590" cy="1096405"/>
         </a:xfrm>
         <a:prstGeom prst="rect">
           <a:avLst/>
@@ -2278,12 +3107,12 @@
         <a:fontRef idx="minor"/>
       </dsp:style>
       <dsp:txBody>
-        <a:bodyPr spcFirstLastPara="0" vert="horz" wrap="square" lIns="0" tIns="0" rIns="0" bIns="0" numCol="1" spcCol="1270" anchor="t" anchorCtr="0">
+        <a:bodyPr spcFirstLastPara="0" vert="horz" wrap="square" lIns="116036" tIns="116036" rIns="116036" bIns="116036" numCol="1" spcCol="1270" anchor="ctr" anchorCtr="0">
           <a:noAutofit/>
         </a:bodyPr>
         <a:lstStyle/>
         <a:p>
-          <a:pPr marL="0" lvl="0" indent="0" algn="ctr" defTabSz="889000">
+          <a:pPr marL="0" lvl="0" indent="0" algn="l" defTabSz="1111250">
             <a:lnSpc>
               <a:spcPct val="100000"/>
             </a:lnSpc>
@@ -2294,17 +3123,327 @@
               <a:spcPct val="35000"/>
             </a:spcAft>
             <a:buNone/>
-            <a:defRPr cap="all"/>
           </a:pPr>
           <a:r>
-            <a:rPr lang="en-US" sz="2000" kern="1200" dirty="0"/>
-            <a:t>If timed allowed and Questions</a:t>
+            <a:rPr lang="en-US" sz="2500" kern="1200" dirty="0"/>
+            <a:t>Jeni – Clean up/Flask connection/Charts</a:t>
           </a:r>
         </a:p>
       </dsp:txBody>
       <dsp:txXfrm>
-        <a:off x="7041543" y="2695306"/>
-        <a:ext cx="2981250" cy="720000"/>
+        <a:off x="684446" y="6102"/>
+        <a:ext cx="9921590" cy="1096405"/>
+      </dsp:txXfrm>
+    </dsp:sp>
+    <dsp:sp modelId="{1C052A02-AD1E-4A07-82A5-6D182D275BC2}">
+      <dsp:nvSpPr>
+        <dsp:cNvPr id="0" name=""/>
+        <dsp:cNvSpPr/>
+      </dsp:nvSpPr>
+      <dsp:spPr>
+        <a:xfrm>
+          <a:off x="-193141" y="1376609"/>
+          <a:ext cx="10412896" cy="1096405"/>
+        </a:xfrm>
+        <a:prstGeom prst="roundRect">
+          <a:avLst>
+            <a:gd name="adj" fmla="val 10000"/>
+          </a:avLst>
+        </a:prstGeom>
+        <a:solidFill>
+          <a:schemeClr val="accent3">
+            <a:tint val="40000"/>
+            <a:hueOff val="0"/>
+            <a:satOff val="0"/>
+            <a:lumOff val="0"/>
+            <a:alphaOff val="0"/>
+          </a:schemeClr>
+        </a:solidFill>
+        <a:ln>
+          <a:noFill/>
+        </a:ln>
+        <a:effectLst/>
+      </dsp:spPr>
+      <dsp:style>
+        <a:lnRef idx="0">
+          <a:scrgbClr r="0" g="0" b="0"/>
+        </a:lnRef>
+        <a:fillRef idx="1">
+          <a:scrgbClr r="0" g="0" b="0"/>
+        </a:fillRef>
+        <a:effectRef idx="0">
+          <a:scrgbClr r="0" g="0" b="0"/>
+        </a:effectRef>
+        <a:fontRef idx="minor"/>
+      </dsp:style>
+    </dsp:sp>
+    <dsp:sp modelId="{75C54B5A-B6C1-4DB4-9C5A-D0125E6084A0}">
+      <dsp:nvSpPr>
+        <dsp:cNvPr id="0" name=""/>
+        <dsp:cNvSpPr/>
+      </dsp:nvSpPr>
+      <dsp:spPr>
+        <a:xfrm>
+          <a:off x="138521" y="1623300"/>
+          <a:ext cx="603023" cy="603023"/>
+        </a:xfrm>
+        <a:prstGeom prst="rect">
+          <a:avLst/>
+        </a:prstGeom>
+        <a:blipFill>
+          <a:blip xmlns:r="http://schemas.openxmlformats.org/officeDocument/2006/relationships" r:embed="rId3">
+            <a:extLst>
+              <a:ext uri="{28A0092B-C50C-407E-A947-70E740481C1C}">
+                <a14:useLocalDpi xmlns:a14="http://schemas.microsoft.com/office/drawing/2010/main" val="0"/>
+              </a:ext>
+              <a:ext uri="{96DAC541-7B7A-43D3-8B79-37D633B846F1}">
+                <asvg:svgBlip xmlns:asvg="http://schemas.microsoft.com/office/drawing/2016/SVG/main" r:embed="rId4"/>
+              </a:ext>
+            </a:extLst>
+          </a:blip>
+          <a:stretch>
+            <a:fillRect/>
+          </a:stretch>
+        </a:blipFill>
+        <a:ln w="12700" cap="flat" cmpd="sng" algn="ctr">
+          <a:noFill/>
+          <a:prstDash val="solid"/>
+        </a:ln>
+        <a:effectLst/>
+      </dsp:spPr>
+      <dsp:style>
+        <a:lnRef idx="2">
+          <a:scrgbClr r="0" g="0" b="0"/>
+        </a:lnRef>
+        <a:fillRef idx="1">
+          <a:scrgbClr r="0" g="0" b="0"/>
+        </a:fillRef>
+        <a:effectRef idx="0">
+          <a:scrgbClr r="0" g="0" b="0"/>
+        </a:effectRef>
+        <a:fontRef idx="minor">
+          <a:schemeClr val="lt1"/>
+        </a:fontRef>
+      </dsp:style>
+    </dsp:sp>
+    <dsp:sp modelId="{177AEF78-C31B-46E7-8450-985BDAA525F8}">
+      <dsp:nvSpPr>
+        <dsp:cNvPr id="0" name=""/>
+        <dsp:cNvSpPr/>
+      </dsp:nvSpPr>
+      <dsp:spPr>
+        <a:xfrm>
+          <a:off x="753393" y="1376609"/>
+          <a:ext cx="9783698" cy="1096405"/>
+        </a:xfrm>
+        <a:prstGeom prst="rect">
+          <a:avLst/>
+        </a:prstGeom>
+        <a:noFill/>
+        <a:ln>
+          <a:noFill/>
+        </a:ln>
+        <a:effectLst/>
+      </dsp:spPr>
+      <dsp:style>
+        <a:lnRef idx="0">
+          <a:scrgbClr r="0" g="0" b="0"/>
+        </a:lnRef>
+        <a:fillRef idx="0">
+          <a:scrgbClr r="0" g="0" b="0"/>
+        </a:fillRef>
+        <a:effectRef idx="0">
+          <a:scrgbClr r="0" g="0" b="0"/>
+        </a:effectRef>
+        <a:fontRef idx="minor"/>
+      </dsp:style>
+      <dsp:txBody>
+        <a:bodyPr spcFirstLastPara="0" vert="horz" wrap="square" lIns="116036" tIns="116036" rIns="116036" bIns="116036" numCol="1" spcCol="1270" anchor="ctr" anchorCtr="0">
+          <a:noAutofit/>
+        </a:bodyPr>
+        <a:lstStyle/>
+        <a:p>
+          <a:pPr marL="0" lvl="0" indent="0" algn="l" defTabSz="1111250">
+            <a:lnSpc>
+              <a:spcPct val="100000"/>
+            </a:lnSpc>
+            <a:spcBef>
+              <a:spcPct val="0"/>
+            </a:spcBef>
+            <a:spcAft>
+              <a:spcPct val="35000"/>
+            </a:spcAft>
+            <a:buNone/>
+          </a:pPr>
+          <a:r>
+            <a:rPr lang="en-US" sz="2500" kern="1200" dirty="0"/>
+            <a:t>Allison – Java for table/Flask set up</a:t>
+          </a:r>
+        </a:p>
+      </dsp:txBody>
+      <dsp:txXfrm>
+        <a:off x="753393" y="1376609"/>
+        <a:ext cx="9783698" cy="1096405"/>
+      </dsp:txXfrm>
+    </dsp:sp>
+    <dsp:sp modelId="{9AED59AB-AACC-4AFE-920B-B76A856BEB87}">
+      <dsp:nvSpPr>
+        <dsp:cNvPr id="0" name=""/>
+        <dsp:cNvSpPr/>
+      </dsp:nvSpPr>
+      <dsp:spPr>
+        <a:xfrm>
+          <a:off x="-193141" y="2747116"/>
+          <a:ext cx="10412896" cy="1096405"/>
+        </a:xfrm>
+        <a:prstGeom prst="roundRect">
+          <a:avLst>
+            <a:gd name="adj" fmla="val 10000"/>
+          </a:avLst>
+        </a:prstGeom>
+        <a:solidFill>
+          <a:schemeClr val="accent3">
+            <a:tint val="40000"/>
+            <a:hueOff val="0"/>
+            <a:satOff val="0"/>
+            <a:lumOff val="0"/>
+            <a:alphaOff val="0"/>
+          </a:schemeClr>
+        </a:solidFill>
+        <a:ln>
+          <a:noFill/>
+        </a:ln>
+        <a:effectLst/>
+      </dsp:spPr>
+      <dsp:style>
+        <a:lnRef idx="0">
+          <a:scrgbClr r="0" g="0" b="0"/>
+        </a:lnRef>
+        <a:fillRef idx="1">
+          <a:scrgbClr r="0" g="0" b="0"/>
+        </a:fillRef>
+        <a:effectRef idx="0">
+          <a:scrgbClr r="0" g="0" b="0"/>
+        </a:effectRef>
+        <a:fontRef idx="minor"/>
+      </dsp:style>
+    </dsp:sp>
+    <dsp:sp modelId="{CA0E6411-0528-45E6-A2EE-35C4C92AAED1}">
+      <dsp:nvSpPr>
+        <dsp:cNvPr id="0" name=""/>
+        <dsp:cNvSpPr/>
+      </dsp:nvSpPr>
+      <dsp:spPr>
+        <a:xfrm>
+          <a:off x="138521" y="2993807"/>
+          <a:ext cx="603023" cy="603023"/>
+        </a:xfrm>
+        <a:prstGeom prst="rect">
+          <a:avLst/>
+        </a:prstGeom>
+        <a:blipFill>
+          <a:blip xmlns:r="http://schemas.openxmlformats.org/officeDocument/2006/relationships" r:embed="rId5">
+            <a:extLst>
+              <a:ext uri="{28A0092B-C50C-407E-A947-70E740481C1C}">
+                <a14:useLocalDpi xmlns:a14="http://schemas.microsoft.com/office/drawing/2010/main" val="0"/>
+              </a:ext>
+              <a:ext uri="{96DAC541-7B7A-43D3-8B79-37D633B846F1}">
+                <asvg:svgBlip xmlns:asvg="http://schemas.microsoft.com/office/drawing/2016/SVG/main" r:embed="rId6"/>
+              </a:ext>
+            </a:extLst>
+          </a:blip>
+          <a:stretch>
+            <a:fillRect/>
+          </a:stretch>
+        </a:blipFill>
+        <a:ln w="12700" cap="flat" cmpd="sng" algn="ctr">
+          <a:noFill/>
+          <a:prstDash val="solid"/>
+        </a:ln>
+        <a:effectLst/>
+      </dsp:spPr>
+      <dsp:style>
+        <a:lnRef idx="2">
+          <a:scrgbClr r="0" g="0" b="0"/>
+        </a:lnRef>
+        <a:fillRef idx="1">
+          <a:scrgbClr r="0" g="0" b="0"/>
+        </a:fillRef>
+        <a:effectRef idx="0">
+          <a:scrgbClr r="0" g="0" b="0"/>
+        </a:effectRef>
+        <a:fontRef idx="minor">
+          <a:schemeClr val="lt1"/>
+        </a:fontRef>
+      </dsp:style>
+    </dsp:sp>
+    <dsp:sp modelId="{EC78EAE9-1A6D-491C-BB03-FA59FE1F5346}">
+      <dsp:nvSpPr>
+        <dsp:cNvPr id="0" name=""/>
+        <dsp:cNvSpPr/>
+      </dsp:nvSpPr>
+      <dsp:spPr>
+        <a:xfrm>
+          <a:off x="838615" y="2747116"/>
+          <a:ext cx="9613252" cy="1096405"/>
+        </a:xfrm>
+        <a:prstGeom prst="rect">
+          <a:avLst/>
+        </a:prstGeom>
+        <a:noFill/>
+        <a:ln>
+          <a:noFill/>
+        </a:ln>
+        <a:effectLst/>
+      </dsp:spPr>
+      <dsp:style>
+        <a:lnRef idx="0">
+          <a:scrgbClr r="0" g="0" b="0"/>
+        </a:lnRef>
+        <a:fillRef idx="0">
+          <a:scrgbClr r="0" g="0" b="0"/>
+        </a:fillRef>
+        <a:effectRef idx="0">
+          <a:scrgbClr r="0" g="0" b="0"/>
+        </a:effectRef>
+        <a:fontRef idx="minor"/>
+      </dsp:style>
+      <dsp:txBody>
+        <a:bodyPr spcFirstLastPara="0" vert="horz" wrap="square" lIns="116036" tIns="116036" rIns="116036" bIns="116036" numCol="1" spcCol="1270" anchor="ctr" anchorCtr="0">
+          <a:noAutofit/>
+        </a:bodyPr>
+        <a:lstStyle/>
+        <a:p>
+          <a:pPr marL="0" lvl="0" indent="0" algn="l" defTabSz="1111250">
+            <a:lnSpc>
+              <a:spcPct val="100000"/>
+            </a:lnSpc>
+            <a:spcBef>
+              <a:spcPct val="0"/>
+            </a:spcBef>
+            <a:spcAft>
+              <a:spcPct val="35000"/>
+            </a:spcAft>
+            <a:buNone/>
+          </a:pPr>
+          <a:r>
+            <a:rPr lang="en-US" sz="2500" kern="1200" dirty="0" err="1"/>
+            <a:t>Lenn</a:t>
+          </a:r>
+          <a:r>
+            <a:rPr lang="en-US" sz="2500" kern="1200" dirty="0"/>
+            <a:t> – Html design/Incorporating Anime </a:t>
+          </a:r>
+          <a:r>
+            <a:rPr lang="en-US" sz="2500" kern="1200" dirty="0" err="1"/>
+            <a:t>js</a:t>
+          </a:r>
+          <a:endParaRPr lang="en-US" sz="2500" kern="1200" dirty="0"/>
+        </a:p>
+      </dsp:txBody>
+      <dsp:txXfrm>
+        <a:off x="838615" y="2747116"/>
+        <a:ext cx="9613252" cy="1096405"/>
       </dsp:txXfrm>
     </dsp:sp>
   </dsp:spTree>
@@ -2526,7 +3665,1335 @@
 </dgm:layoutDef>
 </file>
 
+<file path=ppt/diagrams/layout2.xml><?xml version="1.0" encoding="utf-8"?>
+<dgm:layoutDef xmlns:dgm="http://schemas.openxmlformats.org/drawingml/2006/diagram" xmlns:a="http://schemas.openxmlformats.org/drawingml/2006/main" uniqueId="urn:microsoft.com/office/officeart/2018/2/layout/IconVerticalSolidList">
+  <dgm:title val="Icon Vertical Solid List"/>
+  <dgm:desc val="Use to show a series of visuals from top to bottom with Level 1 or Level 1 and Level 2 text grouped in a shape. Works best with icons or small pictures with lengthier descriptions."/>
+  <dgm:catLst>
+    <dgm:cat type="icon" pri="500"/>
+  </dgm:catLst>
+  <dgm:sampData useDef="1">
+    <dgm:dataModel>
+      <dgm:ptLst/>
+      <dgm:bg/>
+      <dgm:whole/>
+    </dgm:dataModel>
+  </dgm:sampData>
+  <dgm:styleData useDef="1">
+    <dgm:dataModel>
+      <dgm:ptLst/>
+      <dgm:bg/>
+      <dgm:whole/>
+    </dgm:dataModel>
+  </dgm:styleData>
+  <dgm:clrData useDef="1">
+    <dgm:dataModel>
+      <dgm:ptLst/>
+      <dgm:bg/>
+      <dgm:whole/>
+    </dgm:dataModel>
+  </dgm:clrData>
+  <dgm:layoutNode name="root">
+    <dgm:varLst>
+      <dgm:dir/>
+      <dgm:resizeHandles val="exact"/>
+    </dgm:varLst>
+    <dgm:choose name="Name0">
+      <dgm:if name="Name1" axis="self" func="var" arg="dir" op="equ" val="norm">
+        <dgm:alg type="lin">
+          <dgm:param type="linDir" val="fromT"/>
+          <dgm:param type="nodeHorzAlign" val="l"/>
+        </dgm:alg>
+      </dgm:if>
+      <dgm:else name="Name2">
+        <dgm:alg type="lin">
+          <dgm:param type="linDir" val="fromT"/>
+          <dgm:param type="nodeHorzAlign" val="r"/>
+        </dgm:alg>
+      </dgm:else>
+    </dgm:choose>
+    <dgm:shape xmlns:r="http://schemas.openxmlformats.org/officeDocument/2006/relationships" r:blip="">
+      <dgm:adjLst/>
+    </dgm:shape>
+    <dgm:presOf/>
+    <dgm:choose name="Name3">
+      <dgm:if name="Name4" axis="ch" ptType="node" func="cnt" op="lte" val="3">
+        <dgm:constrLst>
+          <dgm:constr type="h" for="ch" forName="compNode" refType="h" fact="0.3"/>
+          <dgm:constr type="w" for="ch" forName="compNode" refType="w"/>
+          <dgm:constr type="h" for="ch" forName="sibTrans" refType="h" refFor="ch" refForName="compNode" fact="0.25"/>
+          <dgm:constr type="primFontSz" for="des" forName="parTx" val="25"/>
+          <dgm:constr type="primFontSz" for="des" forName="desTx" refType="primFontSz" refFor="des" refForName="parTx" op="lte" fact="0.75"/>
+          <dgm:constr type="h" for="des" forName="compNode" op="equ"/>
+          <dgm:constr type="h" for="des" forName="bgRect" op="equ"/>
+          <dgm:constr type="h" for="des" forName="iconRect" op="equ"/>
+          <dgm:constr type="w" for="des" forName="iconRect" op="equ"/>
+          <dgm:constr type="h" for="des" forName="spaceRect" op="equ"/>
+          <dgm:constr type="h" for="des" forName="parTx" op="equ"/>
+          <dgm:constr type="h" for="des" forName="desTx" op="equ"/>
+        </dgm:constrLst>
+      </dgm:if>
+      <dgm:if name="Name5" axis="ch" ptType="node" func="cnt" op="lte" val="4">
+        <dgm:constrLst>
+          <dgm:constr type="h" for="ch" forName="compNode" refType="h" fact="0.3"/>
+          <dgm:constr type="w" for="ch" forName="compNode" refType="w"/>
+          <dgm:constr type="h" for="ch" forName="sibTrans" refType="h" refFor="ch" refForName="compNode" fact="0.25"/>
+          <dgm:constr type="primFontSz" for="des" forName="parTx" val="22"/>
+          <dgm:constr type="primFontSz" for="des" forName="desTx" refType="primFontSz" refFor="des" refForName="parTx" op="lte" fact="0.75"/>
+          <dgm:constr type="h" for="des" forName="compNode" op="equ"/>
+          <dgm:constr type="h" for="des" forName="bgRect" op="equ"/>
+          <dgm:constr type="h" for="des" forName="iconRect" op="equ"/>
+          <dgm:constr type="w" for="des" forName="iconRect" op="equ"/>
+          <dgm:constr type="h" for="des" forName="spaceRect" op="equ"/>
+          <dgm:constr type="h" for="des" forName="parTx" op="equ"/>
+          <dgm:constr type="h" for="des" forName="desTx" op="equ"/>
+        </dgm:constrLst>
+      </dgm:if>
+      <dgm:if name="Name6" axis="ch" ptType="node" func="cnt" op="lte" val="6">
+        <dgm:constrLst>
+          <dgm:constr type="h" for="ch" forName="compNode" refType="h" fact="0.3"/>
+          <dgm:constr type="w" for="ch" forName="compNode" refType="w"/>
+          <dgm:constr type="h" for="ch" forName="sibTrans" refType="h" refFor="ch" refForName="compNode" fact="0.25"/>
+          <dgm:constr type="primFontSz" for="des" forName="parTx" val="19"/>
+          <dgm:constr type="primFontSz" for="des" forName="desTx" refType="primFontSz" refFor="des" refForName="parTx" op="lte" fact="0.75"/>
+          <dgm:constr type="h" for="des" forName="compNode" op="equ"/>
+          <dgm:constr type="h" for="des" forName="bgRect" op="equ"/>
+          <dgm:constr type="h" for="des" forName="iconRect" op="equ"/>
+          <dgm:constr type="w" for="des" forName="iconRect" op="equ"/>
+          <dgm:constr type="h" for="des" forName="spaceRect" op="equ"/>
+          <dgm:constr type="h" for="des" forName="parTx" op="equ"/>
+          <dgm:constr type="h" for="des" forName="desTx" op="equ"/>
+        </dgm:constrLst>
+      </dgm:if>
+      <dgm:else name="Name7">
+        <dgm:constrLst>
+          <dgm:constr type="h" for="ch" forName="compNode" refType="h" fact="0.3"/>
+          <dgm:constr type="w" for="ch" forName="compNode" refType="w"/>
+          <dgm:constr type="h" for="ch" forName="sibTrans" refType="h" refFor="ch" refForName="compNode" fact="0.25"/>
+          <dgm:constr type="primFontSz" for="des" forName="parTx" val="16"/>
+          <dgm:constr type="primFontSz" for="des" forName="desTx" refType="primFontSz" refFor="des" refForName="parTx" op="lte" fact="0.75"/>
+          <dgm:constr type="h" for="des" forName="compNode" op="equ"/>
+          <dgm:constr type="h" for="des" forName="bgRect" op="equ"/>
+          <dgm:constr type="h" for="des" forName="iconRect" op="equ"/>
+          <dgm:constr type="w" for="des" forName="iconRect" op="equ"/>
+          <dgm:constr type="h" for="des" forName="spaceRect" op="equ"/>
+          <dgm:constr type="h" for="des" forName="parTx" op="equ"/>
+          <dgm:constr type="h" for="des" forName="desTx" op="equ"/>
+        </dgm:constrLst>
+      </dgm:else>
+    </dgm:choose>
+    <dgm:ruleLst>
+      <dgm:rule type="h" for="ch" forName="compNode" val="0" fact="NaN" max="NaN"/>
+    </dgm:ruleLst>
+    <dgm:forEach name="Name8" axis="ch" ptType="node">
+      <dgm:layoutNode name="compNode">
+        <dgm:alg type="composite"/>
+        <dgm:shape xmlns:r="http://schemas.openxmlformats.org/officeDocument/2006/relationships" r:blip="">
+          <dgm:adjLst/>
+        </dgm:shape>
+        <dgm:presOf axis="self"/>
+        <dgm:choose name="Name9">
+          <dgm:if name="Name10" axis="ch" ptType="node" func="cnt" op="gte" val="1">
+            <dgm:constrLst>
+              <dgm:constr type="w" for="ch" forName="bgRect" refType="w"/>
+              <dgm:constr type="h" for="ch" forName="bgRect" refType="h"/>
+              <dgm:constr type="l" for="ch" forName="bgRect"/>
+              <dgm:constr type="t" for="ch" forName="bgRect"/>
+              <dgm:constr type="h" for="ch" forName="iconRect" refType="h" fact="0.55"/>
+              <dgm:constr type="w" for="ch" forName="iconRect" refType="h" refFor="ch" refForName="iconRect"/>
+              <dgm:constr type="l" for="ch" forName="iconRect" refType="h" refFor="ch" refForName="iconRect" fact="0.55"/>
+              <dgm:constr type="ctrY" for="ch" forName="iconRect" refType="ctrY" refFor="ch" refForName="bgRect"/>
+              <dgm:constr type="w" for="ch" forName="spaceRect" refType="l" refFor="ch" refForName="iconRect"/>
+              <dgm:constr type="h" for="ch" forName="spaceRect" refType="h"/>
+              <dgm:constr type="l" for="ch" forName="spaceRect" refType="r" refFor="ch" refForName="iconRect"/>
+              <dgm:constr type="t" for="ch" forName="spaceRect"/>
+              <dgm:constr type="w" for="ch" forName="parTx" refType="w" fact="0.45"/>
+              <dgm:constr type="h" for="ch" forName="parTx" refType="h"/>
+              <dgm:constr type="l" for="ch" forName="parTx" refType="r" refFor="ch" refForName="spaceRect"/>
+              <dgm:constr type="t" for="ch" forName="parTx"/>
+              <dgm:constr type="h" for="ch" forName="desTx" refType="h"/>
+              <dgm:constr type="l" for="ch" forName="desTx" refType="r" refFor="ch" refForName="parTx"/>
+              <dgm:constr type="t" for="ch" forName="desTx"/>
+            </dgm:constrLst>
+          </dgm:if>
+          <dgm:else name="Name11">
+            <dgm:constrLst>
+              <dgm:constr type="w" for="ch" forName="bgRect" refType="w"/>
+              <dgm:constr type="h" for="ch" forName="bgRect" refType="h"/>
+              <dgm:constr type="l" for="ch" forName="bgRect"/>
+              <dgm:constr type="t" for="ch" forName="bgRect"/>
+              <dgm:constr type="h" for="ch" forName="iconRect" refType="h" fact="0.55"/>
+              <dgm:constr type="w" for="ch" forName="iconRect" refType="h" refFor="ch" refForName="iconRect"/>
+              <dgm:constr type="l" for="ch" forName="iconRect" refType="h" refFor="ch" refForName="iconRect" fact="0.55"/>
+              <dgm:constr type="ctrY" for="ch" forName="iconRect" refType="ctrY" refFor="ch" refForName="bgRect"/>
+              <dgm:constr type="w" for="ch" forName="spaceRect" refType="l" refFor="ch" refForName="iconRect"/>
+              <dgm:constr type="h" for="ch" forName="spaceRect" refType="h"/>
+              <dgm:constr type="l" for="ch" forName="spaceRect" refType="r" refFor="ch" refForName="iconRect"/>
+              <dgm:constr type="t" for="ch" forName="spaceRect"/>
+              <dgm:constr type="h" for="ch" forName="parTx" refType="h"/>
+              <dgm:constr type="l" for="ch" forName="parTx" refType="r" refFor="ch" refForName="spaceRect"/>
+              <dgm:constr type="t" for="ch" forName="parTx"/>
+            </dgm:constrLst>
+          </dgm:else>
+        </dgm:choose>
+        <dgm:ruleLst>
+          <dgm:rule type="h" val="INF" fact="NaN" max="NaN"/>
+        </dgm:ruleLst>
+        <dgm:layoutNode name="bgRect" styleLbl="bgShp">
+          <dgm:alg type="sp"/>
+          <dgm:shape xmlns:r="http://schemas.openxmlformats.org/officeDocument/2006/relationships" type="roundRect" r:blip="">
+            <dgm:adjLst>
+              <dgm:adj idx="1" val="0.1"/>
+            </dgm:adjLst>
+          </dgm:shape>
+          <dgm:presOf/>
+          <dgm:constrLst/>
+          <dgm:ruleLst/>
+        </dgm:layoutNode>
+        <dgm:layoutNode name="iconRect" styleLbl="node1">
+          <dgm:alg type="sp"/>
+          <dgm:shape xmlns:r="http://schemas.openxmlformats.org/officeDocument/2006/relationships" type="rect" r:blip="" blipPhldr="1">
+            <dgm:adjLst/>
+          </dgm:shape>
+          <dgm:presOf/>
+          <dgm:constrLst/>
+          <dgm:ruleLst/>
+        </dgm:layoutNode>
+        <dgm:layoutNode name="spaceRect">
+          <dgm:alg type="sp"/>
+          <dgm:shape xmlns:r="http://schemas.openxmlformats.org/officeDocument/2006/relationships" r:blip="">
+            <dgm:adjLst/>
+          </dgm:shape>
+          <dgm:presOf/>
+          <dgm:constrLst/>
+          <dgm:ruleLst/>
+        </dgm:layoutNode>
+        <dgm:layoutNode name="parTx" styleLbl="revTx">
+          <dgm:varLst>
+            <dgm:chMax val="0"/>
+            <dgm:chPref val="0"/>
+          </dgm:varLst>
+          <dgm:alg type="tx">
+            <dgm:param type="txAnchorVert" val="mid"/>
+            <dgm:param type="parTxLTRAlign" val="l"/>
+            <dgm:param type="shpTxLTRAlignCh" val="l"/>
+            <dgm:param type="parTxRTLAlign" val="r"/>
+            <dgm:param type="shpTxRTLAlignCh" val="r"/>
+          </dgm:alg>
+          <dgm:shape xmlns:r="http://schemas.openxmlformats.org/officeDocument/2006/relationships" type="rect" r:blip="">
+            <dgm:adjLst/>
+          </dgm:shape>
+          <dgm:presOf axis="self" ptType="node"/>
+          <dgm:constrLst>
+            <dgm:constr type="lMarg" refType="h" fact="0.3"/>
+            <dgm:constr type="rMarg" refType="h" fact="0.3"/>
+            <dgm:constr type="tMarg" refType="h" fact="0.3"/>
+            <dgm:constr type="bMarg" refType="h" fact="0.3"/>
+          </dgm:constrLst>
+          <dgm:ruleLst>
+            <dgm:rule type="primFontSz" val="14" fact="NaN" max="NaN"/>
+            <dgm:rule type="h" val="INF" fact="NaN" max="NaN"/>
+          </dgm:ruleLst>
+        </dgm:layoutNode>
+        <dgm:choose name="Name12">
+          <dgm:if name="Name13" axis="ch" ptType="node" func="cnt" op="gte" val="1">
+            <dgm:layoutNode name="desTx" styleLbl="revTx">
+              <dgm:varLst/>
+              <dgm:alg type="tx">
+                <dgm:param type="txAnchorVertCh" val="mid"/>
+                <dgm:param type="parTxLTRAlign" val="l"/>
+                <dgm:param type="shpTxLTRAlignCh" val="l"/>
+                <dgm:param type="parTxRTLAlign" val="r"/>
+                <dgm:param type="shpTxRTLAlignCh" val="r"/>
+                <dgm:param type="stBulletLvl" val="0"/>
+              </dgm:alg>
+              <dgm:shape xmlns:r="http://schemas.openxmlformats.org/officeDocument/2006/relationships" type="rect" r:blip="">
+                <dgm:adjLst/>
+              </dgm:shape>
+              <dgm:presOf axis="des" ptType="node"/>
+              <dgm:constrLst>
+                <dgm:constr type="primFontSz" val="18"/>
+                <dgm:constr type="secFontSz" refType="primFontSz"/>
+                <dgm:constr type="lMarg" refType="h" fact="0.3"/>
+                <dgm:constr type="rMarg" refType="h" fact="0.3"/>
+                <dgm:constr type="tMarg" refType="h" fact="0.3"/>
+                <dgm:constr type="bMarg" refType="h" fact="0.3"/>
+              </dgm:constrLst>
+              <dgm:ruleLst>
+                <dgm:rule type="primFontSz" val="11" fact="NaN" max="NaN"/>
+              </dgm:ruleLst>
+            </dgm:layoutNode>
+          </dgm:if>
+          <dgm:else name="Name14"/>
+        </dgm:choose>
+      </dgm:layoutNode>
+      <dgm:forEach name="Name15" axis="followSib" ptType="sibTrans" cnt="1">
+        <dgm:layoutNode name="sibTrans">
+          <dgm:alg type="sp"/>
+          <dgm:shape xmlns:r="http://schemas.openxmlformats.org/officeDocument/2006/relationships" r:blip="">
+            <dgm:adjLst/>
+          </dgm:shape>
+          <dgm:presOf axis="self"/>
+          <dgm:constrLst/>
+          <dgm:ruleLst/>
+        </dgm:layoutNode>
+      </dgm:forEach>
+    </dgm:forEach>
+  </dgm:layoutNode>
+  <dgm:extLst>
+    <a:ext uri="{68A01E43-0DF5-4B5B-8FA6-DAF915123BFB}">
+      <dgm1612:lstStyle xmlns:dgm1612="http://schemas.microsoft.com/office/drawing/2016/12/diagram">
+        <a:lvl1pPr>
+          <a:lnSpc>
+            <a:spcPct val="100000"/>
+          </a:lnSpc>
+        </a:lvl1pPr>
+        <a:lvl2pPr>
+          <a:lnSpc>
+            <a:spcPct val="100000"/>
+          </a:lnSpc>
+        </a:lvl2pPr>
+      </dgm1612:lstStyle>
+    </a:ext>
+  </dgm:extLst>
+</dgm:layoutDef>
+</file>
+
 <file path=ppt/diagrams/quickStyle1.xml><?xml version="1.0" encoding="utf-8"?>
+<dgm:styleDef xmlns:dgm="http://schemas.openxmlformats.org/drawingml/2006/diagram" xmlns:a="http://schemas.openxmlformats.org/drawingml/2006/main" uniqueId="urn:microsoft.com/office/officeart/2005/8/quickstyle/simple4">
+  <dgm:title val=""/>
+  <dgm:desc val=""/>
+  <dgm:catLst>
+    <dgm:cat type="simple" pri="10400"/>
+  </dgm:catLst>
+  <dgm:scene3d>
+    <a:camera prst="orthographicFront"/>
+    <a:lightRig rig="threePt" dir="t"/>
+  </dgm:scene3d>
+  <dgm:styleLbl name="node0">
+    <dgm:scene3d>
+      <a:camera prst="orthographicFront"/>
+      <a:lightRig rig="threePt" dir="t"/>
+    </dgm:scene3d>
+    <dgm:sp3d/>
+    <dgm:txPr/>
+    <dgm:style>
+      <a:lnRef idx="0">
+        <a:scrgbClr r="0" g="0" b="0"/>
+      </a:lnRef>
+      <a:fillRef idx="3">
+        <a:scrgbClr r="0" g="0" b="0"/>
+      </a:fillRef>
+      <a:effectRef idx="2">
+        <a:scrgbClr r="0" g="0" b="0"/>
+      </a:effectRef>
+      <a:fontRef idx="minor">
+        <a:schemeClr val="lt1"/>
+      </a:fontRef>
+    </dgm:style>
+  </dgm:styleLbl>
+  <dgm:styleLbl name="lnNode1">
+    <dgm:scene3d>
+      <a:camera prst="orthographicFront"/>
+      <a:lightRig rig="threePt" dir="t"/>
+    </dgm:scene3d>
+    <dgm:sp3d/>
+    <dgm:txPr/>
+    <dgm:style>
+      <a:lnRef idx="1">
+        <a:scrgbClr r="0" g="0" b="0"/>
+      </a:lnRef>
+      <a:fillRef idx="3">
+        <a:scrgbClr r="0" g="0" b="0"/>
+      </a:fillRef>
+      <a:effectRef idx="2">
+        <a:scrgbClr r="0" g="0" b="0"/>
+      </a:effectRef>
+      <a:fontRef idx="minor">
+        <a:schemeClr val="lt1"/>
+      </a:fontRef>
+    </dgm:style>
+  </dgm:styleLbl>
+  <dgm:styleLbl name="vennNode1">
+    <dgm:scene3d>
+      <a:camera prst="orthographicFront"/>
+      <a:lightRig rig="threePt" dir="t"/>
+    </dgm:scene3d>
+    <dgm:sp3d/>
+    <dgm:txPr/>
+    <dgm:style>
+      <a:lnRef idx="0">
+        <a:scrgbClr r="0" g="0" b="0"/>
+      </a:lnRef>
+      <a:fillRef idx="3">
+        <a:scrgbClr r="0" g="0" b="0"/>
+      </a:fillRef>
+      <a:effectRef idx="0">
+        <a:scrgbClr r="0" g="0" b="0"/>
+      </a:effectRef>
+      <a:fontRef idx="minor">
+        <a:schemeClr val="tx1"/>
+      </a:fontRef>
+    </dgm:style>
+  </dgm:styleLbl>
+  <dgm:styleLbl name="alignNode1">
+    <dgm:scene3d>
+      <a:camera prst="orthographicFront"/>
+      <a:lightRig rig="threePt" dir="t"/>
+    </dgm:scene3d>
+    <dgm:sp3d/>
+    <dgm:txPr/>
+    <dgm:style>
+      <a:lnRef idx="1">
+        <a:scrgbClr r="0" g="0" b="0"/>
+      </a:lnRef>
+      <a:fillRef idx="3">
+        <a:scrgbClr r="0" g="0" b="0"/>
+      </a:fillRef>
+      <a:effectRef idx="2">
+        <a:scrgbClr r="0" g="0" b="0"/>
+      </a:effectRef>
+      <a:fontRef idx="minor">
+        <a:schemeClr val="lt1"/>
+      </a:fontRef>
+    </dgm:style>
+  </dgm:styleLbl>
+  <dgm:styleLbl name="node1">
+    <dgm:scene3d>
+      <a:camera prst="orthographicFront"/>
+      <a:lightRig rig="threePt" dir="t"/>
+    </dgm:scene3d>
+    <dgm:sp3d/>
+    <dgm:txPr/>
+    <dgm:style>
+      <a:lnRef idx="0">
+        <a:scrgbClr r="0" g="0" b="0"/>
+      </a:lnRef>
+      <a:fillRef idx="3">
+        <a:scrgbClr r="0" g="0" b="0"/>
+      </a:fillRef>
+      <a:effectRef idx="2">
+        <a:scrgbClr r="0" g="0" b="0"/>
+      </a:effectRef>
+      <a:fontRef idx="minor">
+        <a:schemeClr val="lt1"/>
+      </a:fontRef>
+    </dgm:style>
+  </dgm:styleLbl>
+  <dgm:styleLbl name="node2">
+    <dgm:scene3d>
+      <a:camera prst="orthographicFront"/>
+      <a:lightRig rig="threePt" dir="t"/>
+    </dgm:scene3d>
+    <dgm:sp3d/>
+    <dgm:txPr/>
+    <dgm:style>
+      <a:lnRef idx="0">
+        <a:scrgbClr r="0" g="0" b="0"/>
+      </a:lnRef>
+      <a:fillRef idx="3">
+        <a:scrgbClr r="0" g="0" b="0"/>
+      </a:fillRef>
+      <a:effectRef idx="2">
+        <a:scrgbClr r="0" g="0" b="0"/>
+      </a:effectRef>
+      <a:fontRef idx="minor">
+        <a:schemeClr val="lt1"/>
+      </a:fontRef>
+    </dgm:style>
+  </dgm:styleLbl>
+  <dgm:styleLbl name="node3">
+    <dgm:scene3d>
+      <a:camera prst="orthographicFront"/>
+      <a:lightRig rig="threePt" dir="t"/>
+    </dgm:scene3d>
+    <dgm:sp3d/>
+    <dgm:txPr/>
+    <dgm:style>
+      <a:lnRef idx="0">
+        <a:scrgbClr r="0" g="0" b="0"/>
+      </a:lnRef>
+      <a:fillRef idx="3">
+        <a:scrgbClr r="0" g="0" b="0"/>
+      </a:fillRef>
+      <a:effectRef idx="2">
+        <a:scrgbClr r="0" g="0" b="0"/>
+      </a:effectRef>
+      <a:fontRef idx="minor">
+        <a:schemeClr val="lt1"/>
+      </a:fontRef>
+    </dgm:style>
+  </dgm:styleLbl>
+  <dgm:styleLbl name="node4">
+    <dgm:scene3d>
+      <a:camera prst="orthographicFront"/>
+      <a:lightRig rig="threePt" dir="t"/>
+    </dgm:scene3d>
+    <dgm:sp3d/>
+    <dgm:txPr/>
+    <dgm:style>
+      <a:lnRef idx="0">
+        <a:scrgbClr r="0" g="0" b="0"/>
+      </a:lnRef>
+      <a:fillRef idx="3">
+        <a:scrgbClr r="0" g="0" b="0"/>
+      </a:fillRef>
+      <a:effectRef idx="2">
+        <a:scrgbClr r="0" g="0" b="0"/>
+      </a:effectRef>
+      <a:fontRef idx="minor">
+        <a:schemeClr val="lt1"/>
+      </a:fontRef>
+    </dgm:style>
+  </dgm:styleLbl>
+  <dgm:styleLbl name="fgImgPlace1">
+    <dgm:scene3d>
+      <a:camera prst="orthographicFront"/>
+      <a:lightRig rig="threePt" dir="t"/>
+    </dgm:scene3d>
+    <dgm:sp3d/>
+    <dgm:txPr/>
+    <dgm:style>
+      <a:lnRef idx="0">
+        <a:scrgbClr r="0" g="0" b="0"/>
+      </a:lnRef>
+      <a:fillRef idx="1">
+        <a:scrgbClr r="0" g="0" b="0"/>
+      </a:fillRef>
+      <a:effectRef idx="2">
+        <a:scrgbClr r="0" g="0" b="0"/>
+      </a:effectRef>
+      <a:fontRef idx="minor"/>
+    </dgm:style>
+  </dgm:styleLbl>
+  <dgm:styleLbl name="alignImgPlace1">
+    <dgm:scene3d>
+      <a:camera prst="orthographicFront"/>
+      <a:lightRig rig="threePt" dir="t"/>
+    </dgm:scene3d>
+    <dgm:sp3d/>
+    <dgm:txPr/>
+    <dgm:style>
+      <a:lnRef idx="0">
+        <a:scrgbClr r="0" g="0" b="0"/>
+      </a:lnRef>
+      <a:fillRef idx="1">
+        <a:scrgbClr r="0" g="0" b="0"/>
+      </a:fillRef>
+      <a:effectRef idx="2">
+        <a:scrgbClr r="0" g="0" b="0"/>
+      </a:effectRef>
+      <a:fontRef idx="minor"/>
+    </dgm:style>
+  </dgm:styleLbl>
+  <dgm:styleLbl name="bgImgPlace1">
+    <dgm:scene3d>
+      <a:camera prst="orthographicFront"/>
+      <a:lightRig rig="threePt" dir="t"/>
+    </dgm:scene3d>
+    <dgm:sp3d/>
+    <dgm:txPr/>
+    <dgm:style>
+      <a:lnRef idx="0">
+        <a:scrgbClr r="0" g="0" b="0"/>
+      </a:lnRef>
+      <a:fillRef idx="1">
+        <a:scrgbClr r="0" g="0" b="0"/>
+      </a:fillRef>
+      <a:effectRef idx="2">
+        <a:scrgbClr r="0" g="0" b="0"/>
+      </a:effectRef>
+      <a:fontRef idx="minor"/>
+    </dgm:style>
+  </dgm:styleLbl>
+  <dgm:styleLbl name="sibTrans2D1">
+    <dgm:scene3d>
+      <a:camera prst="orthographicFront"/>
+      <a:lightRig rig="threePt" dir="t"/>
+    </dgm:scene3d>
+    <dgm:sp3d/>
+    <dgm:txPr/>
+    <dgm:style>
+      <a:lnRef idx="0">
+        <a:scrgbClr r="0" g="0" b="0"/>
+      </a:lnRef>
+      <a:fillRef idx="3">
+        <a:scrgbClr r="0" g="0" b="0"/>
+      </a:fillRef>
+      <a:effectRef idx="2">
+        <a:scrgbClr r="0" g="0" b="0"/>
+      </a:effectRef>
+      <a:fontRef idx="minor">
+        <a:schemeClr val="lt1"/>
+      </a:fontRef>
+    </dgm:style>
+  </dgm:styleLbl>
+  <dgm:styleLbl name="fgSibTrans2D1">
+    <dgm:scene3d>
+      <a:camera prst="orthographicFront"/>
+      <a:lightRig rig="threePt" dir="t"/>
+    </dgm:scene3d>
+    <dgm:sp3d/>
+    <dgm:txPr/>
+    <dgm:style>
+      <a:lnRef idx="0">
+        <a:scrgbClr r="0" g="0" b="0"/>
+      </a:lnRef>
+      <a:fillRef idx="3">
+        <a:scrgbClr r="0" g="0" b="0"/>
+      </a:fillRef>
+      <a:effectRef idx="2">
+        <a:scrgbClr r="0" g="0" b="0"/>
+      </a:effectRef>
+      <a:fontRef idx="minor">
+        <a:schemeClr val="lt1"/>
+      </a:fontRef>
+    </dgm:style>
+  </dgm:styleLbl>
+  <dgm:styleLbl name="bgSibTrans2D1">
+    <dgm:scene3d>
+      <a:camera prst="orthographicFront"/>
+      <a:lightRig rig="threePt" dir="t"/>
+    </dgm:scene3d>
+    <dgm:sp3d/>
+    <dgm:txPr/>
+    <dgm:style>
+      <a:lnRef idx="0">
+        <a:scrgbClr r="0" g="0" b="0"/>
+      </a:lnRef>
+      <a:fillRef idx="3">
+        <a:scrgbClr r="0" g="0" b="0"/>
+      </a:fillRef>
+      <a:effectRef idx="2">
+        <a:scrgbClr r="0" g="0" b="0"/>
+      </a:effectRef>
+      <a:fontRef idx="minor">
+        <a:schemeClr val="lt1"/>
+      </a:fontRef>
+    </dgm:style>
+  </dgm:styleLbl>
+  <dgm:styleLbl name="sibTrans1D1">
+    <dgm:scene3d>
+      <a:camera prst="orthographicFront"/>
+      <a:lightRig rig="threePt" dir="t"/>
+    </dgm:scene3d>
+    <dgm:sp3d/>
+    <dgm:txPr/>
+    <dgm:style>
+      <a:lnRef idx="1">
+        <a:scrgbClr r="0" g="0" b="0"/>
+      </a:lnRef>
+      <a:fillRef idx="0">
+        <a:scrgbClr r="0" g="0" b="0"/>
+      </a:fillRef>
+      <a:effectRef idx="0">
+        <a:scrgbClr r="0" g="0" b="0"/>
+      </a:effectRef>
+      <a:fontRef idx="minor"/>
+    </dgm:style>
+  </dgm:styleLbl>
+  <dgm:styleLbl name="callout">
+    <dgm:scene3d>
+      <a:camera prst="orthographicFront"/>
+      <a:lightRig rig="threePt" dir="t"/>
+    </dgm:scene3d>
+    <dgm:sp3d/>
+    <dgm:txPr/>
+    <dgm:style>
+      <a:lnRef idx="2">
+        <a:scrgbClr r="0" g="0" b="0"/>
+      </a:lnRef>
+      <a:fillRef idx="1">
+        <a:scrgbClr r="0" g="0" b="0"/>
+      </a:fillRef>
+      <a:effectRef idx="1">
+        <a:scrgbClr r="0" g="0" b="0"/>
+      </a:effectRef>
+      <a:fontRef idx="minor"/>
+    </dgm:style>
+  </dgm:styleLbl>
+  <dgm:styleLbl name="asst0">
+    <dgm:scene3d>
+      <a:camera prst="orthographicFront"/>
+      <a:lightRig rig="threePt" dir="t"/>
+    </dgm:scene3d>
+    <dgm:sp3d/>
+    <dgm:txPr/>
+    <dgm:style>
+      <a:lnRef idx="0">
+        <a:scrgbClr r="0" g="0" b="0"/>
+      </a:lnRef>
+      <a:fillRef idx="3">
+        <a:scrgbClr r="0" g="0" b="0"/>
+      </a:fillRef>
+      <a:effectRef idx="2">
+        <a:scrgbClr r="0" g="0" b="0"/>
+      </a:effectRef>
+      <a:fontRef idx="minor">
+        <a:schemeClr val="lt1"/>
+      </a:fontRef>
+    </dgm:style>
+  </dgm:styleLbl>
+  <dgm:styleLbl name="asst1">
+    <dgm:scene3d>
+      <a:camera prst="orthographicFront"/>
+      <a:lightRig rig="threePt" dir="t"/>
+    </dgm:scene3d>
+    <dgm:sp3d/>
+    <dgm:txPr/>
+    <dgm:style>
+      <a:lnRef idx="0">
+        <a:scrgbClr r="0" g="0" b="0"/>
+      </a:lnRef>
+      <a:fillRef idx="3">
+        <a:scrgbClr r="0" g="0" b="0"/>
+      </a:fillRef>
+      <a:effectRef idx="2">
+        <a:scrgbClr r="0" g="0" b="0"/>
+      </a:effectRef>
+      <a:fontRef idx="minor">
+        <a:schemeClr val="lt1"/>
+      </a:fontRef>
+    </dgm:style>
+  </dgm:styleLbl>
+  <dgm:styleLbl name="asst2">
+    <dgm:scene3d>
+      <a:camera prst="orthographicFront"/>
+      <a:lightRig rig="threePt" dir="t"/>
+    </dgm:scene3d>
+    <dgm:sp3d/>
+    <dgm:txPr/>
+    <dgm:style>
+      <a:lnRef idx="0">
+        <a:scrgbClr r="0" g="0" b="0"/>
+      </a:lnRef>
+      <a:fillRef idx="3">
+        <a:scrgbClr r="0" g="0" b="0"/>
+      </a:fillRef>
+      <a:effectRef idx="2">
+        <a:scrgbClr r="0" g="0" b="0"/>
+      </a:effectRef>
+      <a:fontRef idx="minor">
+        <a:schemeClr val="lt1"/>
+      </a:fontRef>
+    </dgm:style>
+  </dgm:styleLbl>
+  <dgm:styleLbl name="asst3">
+    <dgm:scene3d>
+      <a:camera prst="orthographicFront"/>
+      <a:lightRig rig="threePt" dir="t"/>
+    </dgm:scene3d>
+    <dgm:sp3d/>
+    <dgm:txPr/>
+    <dgm:style>
+      <a:lnRef idx="0">
+        <a:scrgbClr r="0" g="0" b="0"/>
+      </a:lnRef>
+      <a:fillRef idx="3">
+        <a:scrgbClr r="0" g="0" b="0"/>
+      </a:fillRef>
+      <a:effectRef idx="2">
+        <a:scrgbClr r="0" g="0" b="0"/>
+      </a:effectRef>
+      <a:fontRef idx="minor">
+        <a:schemeClr val="lt1"/>
+      </a:fontRef>
+    </dgm:style>
+  </dgm:styleLbl>
+  <dgm:styleLbl name="asst4">
+    <dgm:scene3d>
+      <a:camera prst="orthographicFront"/>
+      <a:lightRig rig="threePt" dir="t"/>
+    </dgm:scene3d>
+    <dgm:sp3d/>
+    <dgm:txPr/>
+    <dgm:style>
+      <a:lnRef idx="0">
+        <a:scrgbClr r="0" g="0" b="0"/>
+      </a:lnRef>
+      <a:fillRef idx="3">
+        <a:scrgbClr r="0" g="0" b="0"/>
+      </a:fillRef>
+      <a:effectRef idx="2">
+        <a:scrgbClr r="0" g="0" b="0"/>
+      </a:effectRef>
+      <a:fontRef idx="minor">
+        <a:schemeClr val="lt1"/>
+      </a:fontRef>
+    </dgm:style>
+  </dgm:styleLbl>
+  <dgm:styleLbl name="parChTrans2D1">
+    <dgm:scene3d>
+      <a:camera prst="orthographicFront"/>
+      <a:lightRig rig="threePt" dir="t"/>
+    </dgm:scene3d>
+    <dgm:sp3d/>
+    <dgm:txPr/>
+    <dgm:style>
+      <a:lnRef idx="0">
+        <a:scrgbClr r="0" g="0" b="0"/>
+      </a:lnRef>
+      <a:fillRef idx="3">
+        <a:scrgbClr r="0" g="0" b="0"/>
+      </a:fillRef>
+      <a:effectRef idx="2">
+        <a:scrgbClr r="0" g="0" b="0"/>
+      </a:effectRef>
+      <a:fontRef idx="minor">
+        <a:schemeClr val="lt1"/>
+      </a:fontRef>
+    </dgm:style>
+  </dgm:styleLbl>
+  <dgm:styleLbl name="parChTrans2D2">
+    <dgm:scene3d>
+      <a:camera prst="orthographicFront"/>
+      <a:lightRig rig="threePt" dir="t"/>
+    </dgm:scene3d>
+    <dgm:sp3d/>
+    <dgm:txPr/>
+    <dgm:style>
+      <a:lnRef idx="0">
+        <a:scrgbClr r="0" g="0" b="0"/>
+      </a:lnRef>
+      <a:fillRef idx="3">
+        <a:scrgbClr r="0" g="0" b="0"/>
+      </a:fillRef>
+      <a:effectRef idx="2">
+        <a:scrgbClr r="0" g="0" b="0"/>
+      </a:effectRef>
+      <a:fontRef idx="minor">
+        <a:schemeClr val="lt1"/>
+      </a:fontRef>
+    </dgm:style>
+  </dgm:styleLbl>
+  <dgm:styleLbl name="parChTrans2D3">
+    <dgm:scene3d>
+      <a:camera prst="orthographicFront"/>
+      <a:lightRig rig="threePt" dir="t"/>
+    </dgm:scene3d>
+    <dgm:sp3d/>
+    <dgm:txPr/>
+    <dgm:style>
+      <a:lnRef idx="1">
+        <a:scrgbClr r="0" g="0" b="0"/>
+      </a:lnRef>
+      <a:fillRef idx="3">
+        <a:scrgbClr r="0" g="0" b="0"/>
+      </a:fillRef>
+      <a:effectRef idx="2">
+        <a:scrgbClr r="0" g="0" b="0"/>
+      </a:effectRef>
+      <a:fontRef idx="minor">
+        <a:schemeClr val="lt1"/>
+      </a:fontRef>
+    </dgm:style>
+  </dgm:styleLbl>
+  <dgm:styleLbl name="parChTrans2D4">
+    <dgm:scene3d>
+      <a:camera prst="orthographicFront"/>
+      <a:lightRig rig="threePt" dir="t"/>
+    </dgm:scene3d>
+    <dgm:sp3d/>
+    <dgm:txPr/>
+    <dgm:style>
+      <a:lnRef idx="1">
+        <a:scrgbClr r="0" g="0" b="0"/>
+      </a:lnRef>
+      <a:fillRef idx="3">
+        <a:scrgbClr r="0" g="0" b="0"/>
+      </a:fillRef>
+      <a:effectRef idx="2">
+        <a:scrgbClr r="0" g="0" b="0"/>
+      </a:effectRef>
+      <a:fontRef idx="minor">
+        <a:schemeClr val="lt1"/>
+      </a:fontRef>
+    </dgm:style>
+  </dgm:styleLbl>
+  <dgm:styleLbl name="parChTrans1D1">
+    <dgm:scene3d>
+      <a:camera prst="orthographicFront"/>
+      <a:lightRig rig="threePt" dir="t"/>
+    </dgm:scene3d>
+    <dgm:sp3d/>
+    <dgm:txPr/>
+    <dgm:style>
+      <a:lnRef idx="1">
+        <a:scrgbClr r="0" g="0" b="0"/>
+      </a:lnRef>
+      <a:fillRef idx="0">
+        <a:scrgbClr r="0" g="0" b="0"/>
+      </a:fillRef>
+      <a:effectRef idx="0">
+        <a:scrgbClr r="0" g="0" b="0"/>
+      </a:effectRef>
+      <a:fontRef idx="minor"/>
+    </dgm:style>
+  </dgm:styleLbl>
+  <dgm:styleLbl name="parChTrans1D2">
+    <dgm:scene3d>
+      <a:camera prst="orthographicFront"/>
+      <a:lightRig rig="threePt" dir="t"/>
+    </dgm:scene3d>
+    <dgm:sp3d/>
+    <dgm:txPr/>
+    <dgm:style>
+      <a:lnRef idx="1">
+        <a:scrgbClr r="0" g="0" b="0"/>
+      </a:lnRef>
+      <a:fillRef idx="0">
+        <a:scrgbClr r="0" g="0" b="0"/>
+      </a:fillRef>
+      <a:effectRef idx="0">
+        <a:scrgbClr r="0" g="0" b="0"/>
+      </a:effectRef>
+      <a:fontRef idx="minor"/>
+    </dgm:style>
+  </dgm:styleLbl>
+  <dgm:styleLbl name="parChTrans1D3">
+    <dgm:scene3d>
+      <a:camera prst="orthographicFront"/>
+      <a:lightRig rig="threePt" dir="t"/>
+    </dgm:scene3d>
+    <dgm:sp3d/>
+    <dgm:txPr/>
+    <dgm:style>
+      <a:lnRef idx="1">
+        <a:scrgbClr r="0" g="0" b="0"/>
+      </a:lnRef>
+      <a:fillRef idx="0">
+        <a:scrgbClr r="0" g="0" b="0"/>
+      </a:fillRef>
+      <a:effectRef idx="0">
+        <a:scrgbClr r="0" g="0" b="0"/>
+      </a:effectRef>
+      <a:fontRef idx="minor"/>
+    </dgm:style>
+  </dgm:styleLbl>
+  <dgm:styleLbl name="parChTrans1D4">
+    <dgm:scene3d>
+      <a:camera prst="orthographicFront"/>
+      <a:lightRig rig="threePt" dir="t"/>
+    </dgm:scene3d>
+    <dgm:sp3d/>
+    <dgm:txPr/>
+    <dgm:style>
+      <a:lnRef idx="1">
+        <a:scrgbClr r="0" g="0" b="0"/>
+      </a:lnRef>
+      <a:fillRef idx="0">
+        <a:scrgbClr r="0" g="0" b="0"/>
+      </a:fillRef>
+      <a:effectRef idx="0">
+        <a:scrgbClr r="0" g="0" b="0"/>
+      </a:effectRef>
+      <a:fontRef idx="minor"/>
+    </dgm:style>
+  </dgm:styleLbl>
+  <dgm:styleLbl name="fgAcc1">
+    <dgm:scene3d>
+      <a:camera prst="orthographicFront"/>
+      <a:lightRig rig="threePt" dir="t"/>
+    </dgm:scene3d>
+    <dgm:sp3d/>
+    <dgm:txPr/>
+    <dgm:style>
+      <a:lnRef idx="1">
+        <a:scrgbClr r="0" g="0" b="0"/>
+      </a:lnRef>
+      <a:fillRef idx="1">
+        <a:scrgbClr r="0" g="0" b="0"/>
+      </a:fillRef>
+      <a:effectRef idx="0">
+        <a:scrgbClr r="0" g="0" b="0"/>
+      </a:effectRef>
+      <a:fontRef idx="minor"/>
+    </dgm:style>
+  </dgm:styleLbl>
+  <dgm:styleLbl name="conFgAcc1">
+    <dgm:scene3d>
+      <a:camera prst="orthographicFront"/>
+      <a:lightRig rig="threePt" dir="t"/>
+    </dgm:scene3d>
+    <dgm:sp3d/>
+    <dgm:txPr/>
+    <dgm:style>
+      <a:lnRef idx="1">
+        <a:scrgbClr r="0" g="0" b="0"/>
+      </a:lnRef>
+      <a:fillRef idx="1">
+        <a:scrgbClr r="0" g="0" b="0"/>
+      </a:fillRef>
+      <a:effectRef idx="0">
+        <a:scrgbClr r="0" g="0" b="0"/>
+      </a:effectRef>
+      <a:fontRef idx="minor"/>
+    </dgm:style>
+  </dgm:styleLbl>
+  <dgm:styleLbl name="alignAcc1">
+    <dgm:scene3d>
+      <a:camera prst="orthographicFront"/>
+      <a:lightRig rig="threePt" dir="t"/>
+    </dgm:scene3d>
+    <dgm:sp3d/>
+    <dgm:txPr/>
+    <dgm:style>
+      <a:lnRef idx="1">
+        <a:scrgbClr r="0" g="0" b="0"/>
+      </a:lnRef>
+      <a:fillRef idx="1">
+        <a:scrgbClr r="0" g="0" b="0"/>
+      </a:fillRef>
+      <a:effectRef idx="0">
+        <a:scrgbClr r="0" g="0" b="0"/>
+      </a:effectRef>
+      <a:fontRef idx="minor"/>
+    </dgm:style>
+  </dgm:styleLbl>
+  <dgm:styleLbl name="trAlignAcc1">
+    <dgm:scene3d>
+      <a:camera prst="orthographicFront"/>
+      <a:lightRig rig="threePt" dir="t"/>
+    </dgm:scene3d>
+    <dgm:sp3d/>
+    <dgm:txPr/>
+    <dgm:style>
+      <a:lnRef idx="1">
+        <a:scrgbClr r="0" g="0" b="0"/>
+      </a:lnRef>
+      <a:fillRef idx="1">
+        <a:scrgbClr r="0" g="0" b="0"/>
+      </a:fillRef>
+      <a:effectRef idx="0">
+        <a:scrgbClr r="0" g="0" b="0"/>
+      </a:effectRef>
+      <a:fontRef idx="minor"/>
+    </dgm:style>
+  </dgm:styleLbl>
+  <dgm:styleLbl name="bgAcc1">
+    <dgm:scene3d>
+      <a:camera prst="orthographicFront"/>
+      <a:lightRig rig="threePt" dir="t"/>
+    </dgm:scene3d>
+    <dgm:sp3d/>
+    <dgm:txPr/>
+    <dgm:style>
+      <a:lnRef idx="1">
+        <a:scrgbClr r="0" g="0" b="0"/>
+      </a:lnRef>
+      <a:fillRef idx="1">
+        <a:scrgbClr r="0" g="0" b="0"/>
+      </a:fillRef>
+      <a:effectRef idx="0">
+        <a:scrgbClr r="0" g="0" b="0"/>
+      </a:effectRef>
+      <a:fontRef idx="minor"/>
+    </dgm:style>
+  </dgm:styleLbl>
+  <dgm:styleLbl name="solidFgAcc1">
+    <dgm:scene3d>
+      <a:camera prst="orthographicFront"/>
+      <a:lightRig rig="threePt" dir="t"/>
+    </dgm:scene3d>
+    <dgm:sp3d/>
+    <dgm:txPr/>
+    <dgm:style>
+      <a:lnRef idx="1">
+        <a:scrgbClr r="0" g="0" b="0"/>
+      </a:lnRef>
+      <a:fillRef idx="1">
+        <a:scrgbClr r="0" g="0" b="0"/>
+      </a:fillRef>
+      <a:effectRef idx="0">
+        <a:scrgbClr r="0" g="0" b="0"/>
+      </a:effectRef>
+      <a:fontRef idx="minor"/>
+    </dgm:style>
+  </dgm:styleLbl>
+  <dgm:styleLbl name="solidAlignAcc1">
+    <dgm:scene3d>
+      <a:camera prst="orthographicFront"/>
+      <a:lightRig rig="threePt" dir="t"/>
+    </dgm:scene3d>
+    <dgm:sp3d/>
+    <dgm:txPr/>
+    <dgm:style>
+      <a:lnRef idx="1">
+        <a:scrgbClr r="0" g="0" b="0"/>
+      </a:lnRef>
+      <a:fillRef idx="1">
+        <a:scrgbClr r="0" g="0" b="0"/>
+      </a:fillRef>
+      <a:effectRef idx="0">
+        <a:scrgbClr r="0" g="0" b="0"/>
+      </a:effectRef>
+      <a:fontRef idx="minor"/>
+    </dgm:style>
+  </dgm:styleLbl>
+  <dgm:styleLbl name="solidBgAcc1">
+    <dgm:scene3d>
+      <a:camera prst="orthographicFront"/>
+      <a:lightRig rig="threePt" dir="t"/>
+    </dgm:scene3d>
+    <dgm:sp3d/>
+    <dgm:txPr/>
+    <dgm:style>
+      <a:lnRef idx="1">
+        <a:scrgbClr r="0" g="0" b="0"/>
+      </a:lnRef>
+      <a:fillRef idx="1">
+        <a:scrgbClr r="0" g="0" b="0"/>
+      </a:fillRef>
+      <a:effectRef idx="0">
+        <a:scrgbClr r="0" g="0" b="0"/>
+      </a:effectRef>
+      <a:fontRef idx="minor"/>
+    </dgm:style>
+  </dgm:styleLbl>
+  <dgm:styleLbl name="fgAccFollowNode1">
+    <dgm:scene3d>
+      <a:camera prst="orthographicFront"/>
+      <a:lightRig rig="threePt" dir="t"/>
+    </dgm:scene3d>
+    <dgm:sp3d/>
+    <dgm:txPr/>
+    <dgm:style>
+      <a:lnRef idx="1">
+        <a:scrgbClr r="0" g="0" b="0"/>
+      </a:lnRef>
+      <a:fillRef idx="1">
+        <a:scrgbClr r="0" g="0" b="0"/>
+      </a:fillRef>
+      <a:effectRef idx="0">
+        <a:scrgbClr r="0" g="0" b="0"/>
+      </a:effectRef>
+      <a:fontRef idx="minor"/>
+    </dgm:style>
+  </dgm:styleLbl>
+  <dgm:styleLbl name="alignAccFollowNode1">
+    <dgm:scene3d>
+      <a:camera prst="orthographicFront"/>
+      <a:lightRig rig="threePt" dir="t"/>
+    </dgm:scene3d>
+    <dgm:sp3d/>
+    <dgm:txPr/>
+    <dgm:style>
+      <a:lnRef idx="1">
+        <a:scrgbClr r="0" g="0" b="0"/>
+      </a:lnRef>
+      <a:fillRef idx="1">
+        <a:scrgbClr r="0" g="0" b="0"/>
+      </a:fillRef>
+      <a:effectRef idx="0">
+        <a:scrgbClr r="0" g="0" b="0"/>
+      </a:effectRef>
+      <a:fontRef idx="minor"/>
+    </dgm:style>
+  </dgm:styleLbl>
+  <dgm:styleLbl name="bgAccFollowNode1">
+    <dgm:scene3d>
+      <a:camera prst="orthographicFront"/>
+      <a:lightRig rig="threePt" dir="t"/>
+    </dgm:scene3d>
+    <dgm:sp3d/>
+    <dgm:txPr/>
+    <dgm:style>
+      <a:lnRef idx="1">
+        <a:scrgbClr r="0" g="0" b="0"/>
+      </a:lnRef>
+      <a:fillRef idx="1">
+        <a:scrgbClr r="0" g="0" b="0"/>
+      </a:fillRef>
+      <a:effectRef idx="0">
+        <a:scrgbClr r="0" g="0" b="0"/>
+      </a:effectRef>
+      <a:fontRef idx="minor"/>
+    </dgm:style>
+  </dgm:styleLbl>
+  <dgm:styleLbl name="fgAcc0">
+    <dgm:scene3d>
+      <a:camera prst="orthographicFront"/>
+      <a:lightRig rig="threePt" dir="t"/>
+    </dgm:scene3d>
+    <dgm:sp3d/>
+    <dgm:txPr/>
+    <dgm:style>
+      <a:lnRef idx="1">
+        <a:scrgbClr r="0" g="0" b="0"/>
+      </a:lnRef>
+      <a:fillRef idx="1">
+        <a:scrgbClr r="0" g="0" b="0"/>
+      </a:fillRef>
+      <a:effectRef idx="0">
+        <a:scrgbClr r="0" g="0" b="0"/>
+      </a:effectRef>
+      <a:fontRef idx="minor"/>
+    </dgm:style>
+  </dgm:styleLbl>
+  <dgm:styleLbl name="fgAcc2">
+    <dgm:scene3d>
+      <a:camera prst="orthographicFront"/>
+      <a:lightRig rig="threePt" dir="t"/>
+    </dgm:scene3d>
+    <dgm:sp3d/>
+    <dgm:txPr/>
+    <dgm:style>
+      <a:lnRef idx="1">
+        <a:scrgbClr r="0" g="0" b="0"/>
+      </a:lnRef>
+      <a:fillRef idx="1">
+        <a:scrgbClr r="0" g="0" b="0"/>
+      </a:fillRef>
+      <a:effectRef idx="0">
+        <a:scrgbClr r="0" g="0" b="0"/>
+      </a:effectRef>
+      <a:fontRef idx="minor"/>
+    </dgm:style>
+  </dgm:styleLbl>
+  <dgm:styleLbl name="fgAcc3">
+    <dgm:scene3d>
+      <a:camera prst="orthographicFront"/>
+      <a:lightRig rig="threePt" dir="t"/>
+    </dgm:scene3d>
+    <dgm:sp3d/>
+    <dgm:txPr/>
+    <dgm:style>
+      <a:lnRef idx="1">
+        <a:scrgbClr r="0" g="0" b="0"/>
+      </a:lnRef>
+      <a:fillRef idx="1">
+        <a:scrgbClr r="0" g="0" b="0"/>
+      </a:fillRef>
+      <a:effectRef idx="0">
+        <a:scrgbClr r="0" g="0" b="0"/>
+      </a:effectRef>
+      <a:fontRef idx="minor"/>
+    </dgm:style>
+  </dgm:styleLbl>
+  <dgm:styleLbl name="fgAcc4">
+    <dgm:scene3d>
+      <a:camera prst="orthographicFront"/>
+      <a:lightRig rig="threePt" dir="t"/>
+    </dgm:scene3d>
+    <dgm:sp3d/>
+    <dgm:txPr/>
+    <dgm:style>
+      <a:lnRef idx="1">
+        <a:scrgbClr r="0" g="0" b="0"/>
+      </a:lnRef>
+      <a:fillRef idx="1">
+        <a:scrgbClr r="0" g="0" b="0"/>
+      </a:fillRef>
+      <a:effectRef idx="0">
+        <a:scrgbClr r="0" g="0" b="0"/>
+      </a:effectRef>
+      <a:fontRef idx="minor"/>
+    </dgm:style>
+  </dgm:styleLbl>
+  <dgm:styleLbl name="bgShp">
+    <dgm:scene3d>
+      <a:camera prst="orthographicFront"/>
+      <a:lightRig rig="threePt" dir="t"/>
+    </dgm:scene3d>
+    <dgm:sp3d/>
+    <dgm:txPr/>
+    <dgm:style>
+      <a:lnRef idx="0">
+        <a:scrgbClr r="0" g="0" b="0"/>
+      </a:lnRef>
+      <a:fillRef idx="1">
+        <a:scrgbClr r="0" g="0" b="0"/>
+      </a:fillRef>
+      <a:effectRef idx="2">
+        <a:scrgbClr r="0" g="0" b="0"/>
+      </a:effectRef>
+      <a:fontRef idx="minor"/>
+    </dgm:style>
+  </dgm:styleLbl>
+  <dgm:styleLbl name="dkBgShp">
+    <dgm:scene3d>
+      <a:camera prst="orthographicFront"/>
+      <a:lightRig rig="threePt" dir="t"/>
+    </dgm:scene3d>
+    <dgm:sp3d/>
+    <dgm:txPr/>
+    <dgm:style>
+      <a:lnRef idx="0">
+        <a:scrgbClr r="0" g="0" b="0"/>
+      </a:lnRef>
+      <a:fillRef idx="1">
+        <a:scrgbClr r="0" g="0" b="0"/>
+      </a:fillRef>
+      <a:effectRef idx="2">
+        <a:scrgbClr r="0" g="0" b="0"/>
+      </a:effectRef>
+      <a:fontRef idx="minor"/>
+    </dgm:style>
+  </dgm:styleLbl>
+  <dgm:styleLbl name="trBgShp">
+    <dgm:scene3d>
+      <a:camera prst="orthographicFront"/>
+      <a:lightRig rig="threePt" dir="t"/>
+    </dgm:scene3d>
+    <dgm:sp3d/>
+    <dgm:txPr/>
+    <dgm:style>
+      <a:lnRef idx="0">
+        <a:scrgbClr r="0" g="0" b="0"/>
+      </a:lnRef>
+      <a:fillRef idx="1">
+        <a:scrgbClr r="0" g="0" b="0"/>
+      </a:fillRef>
+      <a:effectRef idx="0">
+        <a:scrgbClr r="0" g="0" b="0"/>
+      </a:effectRef>
+      <a:fontRef idx="minor"/>
+    </dgm:style>
+  </dgm:styleLbl>
+  <dgm:styleLbl name="fgShp">
+    <dgm:scene3d>
+      <a:camera prst="orthographicFront"/>
+      <a:lightRig rig="threePt" dir="t"/>
+    </dgm:scene3d>
+    <dgm:sp3d/>
+    <dgm:txPr/>
+    <dgm:style>
+      <a:lnRef idx="0">
+        <a:scrgbClr r="0" g="0" b="0"/>
+      </a:lnRef>
+      <a:fillRef idx="3">
+        <a:scrgbClr r="0" g="0" b="0"/>
+      </a:fillRef>
+      <a:effectRef idx="2">
+        <a:scrgbClr r="0" g="0" b="0"/>
+      </a:effectRef>
+      <a:fontRef idx="minor"/>
+    </dgm:style>
+  </dgm:styleLbl>
+  <dgm:styleLbl name="revTx">
+    <dgm:scene3d>
+      <a:camera prst="orthographicFront"/>
+      <a:lightRig rig="threePt" dir="t"/>
+    </dgm:scene3d>
+    <dgm:sp3d/>
+    <dgm:txPr/>
+    <dgm:style>
+      <a:lnRef idx="0">
+        <a:scrgbClr r="0" g="0" b="0"/>
+      </a:lnRef>
+      <a:fillRef idx="0">
+        <a:scrgbClr r="0" g="0" b="0"/>
+      </a:fillRef>
+      <a:effectRef idx="0">
+        <a:scrgbClr r="0" g="0" b="0"/>
+      </a:effectRef>
+      <a:fontRef idx="minor"/>
+    </dgm:style>
+  </dgm:styleLbl>
+</dgm:styleDef>
+</file>
+
+<file path=ppt/diagrams/quickStyle2.xml><?xml version="1.0" encoding="utf-8"?>
 <dgm:styleDef xmlns:dgm="http://schemas.openxmlformats.org/drawingml/2006/diagram" xmlns:a="http://schemas.openxmlformats.org/drawingml/2006/main" uniqueId="urn:microsoft.com/office/officeart/2005/8/quickstyle/simple1">
   <dgm:title val=""/>
   <dgm:desc val=""/>
@@ -3642,7 +6109,7 @@
           <a:p>
             <a:fld id="{8E26B2CC-4245-441B-9806-08F934990F76}" type="datetimeFigureOut">
               <a:rPr lang="en-US" smtClean="0"/>
-              <a:t>1/19/2021</a:t>
+              <a:t>1/20/2021</a:t>
             </a:fld>
             <a:endParaRPr lang="en-US"/>
           </a:p>
@@ -4157,7 +6624,7 @@
           <a:p>
             <a:fld id="{ACF3BCFD-7B6C-4801-A9A9-4E2203FAF5A7}" type="slidenum">
               <a:rPr lang="en-US" smtClean="0"/>
-              <a:t>6</a:t>
+              <a:t>7</a:t>
             </a:fld>
             <a:endParaRPr lang="en-US"/>
           </a:p>
@@ -4241,7 +6708,7 @@
           <a:p>
             <a:fld id="{ACF3BCFD-7B6C-4801-A9A9-4E2203FAF5A7}" type="slidenum">
               <a:rPr lang="en-US" smtClean="0"/>
-              <a:t>7</a:t>
+              <a:t>8</a:t>
             </a:fld>
             <a:endParaRPr lang="en-US"/>
           </a:p>
@@ -4729,7 +7196,7 @@
           <a:p>
             <a:fld id="{EA0C0817-A112-4847-8014-A94B7D2A4EA3}" type="datetime1">
               <a:rPr lang="en-US" smtClean="0"/>
-              <a:t>1/19/2021</a:t>
+              <a:t>1/20/2021</a:t>
             </a:fld>
             <a:endParaRPr lang="en-US" dirty="0"/>
           </a:p>
@@ -4931,7 +7398,7 @@
           <a:p>
             <a:fld id="{7332B432-ACDA-4023-A761-2BAB76577B62}" type="datetime1">
               <a:rPr lang="en-US" smtClean="0"/>
-              <a:t>1/19/2021</a:t>
+              <a:t>1/20/2021</a:t>
             </a:fld>
             <a:endParaRPr lang="en-US" dirty="0"/>
           </a:p>
@@ -5530,7 +7997,7 @@
           <a:p>
             <a:fld id="{D9C646AA-F36E-4540-911D-FFFC0A0EF24A}" type="datetime1">
               <a:rPr lang="en-US" smtClean="0"/>
-              <a:t>1/19/2021</a:t>
+              <a:t>1/20/2021</a:t>
             </a:fld>
             <a:endParaRPr lang="en-US" dirty="0"/>
           </a:p>
@@ -5850,7 +8317,7 @@
           <a:p>
             <a:fld id="{69186D26-FA5F-4637-B602-B7C2DC34CFD4}" type="datetime1">
               <a:rPr lang="en-US" smtClean="0"/>
-              <a:t>1/19/2021</a:t>
+              <a:t>1/20/2021</a:t>
             </a:fld>
             <a:endParaRPr lang="en-US" dirty="0"/>
           </a:p>
@@ -6287,7 +8754,7 @@
           <a:p>
             <a:fld id="{8A7F15D8-96D1-4781-BC50-CA8A088B2FE4}" type="datetime1">
               <a:rPr lang="en-US" smtClean="0"/>
-              <a:t>1/19/2021</a:t>
+              <a:t>1/20/2021</a:t>
             </a:fld>
             <a:endParaRPr lang="en-US" dirty="0"/>
           </a:p>
@@ -6405,7 +8872,7 @@
           <a:p>
             <a:fld id="{F9A96C99-B8F8-4528-BD05-0E16E943DC09}" type="datetime1">
               <a:rPr lang="en-US" smtClean="0"/>
-              <a:t>1/19/2021</a:t>
+              <a:t>1/20/2021</a:t>
             </a:fld>
             <a:endParaRPr lang="en-US" dirty="0"/>
           </a:p>
@@ -6500,7 +8967,7 @@
           <a:p>
             <a:fld id="{03636942-C211-4B28-8DBD-C953E00AF71B}" type="datetime1">
               <a:rPr lang="en-US" smtClean="0"/>
-              <a:t>1/19/2021</a:t>
+              <a:t>1/20/2021</a:t>
             </a:fld>
             <a:endParaRPr lang="en-US" dirty="0"/>
           </a:p>
@@ -6917,7 +9384,7 @@
           <a:p>
             <a:fld id="{7E8D12A6-918A-48BD-8CB9-CA713993B0EA}" type="datetime1">
               <a:rPr lang="en-US" smtClean="0"/>
-              <a:t>1/19/2021</a:t>
+              <a:t>1/20/2021</a:t>
             </a:fld>
             <a:endParaRPr lang="en-US" dirty="0"/>
           </a:p>
@@ -7179,7 +9646,7 @@
             <a:fld id="{E778CE86-875F-4587-BCF6-FA054AFC0D53}" type="datetime1">
               <a:rPr lang="en-US" smtClean="0"/>
               <a:pPr/>
-              <a:t>1/19/2021</a:t>
+              <a:t>1/20/2021</a:t>
             </a:fld>
             <a:endParaRPr lang="en-US" dirty="0"/>
           </a:p>
@@ -7695,7 +10162,7 @@
           <a:p>
             <a:fld id="{F6FA2B21-3FCD-4721-B95C-427943F61125}" type="datetime1">
               <a:rPr lang="en-US" smtClean="0"/>
-              <a:t>1/19/2021</a:t>
+              <a:t>1/20/2021</a:t>
             </a:fld>
             <a:endParaRPr lang="en-US" dirty="0"/>
           </a:p>
@@ -8625,14 +11092,14 @@
             <p:ph idx="1"/>
             <p:extLst>
               <p:ext uri="{D42A27DB-BD31-4B8C-83A1-F6EECF244321}">
-                <p14:modId xmlns:p14="http://schemas.microsoft.com/office/powerpoint/2010/main" val="3055362"/>
+                <p14:modId xmlns:p14="http://schemas.microsoft.com/office/powerpoint/2010/main" val="1528477218"/>
               </p:ext>
             </p:extLst>
           </p:nvPr>
         </p:nvGraphicFramePr>
         <p:xfrm>
-          <a:off x="1066800" y="2310063"/>
-          <a:ext cx="10058400" cy="3725612"/>
+          <a:off x="1066800" y="1729409"/>
+          <a:ext cx="10058400" cy="4306266"/>
         </p:xfrm>
         <a:graphic>
           <a:graphicData uri="http://schemas.openxmlformats.org/drawingml/2006/diagram">
@@ -8670,12 +11137,45 @@
           <a:chExt cx="0" cy="0"/>
         </a:xfrm>
       </p:grpSpPr>
+      <p:pic>
+        <p:nvPicPr>
+          <p:cNvPr id="5" name="Picture 4">
+            <a:extLst>
+              <a:ext uri="{FF2B5EF4-FFF2-40B4-BE49-F238E27FC236}">
+                <a16:creationId xmlns:a16="http://schemas.microsoft.com/office/drawing/2014/main" id="{5545F923-1094-4006-AD53-66DDE7F48833}"/>
+              </a:ext>
+            </a:extLst>
+          </p:cNvPr>
+          <p:cNvPicPr>
+            <a:picLocks noChangeAspect="1"/>
+          </p:cNvPicPr>
+          <p:nvPr/>
+        </p:nvPicPr>
+        <p:blipFill rotWithShape="1">
+          <a:blip r:embed="rId2"/>
+          <a:srcRect l="9770" r="9743" b="2"/>
+          <a:stretch/>
+        </p:blipFill>
+        <p:spPr>
+          <a:xfrm>
+            <a:off x="228599" y="237744"/>
+            <a:ext cx="7696201" cy="6382512"/>
+          </a:xfrm>
+          <a:prstGeom prst="rect">
+            <a:avLst/>
+          </a:prstGeom>
+          <a:noFill/>
+          <a:ln>
+            <a:noFill/>
+          </a:ln>
+        </p:spPr>
+      </p:pic>
       <p:sp>
         <p:nvSpPr>
-          <p:cNvPr id="16" name="Title 1">
+          <p:cNvPr id="2" name="Title 1">
             <a:extLst>
               <a:ext uri="{FF2B5EF4-FFF2-40B4-BE49-F238E27FC236}">
-                <a16:creationId xmlns:a16="http://schemas.microsoft.com/office/drawing/2014/main" id="{153C6905-8C50-4B2F-BAFC-B39170C1347C}"/>
+                <a16:creationId xmlns:a16="http://schemas.microsoft.com/office/drawing/2014/main" id="{90681780-9A0D-47E0-B50F-529C0C8A433E}"/>
               </a:ext>
             </a:extLst>
           </p:cNvPr>
@@ -8688,27 +11188,30 @@
         </p:nvSpPr>
         <p:spPr>
           <a:xfrm>
-            <a:off x="1066800" y="642594"/>
-            <a:ext cx="10058400" cy="1371600"/>
+            <a:off x="8477250" y="765313"/>
+            <a:ext cx="3144774" cy="805070"/>
           </a:xfrm>
         </p:spPr>
         <p:txBody>
-          <a:bodyPr/>
+          <a:bodyPr anchor="b">
+            <a:normAutofit/>
+          </a:bodyPr>
           <a:lstStyle/>
           <a:p>
+            <a:pPr algn="ctr"/>
             <a:r>
-              <a:rPr lang="en-US" dirty="0"/>
-              <a:t>The Idea				The Set Up</a:t>
+              <a:rPr lang="en-US" sz="4000" dirty="0"/>
+              <a:t>The Idea</a:t>
             </a:r>
           </a:p>
         </p:txBody>
       </p:sp>
       <p:sp>
         <p:nvSpPr>
-          <p:cNvPr id="17" name="Content Placeholder 2">
+          <p:cNvPr id="9" name="Text Placeholder 3">
             <a:extLst>
               <a:ext uri="{FF2B5EF4-FFF2-40B4-BE49-F238E27FC236}">
-                <a16:creationId xmlns:a16="http://schemas.microsoft.com/office/drawing/2014/main" id="{AAFD940F-400A-4980-81DB-A55005E9B8D1}"/>
+                <a16:creationId xmlns:a16="http://schemas.microsoft.com/office/drawing/2014/main" id="{AA970DDD-619E-4E76-93A9-4EECEA5F0EE7}"/>
               </a:ext>
             </a:extLst>
           </p:cNvPr>
@@ -8716,13 +11219,13 @@
             <a:spLocks noGrp="1"/>
           </p:cNvSpPr>
           <p:nvPr>
-            <p:ph sz="half" idx="1"/>
+            <p:ph type="body" sz="half" idx="2"/>
           </p:nvPr>
         </p:nvSpPr>
         <p:spPr>
           <a:xfrm>
-            <a:off x="1066800" y="2103120"/>
-            <a:ext cx="4663440" cy="3749040"/>
+            <a:off x="8477250" y="1858617"/>
+            <a:ext cx="3144774" cy="4039263"/>
           </a:xfrm>
         </p:spPr>
         <p:txBody>
@@ -8731,100 +11234,13 @@
           <a:p>
             <a:pPr>
               <a:lnSpc>
-                <a:spcPct val="100000"/>
+                <a:spcPct val="150000"/>
               </a:lnSpc>
             </a:pPr>
             <a:r>
-              <a:rPr lang="en-US" sz="1800" dirty="0"/>
-              <a:t>Music is something enjoyed by everyone </a:t>
+              <a:rPr lang="en-US" dirty="0"/>
+              <a:t>We wanted to give music lovers deeper insight into their different playlists based on multiple musical attributes. </a:t>
             </a:r>
-          </a:p>
-          <a:p>
-            <a:pPr>
-              <a:lnSpc>
-                <a:spcPct val="100000"/>
-              </a:lnSpc>
-            </a:pPr>
-            <a:r>
-              <a:rPr lang="en-US" sz="1800" dirty="0"/>
-              <a:t>We wanted to give music lovers deeper insight into their different playlists based on multiple musical attributes.</a:t>
-            </a:r>
-          </a:p>
-          <a:p>
-            <a:pPr lvl="1"/>
-            <a:endParaRPr lang="en-US" dirty="0"/>
-          </a:p>
-          <a:p>
-            <a:endParaRPr lang="en-US" dirty="0"/>
-          </a:p>
-        </p:txBody>
-      </p:sp>
-      <p:sp>
-        <p:nvSpPr>
-          <p:cNvPr id="15" name="Content Placeholder 3">
-            <a:extLst>
-              <a:ext uri="{FF2B5EF4-FFF2-40B4-BE49-F238E27FC236}">
-                <a16:creationId xmlns:a16="http://schemas.microsoft.com/office/drawing/2014/main" id="{C7E8F2D0-8A8B-4CBD-930E-6F650C7B13D6}"/>
-              </a:ext>
-            </a:extLst>
-          </p:cNvPr>
-          <p:cNvSpPr>
-            <a:spLocks noGrp="1"/>
-          </p:cNvSpPr>
-          <p:nvPr>
-            <p:ph sz="half" idx="2"/>
-          </p:nvPr>
-        </p:nvSpPr>
-        <p:spPr>
-          <a:xfrm>
-            <a:off x="6461760" y="2103120"/>
-            <a:ext cx="4663440" cy="3749040"/>
-          </a:xfrm>
-        </p:spPr>
-        <p:txBody>
-          <a:bodyPr/>
-          <a:lstStyle/>
-          <a:p>
-            <a:pPr>
-              <a:lnSpc>
-                <a:spcPct val="100000"/>
-              </a:lnSpc>
-            </a:pPr>
-            <a:r>
-              <a:rPr lang="en-US" sz="1800" dirty="0"/>
-              <a:t>Jeni – clean up/flask connection/charts</a:t>
-            </a:r>
-          </a:p>
-          <a:p>
-            <a:pPr>
-              <a:lnSpc>
-                <a:spcPct val="100000"/>
-              </a:lnSpc>
-            </a:pPr>
-            <a:r>
-              <a:rPr lang="en-US" sz="1800" dirty="0"/>
-              <a:t>Allison – Java for table/flask set up</a:t>
-            </a:r>
-          </a:p>
-          <a:p>
-            <a:pPr>
-              <a:lnSpc>
-                <a:spcPct val="100000"/>
-              </a:lnSpc>
-            </a:pPr>
-            <a:r>
-              <a:rPr lang="en-US" sz="1800" dirty="0" err="1"/>
-              <a:t>Lenn</a:t>
-            </a:r>
-            <a:r>
-              <a:rPr lang="en-US" sz="1800" dirty="0"/>
-              <a:t> – html/anime </a:t>
-            </a:r>
-            <a:r>
-              <a:rPr lang="en-US" sz="1800" dirty="0" err="1"/>
-              <a:t>js</a:t>
-            </a:r>
-            <a:endParaRPr lang="en-US" sz="1800" dirty="0"/>
           </a:p>
           <a:p>
             <a:endParaRPr lang="en-US" dirty="0"/>
@@ -8834,7 +11250,7 @@
     </p:spTree>
     <p:extLst>
       <p:ext uri="{BB962C8B-B14F-4D97-AF65-F5344CB8AC3E}">
-        <p14:creationId xmlns:p14="http://schemas.microsoft.com/office/powerpoint/2010/main" val="2357490765"/>
+        <p14:creationId xmlns:p14="http://schemas.microsoft.com/office/powerpoint/2010/main" val="1420168553"/>
       </p:ext>
     </p:extLst>
   </p:cSld>
@@ -8866,7 +11282,7 @@
           <p:cNvPr id="2" name="Title 1">
             <a:extLst>
               <a:ext uri="{FF2B5EF4-FFF2-40B4-BE49-F238E27FC236}">
-                <a16:creationId xmlns:a16="http://schemas.microsoft.com/office/drawing/2014/main" id="{FF542261-D78D-4175-A189-3975CF514FA9}"/>
+                <a16:creationId xmlns:a16="http://schemas.microsoft.com/office/drawing/2014/main" id="{B6CEC1DE-9809-4948-A4A2-ACD3A41B2D4F}"/>
               </a:ext>
             </a:extLst>
           </p:cNvPr>
@@ -8877,134 +11293,60 @@
             <p:ph type="title"/>
           </p:nvPr>
         </p:nvSpPr>
-        <p:spPr/>
+        <p:spPr>
+          <a:xfrm>
+            <a:off x="1066800" y="642594"/>
+            <a:ext cx="10058400" cy="1371600"/>
+          </a:xfrm>
+        </p:spPr>
         <p:txBody>
-          <a:bodyPr/>
+          <a:bodyPr anchor="ctr">
+            <a:normAutofit/>
+          </a:bodyPr>
           <a:lstStyle/>
           <a:p>
             <a:r>
               <a:rPr lang="en-US" dirty="0"/>
-              <a:t>THE DATA</a:t>
+              <a:t>The Set Up</a:t>
             </a:r>
           </a:p>
         </p:txBody>
       </p:sp>
-      <p:sp>
-        <p:nvSpPr>
-          <p:cNvPr id="3" name="Content Placeholder 2">
+      <p:graphicFrame>
+        <p:nvGraphicFramePr>
+          <p:cNvPr id="5" name="Content Placeholder 2">
             <a:extLst>
               <a:ext uri="{FF2B5EF4-FFF2-40B4-BE49-F238E27FC236}">
-                <a16:creationId xmlns:a16="http://schemas.microsoft.com/office/drawing/2014/main" id="{FBDAC0CB-370F-4931-8483-DDA8916CF95B}"/>
+                <a16:creationId xmlns:a16="http://schemas.microsoft.com/office/drawing/2014/main" id="{9EA56183-0DEC-460F-8930-E03E01E65631}"/>
               </a:ext>
             </a:extLst>
           </p:cNvPr>
-          <p:cNvSpPr>
-            <a:spLocks noGrp="1"/>
-          </p:cNvSpPr>
+          <p:cNvGraphicFramePr>
+            <a:graphicFrameLocks noGrp="1"/>
+          </p:cNvGraphicFramePr>
           <p:nvPr>
             <p:ph idx="1"/>
+            <p:extLst>
+              <p:ext uri="{D42A27DB-BD31-4B8C-83A1-F6EECF244321}">
+                <p14:modId xmlns:p14="http://schemas.microsoft.com/office/powerpoint/2010/main" val="4052776212"/>
+              </p:ext>
+            </p:extLst>
           </p:nvPr>
-        </p:nvSpPr>
-        <p:spPr>
-          <a:xfrm>
-            <a:off x="1244525" y="2688434"/>
-            <a:ext cx="6546000" cy="2804613"/>
-          </a:xfrm>
-        </p:spPr>
-        <p:txBody>
-          <a:bodyPr/>
-          <a:lstStyle/>
-          <a:p>
-            <a:r>
-              <a:rPr lang="en-US" dirty="0"/>
-              <a:t>From Kaggle</a:t>
-            </a:r>
-          </a:p>
-          <a:p>
-            <a:pPr lvl="1"/>
-            <a:r>
-              <a:rPr lang="en-US" dirty="0"/>
-              <a:t>Dataset was cleaner than others</a:t>
-            </a:r>
-          </a:p>
-          <a:p>
-            <a:pPr lvl="1"/>
-            <a:r>
-              <a:rPr lang="en-US" dirty="0"/>
-              <a:t>Met requirements having over 100 records</a:t>
-            </a:r>
-          </a:p>
-          <a:p>
-            <a:pPr lvl="1"/>
-            <a:r>
-              <a:rPr lang="en-US" dirty="0"/>
-              <a:t>Reviewed several other Spotify datasets on Kaggle, but they were not as concise as the dataset we landed on</a:t>
-            </a:r>
-          </a:p>
-          <a:p>
-            <a:pPr lvl="1"/>
-            <a:r>
-              <a:rPr lang="en-US" dirty="0"/>
-              <a:t>The additional data behind our set assisted with definitions of all columns</a:t>
-            </a:r>
-          </a:p>
-          <a:p>
-            <a:pPr lvl="1"/>
-            <a:endParaRPr lang="en-US" dirty="0"/>
-          </a:p>
-        </p:txBody>
-      </p:sp>
-      <p:pic>
-        <p:nvPicPr>
-          <p:cNvPr id="1026" name="Picture 2" descr="The Track Properties &#10;Organize Your Music can help you slice and dice your music collection by a Wide range Of properties: &#10;2. &#10;3. &#10;5. &#10;6. &#10;7. &#10;8. &#10;9. &#10;10 . &#10;11. &#10;12 . &#10;13 . &#10;14 . &#10;Genre - the genre Of the track &#10;Year - the release year of the recording. Note that due to vagaries Of releases, re-releases. re-issues &#10;and general madness, sometimes the release years are not what you'd expect &#10;Added - the earliest date you added the track to your collection. &#10;Beats Per Minute (BPM) - The tempo Of the song. &#10;Energy - The energy of a song - the higher the value, the more energtic. song &#10;Danceability - The higher the value. the easier it is to dance to this song. &#10;Loudness (dB) • The higher the value, the louder the song. &#10;Liveness - The higher the value, the more likely the song is a live recording. &#10;Valence - The higher the value, the more positive mood for the song. &#10;Length - The duration of the song. &#10;Acousticness - The higher the value the more acoustic the song is. &#10;Speechiness - The higher the value the more spoken word the song contains. &#10;Popularity - The higher the value the more popular the song is. &#10;Duration - The length of the song. ">
-            <a:extLst>
-              <a:ext uri="{FF2B5EF4-FFF2-40B4-BE49-F238E27FC236}">
-                <a16:creationId xmlns:a16="http://schemas.microsoft.com/office/drawing/2014/main" id="{C9E949B0-15FA-40D7-B479-895D56618AD1}"/>
-              </a:ext>
-            </a:extLst>
-          </p:cNvPr>
-          <p:cNvPicPr>
-            <a:picLocks noChangeAspect="1" noChangeArrowheads="1"/>
-          </p:cNvPicPr>
-          <p:nvPr/>
-        </p:nvPicPr>
-        <p:blipFill>
-          <a:blip r:embed="rId2">
-            <a:extLst>
-              <a:ext uri="{28A0092B-C50C-407E-A947-70E740481C1C}">
-                <a14:useLocalDpi xmlns:a14="http://schemas.microsoft.com/office/drawing/2010/main" val="0"/>
-              </a:ext>
-            </a:extLst>
-          </a:blip>
-          <a:srcRect/>
-          <a:stretch>
-            <a:fillRect/>
-          </a:stretch>
-        </p:blipFill>
-        <p:spPr bwMode="auto">
-          <a:xfrm>
-            <a:off x="7111265" y="735347"/>
-            <a:ext cx="4162237" cy="2250807"/>
-          </a:xfrm>
-          <a:prstGeom prst="rect">
-            <a:avLst/>
-          </a:prstGeom>
-          <a:noFill/>
-          <a:extLst>
-            <a:ext uri="{909E8E84-426E-40DD-AFC4-6F175D3DCCD1}">
-              <a14:hiddenFill xmlns:a14="http://schemas.microsoft.com/office/drawing/2010/main">
-                <a:solidFill>
-                  <a:srgbClr val="FFFFFF"/>
-                </a:solidFill>
-              </a14:hiddenFill>
-            </a:ext>
-          </a:extLst>
-        </p:spPr>
-      </p:pic>
+        </p:nvGraphicFramePr>
+        <p:xfrm>
+          <a:off x="1066800" y="2103120"/>
+          <a:ext cx="10412896" cy="3849624"/>
+        </p:xfrm>
+        <a:graphic>
+          <a:graphicData uri="http://schemas.openxmlformats.org/drawingml/2006/diagram">
+            <dgm:relIds xmlns:dgm="http://schemas.openxmlformats.org/drawingml/2006/diagram" xmlns:r="http://schemas.openxmlformats.org/officeDocument/2006/relationships" r:dm="rId2" r:lo="rId3" r:qs="rId4" r:cs="rId5"/>
+          </a:graphicData>
+        </a:graphic>
+      </p:graphicFrame>
     </p:spTree>
     <p:extLst>
       <p:ext uri="{BB962C8B-B14F-4D97-AF65-F5344CB8AC3E}">
-        <p14:creationId xmlns:p14="http://schemas.microsoft.com/office/powerpoint/2010/main" val="2919240769"/>
+        <p14:creationId xmlns:p14="http://schemas.microsoft.com/office/powerpoint/2010/main" val="73361151"/>
       </p:ext>
     </p:extLst>
   </p:cSld>
@@ -9015,6 +11357,222 @@
 </file>
 
 <file path=ppt/slides/slide6.xml><?xml version="1.0" encoding="utf-8"?>
+<p:sld xmlns:a="http://schemas.openxmlformats.org/drawingml/2006/main" xmlns:r="http://schemas.openxmlformats.org/officeDocument/2006/relationships" xmlns:p="http://schemas.openxmlformats.org/presentationml/2006/main">
+  <p:cSld>
+    <p:spTree>
+      <p:nvGrpSpPr>
+        <p:cNvPr id="1" name=""/>
+        <p:cNvGrpSpPr/>
+        <p:nvPr/>
+      </p:nvGrpSpPr>
+      <p:grpSpPr>
+        <a:xfrm>
+          <a:off x="0" y="0"/>
+          <a:ext cx="0" cy="0"/>
+          <a:chOff x="0" y="0"/>
+          <a:chExt cx="0" cy="0"/>
+        </a:xfrm>
+      </p:grpSpPr>
+      <p:pic>
+        <p:nvPicPr>
+          <p:cNvPr id="5" name="Picture 4">
+            <a:extLst>
+              <a:ext uri="{FF2B5EF4-FFF2-40B4-BE49-F238E27FC236}">
+                <a16:creationId xmlns:a16="http://schemas.microsoft.com/office/drawing/2014/main" id="{DBC8AE00-88FA-4D9F-9502-0E5C50EBEA2D}"/>
+              </a:ext>
+            </a:extLst>
+          </p:cNvPr>
+          <p:cNvPicPr>
+            <a:picLocks noChangeAspect="1"/>
+          </p:cNvPicPr>
+          <p:nvPr/>
+        </p:nvPicPr>
+        <p:blipFill rotWithShape="1">
+          <a:blip r:embed="rId2"/>
+          <a:srcRect l="6685" r="17951"/>
+          <a:stretch/>
+        </p:blipFill>
+        <p:spPr>
+          <a:xfrm>
+            <a:off x="228599" y="237744"/>
+            <a:ext cx="7696201" cy="6382512"/>
+          </a:xfrm>
+          <a:prstGeom prst="rect">
+            <a:avLst/>
+          </a:prstGeom>
+          <a:noFill/>
+          <a:ln>
+            <a:noFill/>
+          </a:ln>
+        </p:spPr>
+      </p:pic>
+      <p:sp>
+        <p:nvSpPr>
+          <p:cNvPr id="2" name="Title 1">
+            <a:extLst>
+              <a:ext uri="{FF2B5EF4-FFF2-40B4-BE49-F238E27FC236}">
+                <a16:creationId xmlns:a16="http://schemas.microsoft.com/office/drawing/2014/main" id="{AD085A02-9BD8-4BB3-9DED-6EC869CCFFDA}"/>
+              </a:ext>
+            </a:extLst>
+          </p:cNvPr>
+          <p:cNvSpPr>
+            <a:spLocks noGrp="1"/>
+          </p:cNvSpPr>
+          <p:nvPr>
+            <p:ph type="title"/>
+          </p:nvPr>
+        </p:nvSpPr>
+        <p:spPr>
+          <a:xfrm>
+            <a:off x="8477250" y="603504"/>
+            <a:ext cx="3144774" cy="837670"/>
+          </a:xfrm>
+        </p:spPr>
+        <p:txBody>
+          <a:bodyPr anchor="b">
+            <a:normAutofit/>
+          </a:bodyPr>
+          <a:lstStyle/>
+          <a:p>
+            <a:pPr algn="ctr"/>
+            <a:r>
+              <a:rPr lang="en-US" sz="4000" dirty="0"/>
+              <a:t>The Data</a:t>
+            </a:r>
+          </a:p>
+        </p:txBody>
+      </p:sp>
+      <p:sp>
+        <p:nvSpPr>
+          <p:cNvPr id="9" name="Text Placeholder 3">
+            <a:extLst>
+              <a:ext uri="{FF2B5EF4-FFF2-40B4-BE49-F238E27FC236}">
+                <a16:creationId xmlns:a16="http://schemas.microsoft.com/office/drawing/2014/main" id="{04110332-5BE2-4D0F-88C6-C33B4B6CB585}"/>
+              </a:ext>
+            </a:extLst>
+          </p:cNvPr>
+          <p:cNvSpPr>
+            <a:spLocks noGrp="1"/>
+          </p:cNvSpPr>
+          <p:nvPr>
+            <p:ph type="body" sz="half" idx="2"/>
+          </p:nvPr>
+        </p:nvSpPr>
+        <p:spPr>
+          <a:xfrm>
+            <a:off x="8477250" y="1755190"/>
+            <a:ext cx="3144774" cy="4142689"/>
+          </a:xfrm>
+        </p:spPr>
+        <p:txBody>
+          <a:bodyPr/>
+          <a:lstStyle/>
+          <a:p>
+            <a:pPr marL="285750" indent="-285750">
+              <a:buFont typeface="Arial" panose="020B0604020202020204" pitchFamily="34" charset="0"/>
+              <a:buChar char="•"/>
+            </a:pPr>
+            <a:r>
+              <a:rPr lang="en-US" dirty="0"/>
+              <a:t>Kaggle</a:t>
+            </a:r>
+          </a:p>
+          <a:p>
+            <a:pPr marL="742950" lvl="1" indent="-285750">
+              <a:buFont typeface="Arial" panose="020B0604020202020204" pitchFamily="34" charset="0"/>
+              <a:buChar char="•"/>
+            </a:pPr>
+            <a:r>
+              <a:rPr lang="en-US" sz="1600" dirty="0"/>
+              <a:t>Clean</a:t>
+            </a:r>
+          </a:p>
+          <a:p>
+            <a:pPr marL="742950" lvl="1" indent="-285750">
+              <a:buFont typeface="Arial" panose="020B0604020202020204" pitchFamily="34" charset="0"/>
+              <a:buChar char="•"/>
+            </a:pPr>
+            <a:r>
+              <a:rPr lang="en-US" sz="1600" dirty="0"/>
+              <a:t>Sufficient Records</a:t>
+            </a:r>
+          </a:p>
+          <a:p>
+            <a:pPr marL="285750" indent="-285750">
+              <a:buFont typeface="Arial" panose="020B0604020202020204" pitchFamily="34" charset="0"/>
+              <a:buChar char="•"/>
+            </a:pPr>
+            <a:r>
+              <a:rPr lang="en-US" dirty="0"/>
+              <a:t>Reviewed several other Spotify datasets on Kaggle, but they were not as concise as the dataset we landed on</a:t>
+            </a:r>
+          </a:p>
+          <a:p>
+            <a:pPr marL="285750" indent="-285750">
+              <a:buFont typeface="Arial" panose="020B0604020202020204" pitchFamily="34" charset="0"/>
+              <a:buChar char="•"/>
+            </a:pPr>
+            <a:r>
+              <a:rPr lang="en-US" dirty="0"/>
+              <a:t>The additional data behind our set assisted with definitions of all columns</a:t>
+            </a:r>
+          </a:p>
+          <a:p>
+            <a:endParaRPr lang="en-US" sz="1600" dirty="0"/>
+          </a:p>
+          <a:p>
+            <a:pPr marL="285750" indent="-285750">
+              <a:buFont typeface="Arial" panose="020B0604020202020204" pitchFamily="34" charset="0"/>
+              <a:buChar char="•"/>
+            </a:pPr>
+            <a:endParaRPr lang="en-US" dirty="0"/>
+          </a:p>
+        </p:txBody>
+      </p:sp>
+      <p:pic>
+        <p:nvPicPr>
+          <p:cNvPr id="4" name="Picture 3">
+            <a:extLst>
+              <a:ext uri="{FF2B5EF4-FFF2-40B4-BE49-F238E27FC236}">
+                <a16:creationId xmlns:a16="http://schemas.microsoft.com/office/drawing/2014/main" id="{A06524CE-F4CC-44FD-908B-1191214C5F64}"/>
+              </a:ext>
+            </a:extLst>
+          </p:cNvPr>
+          <p:cNvPicPr>
+            <a:picLocks noChangeAspect="1"/>
+          </p:cNvPicPr>
+          <p:nvPr/>
+        </p:nvPicPr>
+        <p:blipFill>
+          <a:blip r:embed="rId3"/>
+          <a:stretch>
+            <a:fillRect/>
+          </a:stretch>
+        </p:blipFill>
+        <p:spPr>
+          <a:xfrm>
+            <a:off x="903806" y="1755191"/>
+            <a:ext cx="6345785" cy="3542366"/>
+          </a:xfrm>
+          <a:prstGeom prst="rect">
+            <a:avLst/>
+          </a:prstGeom>
+        </p:spPr>
+      </p:pic>
+    </p:spTree>
+    <p:extLst>
+      <p:ext uri="{BB962C8B-B14F-4D97-AF65-F5344CB8AC3E}">
+        <p14:creationId xmlns:p14="http://schemas.microsoft.com/office/powerpoint/2010/main" val="2343847891"/>
+      </p:ext>
+    </p:extLst>
+  </p:cSld>
+  <p:clrMapOvr>
+    <a:masterClrMapping/>
+  </p:clrMapOvr>
+</p:sld>
+</file>
+
+<file path=ppt/slides/slide7.xml><?xml version="1.0" encoding="utf-8"?>
 <p:sld xmlns:a="http://schemas.openxmlformats.org/drawingml/2006/main" xmlns:r="http://schemas.openxmlformats.org/officeDocument/2006/relationships" xmlns:p="http://schemas.openxmlformats.org/presentationml/2006/main">
   <p:cSld>
     <p:spTree>
@@ -9079,7 +11637,7 @@
 </p:sld>
 </file>
 
-<file path=ppt/slides/slide7.xml><?xml version="1.0" encoding="utf-8"?>
+<file path=ppt/slides/slide8.xml><?xml version="1.0" encoding="utf-8"?>
 <p:sld xmlns:a="http://schemas.openxmlformats.org/drawingml/2006/main" xmlns:r="http://schemas.openxmlformats.org/officeDocument/2006/relationships" xmlns:p="http://schemas.openxmlformats.org/presentationml/2006/main">
   <p:cSld>
     <p:spTree>
@@ -9148,7 +11706,7 @@
         </p:spPr>
         <p:txBody>
           <a:bodyPr>
-            <a:normAutofit fontScale="92500" lnSpcReduction="10000"/>
+            <a:normAutofit lnSpcReduction="10000"/>
           </a:bodyPr>
           <a:lstStyle/>
           <a:p>
@@ -9160,18 +11718,13 @@
           <a:p>
             <a:r>
               <a:rPr lang="en-US" dirty="0"/>
-              <a:t>Use React JavaScript library for the ability to embed mp.3’s in the html to have songs </a:t>
+              <a:t>Use React JavaScript library for the ability to embed mp.3’s in the html to have songs auto-play</a:t>
             </a:r>
-            <a:r>
-              <a:rPr lang="en-US"/>
-              <a:t>autoplayed</a:t>
-            </a:r>
-            <a:endParaRPr lang="en-US" dirty="0"/>
           </a:p>
           <a:p>
             <a:r>
               <a:rPr lang="en-US" dirty="0"/>
-              <a:t>Creating this as an app to have users analyze their playlists</a:t>
+              <a:t>Creating this as an app to have users analyze their playlists and allowing more data entries to compare</a:t>
             </a:r>
           </a:p>
           <a:p>
@@ -9183,33 +11736,28 @@
           <a:p>
             <a:r>
               <a:rPr lang="en-US" dirty="0"/>
-              <a:t>Link tracks to YouTube?</a:t>
+              <a:t>Link tracks to YouTube</a:t>
             </a:r>
           </a:p>
           <a:p>
             <a:r>
               <a:rPr lang="en-US" dirty="0"/>
-              <a:t>Web-scraping with album cover connected to the song as well</a:t>
+              <a:t>Web-scrape the album cover connected to each song </a:t>
             </a:r>
           </a:p>
           <a:p>
+            <a:pPr marL="0" indent="0">
+              <a:buNone/>
+            </a:pPr>
             <a:r>
-              <a:rPr lang="en-US" dirty="0"/>
-              <a:t>You could then use the data collected from any analyzed playlists to get more </a:t>
+              <a:rPr lang="en-US" sz="3200" dirty="0"/>
+              <a:t> </a:t>
             </a:r>
-            <a:r>
-              <a:rPr lang="en-US" dirty="0" err="1"/>
-              <a:t>comparsions</a:t>
-            </a:r>
-            <a:endParaRPr lang="en-US" dirty="0"/>
-          </a:p>
-          <a:p>
-            <a:endParaRPr lang="en-US" dirty="0"/>
-          </a:p>
-          <a:p>
-            <a:endParaRPr lang="en-US" dirty="0"/>
-          </a:p>
-          <a:p>
+          </a:p>
+          <a:p>
+            <a:pPr marL="0" indent="0">
+              <a:buNone/>
+            </a:pPr>
             <a:r>
               <a:rPr lang="en-US" sz="3200" dirty="0"/>
               <a:t>Questions?</a:t>
@@ -9241,7 +11789,7 @@
 </p:sld>
 </file>
 
-<file path=ppt/slides/slide8.xml><?xml version="1.0" encoding="utf-8"?>
+<file path=ppt/slides/slide9.xml><?xml version="1.0" encoding="utf-8"?>
 <p:sld xmlns:a="http://schemas.openxmlformats.org/drawingml/2006/main" xmlns:r="http://schemas.openxmlformats.org/officeDocument/2006/relationships" xmlns:p="http://schemas.openxmlformats.org/presentationml/2006/main">
   <p:cSld>
     <p:spTree>
@@ -9286,7 +11834,7 @@
           </a:bodyPr>
           <a:lstStyle/>
           <a:p>
-            <a:pPr marL="0" indent="0">
+            <a:pPr marL="0" indent="0" algn="ctr">
               <a:buNone/>
             </a:pPr>
             <a:r>
@@ -9920,15 +12468,6 @@
 </file>
 
 <file path=customXml/item2.xml><?xml version="1.0" encoding="utf-8"?>
-<p:properties xmlns:p="http://schemas.microsoft.com/office/2006/metadata/properties" xmlns:xsi="http://www.w3.org/2001/XMLSchema-instance" xmlns:pc="http://schemas.microsoft.com/office/infopath/2007/PartnerControls">
-  <documentManagement>
-    <Status xmlns="71af3243-3dd4-4a8d-8c0d-dd76da1f02a5">Not started</Status>
-    <MediaServiceKeyPoints xmlns="71af3243-3dd4-4a8d-8c0d-dd76da1f02a5" xsi:nil="true"/>
-  </documentManagement>
-</p:properties>
-</file>
-
-<file path=customXml/item3.xml><?xml version="1.0" encoding="utf-8"?>
 <ct:contentTypeSchema xmlns:ct="http://schemas.microsoft.com/office/2006/metadata/contentType" xmlns:ma="http://schemas.microsoft.com/office/2006/metadata/properties/metaAttributes" ct:_="" ma:_="" ma:contentTypeName="Document" ma:contentTypeID="0x01010079F111ED35F8CC479449609E8A0923A6" ma:contentTypeVersion="12" ma:contentTypeDescription="Create a new document." ma:contentTypeScope="" ma:versionID="a410dd7f93c95333ffa1b60ed6adedd1">
   <xsd:schema xmlns:xsd="http://www.w3.org/2001/XMLSchema" xmlns:xs="http://www.w3.org/2001/XMLSchema" xmlns:p="http://schemas.microsoft.com/office/2006/metadata/properties" xmlns:ns2="71af3243-3dd4-4a8d-8c0d-dd76da1f02a5" xmlns:ns3="16c05727-aa75-4e4a-9b5f-8a80a1165891" targetNamespace="http://schemas.microsoft.com/office/2006/metadata/properties" ma:root="true" ma:fieldsID="a936d9baba76aa3866493feff160faab" ns2:_="" ns3:_="">
     <xsd:import namespace="71af3243-3dd4-4a8d-8c0d-dd76da1f02a5"/>
@@ -10149,6 +12688,15 @@
 </ct:contentTypeSchema>
 </file>
 
+<file path=customXml/item3.xml><?xml version="1.0" encoding="utf-8"?>
+<p:properties xmlns:p="http://schemas.microsoft.com/office/2006/metadata/properties" xmlns:xsi="http://www.w3.org/2001/XMLSchema-instance" xmlns:pc="http://schemas.microsoft.com/office/infopath/2007/PartnerControls">
+  <documentManagement>
+    <Status xmlns="71af3243-3dd4-4a8d-8c0d-dd76da1f02a5">Not started</Status>
+    <MediaServiceKeyPoints xmlns="71af3243-3dd4-4a8d-8c0d-dd76da1f02a5" xsi:nil="true"/>
+  </documentManagement>
+</p:properties>
+</file>
+
 <file path=customXml/itemProps1.xml><?xml version="1.0" encoding="utf-8"?>
 <ds:datastoreItem xmlns:ds="http://schemas.openxmlformats.org/officeDocument/2006/customXml" ds:itemID="{CDB58277-F8DF-46FF-84EC-EF41B835E69F}">
   <ds:schemaRefs>
@@ -10158,16 +12706,6 @@
 </file>
 
 <file path=customXml/itemProps2.xml><?xml version="1.0" encoding="utf-8"?>
-<ds:datastoreItem xmlns:ds="http://schemas.openxmlformats.org/officeDocument/2006/customXml" ds:itemID="{137651BA-F45C-4845-9AB3-E0A65B39F5E1}">
-  <ds:schemaRefs>
-    <ds:schemaRef ds:uri="http://schemas.microsoft.com/office/2006/metadata/properties"/>
-    <ds:schemaRef ds:uri="http://schemas.microsoft.com/office/infopath/2007/PartnerControls"/>
-    <ds:schemaRef ds:uri="71af3243-3dd4-4a8d-8c0d-dd76da1f02a5"/>
-  </ds:schemaRefs>
-</ds:datastoreItem>
-</file>
-
-<file path=customXml/itemProps3.xml><?xml version="1.0" encoding="utf-8"?>
 <ds:datastoreItem xmlns:ds="http://schemas.openxmlformats.org/officeDocument/2006/customXml" ds:itemID="{2D276E62-80A3-44DD-9BCC-97ED2B99B57F}">
   <ds:schemaRefs>
     <ds:schemaRef ds:uri="http://schemas.microsoft.com/office/2006/metadata/contentType"/>
@@ -10184,4 +12722,14 @@
     <ds:schemaRef ds:uri="http://schemas.microsoft.com/internal/obd"/>
   </ds:schemaRefs>
 </ds:datastoreItem>
+</file>
+
+<file path=customXml/itemProps3.xml><?xml version="1.0" encoding="utf-8"?>
+<ds:datastoreItem xmlns:ds="http://schemas.openxmlformats.org/officeDocument/2006/customXml" ds:itemID="{137651BA-F45C-4845-9AB3-E0A65B39F5E1}">
+  <ds:schemaRefs>
+    <ds:schemaRef ds:uri="http://schemas.microsoft.com/office/2006/metadata/properties"/>
+    <ds:schemaRef ds:uri="http://schemas.microsoft.com/office/infopath/2007/PartnerControls"/>
+    <ds:schemaRef ds:uri="71af3243-3dd4-4a8d-8c0d-dd76da1f02a5"/>
+  </ds:schemaRefs>
+</ds:datastoreItem>
 </file>
</xml_diff>

<commit_message>
Adjusts table on tableData page
</commit_message>
<xml_diff>
--- a/gOGOGAGA.pptx
+++ b/gOGOGAGA.pptx
@@ -126,9 +126,61 @@
 <file path=ppt/revisionInfo.xml><?xml version="1.0" encoding="utf-8"?>
 <p1510:revInfo xmlns:a="http://schemas.openxmlformats.org/drawingml/2006/main" xmlns:r="http://schemas.openxmlformats.org/officeDocument/2006/relationships" xmlns:p1510="http://schemas.microsoft.com/office/powerpoint/2015/10/main">
   <p1510:revLst>
-    <p1510:client id="{4CA6EE96-F28A-424A-9353-249280B29811}" v="135" dt="2021-01-20T01:39:28.396"/>
+    <p1510:client id="{FC824BF9-DB89-47B8-BE3B-D17ACF56EE78}" v="36" dt="2021-01-21T02:32:17.832"/>
   </p1510:revLst>
 </p1510:revInfo>
+</file>
+
+<file path=ppt/changesInfos/changesInfo1.xml><?xml version="1.0" encoding="utf-8"?>
+<pc:chgInfo xmlns:a="http://schemas.openxmlformats.org/drawingml/2006/main" xmlns:r="http://schemas.openxmlformats.org/officeDocument/2006/relationships" xmlns:ac="http://schemas.microsoft.com/office/drawing/2013/main/command" xmlns:pc="http://schemas.microsoft.com/office/powerpoint/2013/main/command">
+  <pc:docChgLst>
+    <pc:chgData name="Jennifer Lamoureux" userId="df8978671778c259" providerId="LiveId" clId="{FC824BF9-DB89-47B8-BE3B-D17ACF56EE78}"/>
+    <pc:docChg chg="custSel modSld">
+      <pc:chgData name="Jennifer Lamoureux" userId="df8978671778c259" providerId="LiveId" clId="{FC824BF9-DB89-47B8-BE3B-D17ACF56EE78}" dt="2021-01-21T02:33:37.182" v="55" actId="20577"/>
+      <pc:docMkLst>
+        <pc:docMk/>
+      </pc:docMkLst>
+      <pc:sldChg chg="modSp mod">
+        <pc:chgData name="Jennifer Lamoureux" userId="df8978671778c259" providerId="LiveId" clId="{FC824BF9-DB89-47B8-BE3B-D17ACF56EE78}" dt="2021-01-21T02:32:17.831" v="35" actId="20577"/>
+        <pc:sldMkLst>
+          <pc:docMk/>
+          <pc:sldMk cId="73361151" sldId="271"/>
+        </pc:sldMkLst>
+        <pc:spChg chg="mod">
+          <ac:chgData name="Jennifer Lamoureux" userId="df8978671778c259" providerId="LiveId" clId="{FC824BF9-DB89-47B8-BE3B-D17ACF56EE78}" dt="2021-01-21T02:29:01.503" v="3" actId="1076"/>
+          <ac:spMkLst>
+            <pc:docMk/>
+            <pc:sldMk cId="73361151" sldId="271"/>
+            <ac:spMk id="2" creationId="{B6CEC1DE-9809-4948-A4A2-ACD3A41B2D4F}"/>
+          </ac:spMkLst>
+        </pc:spChg>
+        <pc:graphicFrameChg chg="mod">
+          <ac:chgData name="Jennifer Lamoureux" userId="df8978671778c259" providerId="LiveId" clId="{FC824BF9-DB89-47B8-BE3B-D17ACF56EE78}" dt="2021-01-21T02:32:17.831" v="35" actId="20577"/>
+          <ac:graphicFrameMkLst>
+            <pc:docMk/>
+            <pc:sldMk cId="73361151" sldId="271"/>
+            <ac:graphicFrameMk id="5" creationId="{9EA56183-0DEC-460F-8930-E03E01E65631}"/>
+          </ac:graphicFrameMkLst>
+        </pc:graphicFrameChg>
+      </pc:sldChg>
+      <pc:sldChg chg="modSp mod">
+        <pc:chgData name="Jennifer Lamoureux" userId="df8978671778c259" providerId="LiveId" clId="{FC824BF9-DB89-47B8-BE3B-D17ACF56EE78}" dt="2021-01-21T02:33:37.182" v="55" actId="20577"/>
+        <pc:sldMkLst>
+          <pc:docMk/>
+          <pc:sldMk cId="2343847891" sldId="272"/>
+        </pc:sldMkLst>
+        <pc:spChg chg="mod">
+          <ac:chgData name="Jennifer Lamoureux" userId="df8978671778c259" providerId="LiveId" clId="{FC824BF9-DB89-47B8-BE3B-D17ACF56EE78}" dt="2021-01-21T02:33:37.182" v="55" actId="20577"/>
+          <ac:spMkLst>
+            <pc:docMk/>
+            <pc:sldMk cId="2343847891" sldId="272"/>
+            <ac:spMk id="9" creationId="{04110332-5BE2-4D0F-88C6-C33B4B6CB585}"/>
+          </ac:spMkLst>
+        </pc:spChg>
+      </pc:sldChg>
+    </pc:docChg>
+  </pc:docChgLst>
+</pc:chgInfo>
 </file>
 
 <file path=ppt/diagrams/colors1.xml><?xml version="1.0" encoding="utf-8"?>
@@ -2161,8 +2213,41 @@
             </a:lnSpc>
           </a:pPr>
           <a:r>
+            <a:rPr lang="en-US" b="1" dirty="0"/>
+            <a:t>Jeni </a:t>
+          </a:r>
+        </a:p>
+        <a:p>
+          <a:pPr>
+            <a:lnSpc>
+              <a:spcPct val="100000"/>
+            </a:lnSpc>
+          </a:pPr>
+          <a:r>
             <a:rPr lang="en-US" dirty="0"/>
-            <a:t>Jeni – Clean up/Flask connection/Charts</a:t>
+            <a:t>Data clean up</a:t>
+          </a:r>
+        </a:p>
+        <a:p>
+          <a:pPr>
+            <a:lnSpc>
+              <a:spcPct val="100000"/>
+            </a:lnSpc>
+          </a:pPr>
+          <a:r>
+            <a:rPr lang="en-US" dirty="0"/>
+            <a:t>Flask connection</a:t>
+          </a:r>
+        </a:p>
+        <a:p>
+          <a:pPr>
+            <a:lnSpc>
+              <a:spcPct val="100000"/>
+            </a:lnSpc>
+          </a:pPr>
+          <a:r>
+            <a:rPr lang="en-US" dirty="0"/>
+            <a:t>Charts</a:t>
           </a:r>
         </a:p>
       </dgm:t>
@@ -2202,8 +2287,30 @@
             </a:lnSpc>
           </a:pPr>
           <a:r>
+            <a:rPr lang="en-US" b="1" dirty="0"/>
+            <a:t>Allison </a:t>
+          </a:r>
+        </a:p>
+        <a:p>
+          <a:pPr>
+            <a:lnSpc>
+              <a:spcPct val="100000"/>
+            </a:lnSpc>
+          </a:pPr>
+          <a:r>
             <a:rPr lang="en-US" dirty="0"/>
-            <a:t>Allison – Java for table/Flask set up</a:t>
+            <a:t>Java for table</a:t>
+          </a:r>
+        </a:p>
+        <a:p>
+          <a:pPr>
+            <a:lnSpc>
+              <a:spcPct val="100000"/>
+            </a:lnSpc>
+          </a:pPr>
+          <a:r>
+            <a:rPr lang="en-US" dirty="0"/>
+            <a:t>Flask set up</a:t>
           </a:r>
         </a:p>
       </dgm:t>
@@ -2243,12 +2350,34 @@
             </a:lnSpc>
           </a:pPr>
           <a:r>
-            <a:rPr lang="en-US" dirty="0" err="1"/>
+            <a:rPr lang="en-US" b="1" dirty="0" err="1"/>
             <a:t>Lenn</a:t>
           </a:r>
           <a:r>
+            <a:rPr lang="en-US" b="1" dirty="0"/>
+            <a:t> </a:t>
+          </a:r>
+        </a:p>
+        <a:p>
+          <a:pPr>
+            <a:lnSpc>
+              <a:spcPct val="100000"/>
+            </a:lnSpc>
+          </a:pPr>
+          <a:r>
             <a:rPr lang="en-US" dirty="0"/>
-            <a:t> – Html design/Incorporating Anime </a:t>
+            <a:t>Html design</a:t>
+          </a:r>
+        </a:p>
+        <a:p>
+          <a:pPr>
+            <a:lnSpc>
+              <a:spcPct val="100000"/>
+            </a:lnSpc>
+          </a:pPr>
+          <a:r>
+            <a:rPr lang="en-US" dirty="0"/>
+            <a:t>Incorporating Anime </a:t>
           </a:r>
           <a:r>
             <a:rPr lang="en-US" dirty="0" err="1"/>
@@ -2294,7 +2423,7 @@
       <dgm:spPr/>
     </dgm:pt>
     <dgm:pt modelId="{4A907126-A2CA-425C-AF0F-029F662155AA}" type="pres">
-      <dgm:prSet presAssocID="{CEF04553-33BD-490D-827B-92CDD36DD082}" presName="bgRect" presStyleLbl="bgShp" presStyleIdx="0" presStyleCnt="3"/>
+      <dgm:prSet presAssocID="{CEF04553-33BD-490D-827B-92CDD36DD082}" presName="bgRect" presStyleLbl="bgShp" presStyleIdx="0" presStyleCnt="3" custLinFactY="100000" custLinFactNeighborX="27026" custLinFactNeighborY="127528"/>
       <dgm:spPr/>
     </dgm:pt>
     <dgm:pt modelId="{296E88AA-81AD-4AF7-8842-3E467216F618}" type="pres">
@@ -2347,7 +2476,7 @@
       <dgm:spPr/>
     </dgm:pt>
     <dgm:pt modelId="{1C052A02-AD1E-4A07-82A5-6D182D275BC2}" type="pres">
-      <dgm:prSet presAssocID="{26AE1A82-6AE8-4C17-BF99-9B5BE49DE943}" presName="bgRect" presStyleLbl="bgShp" presStyleIdx="1" presStyleCnt="3"/>
+      <dgm:prSet presAssocID="{26AE1A82-6AE8-4C17-BF99-9B5BE49DE943}" presName="bgRect" presStyleLbl="bgShp" presStyleIdx="1" presStyleCnt="3" custLinFactNeighborX="153" custLinFactNeighborY="1619"/>
       <dgm:spPr/>
     </dgm:pt>
     <dgm:pt modelId="{75C54B5A-B6C1-4DB4-9C5A-D0125E6084A0}" type="pres">
@@ -2991,8 +3120,8 @@
       </dsp:nvSpPr>
       <dsp:spPr>
         <a:xfrm>
-          <a:off x="-193141" y="6102"/>
-          <a:ext cx="10412896" cy="1096405"/>
+          <a:off x="0" y="2058816"/>
+          <a:ext cx="10412896" cy="902126"/>
         </a:xfrm>
         <a:prstGeom prst="roundRect">
           <a:avLst>
@@ -3033,8 +3162,8 @@
       </dsp:nvSpPr>
       <dsp:spPr>
         <a:xfrm>
-          <a:off x="138521" y="252793"/>
-          <a:ext cx="603023" cy="603023"/>
+          <a:off x="138658" y="209203"/>
+          <a:ext cx="497140" cy="496169"/>
         </a:xfrm>
         <a:prstGeom prst="rect">
           <a:avLst/>
@@ -3082,8 +3211,8 @@
       </dsp:nvSpPr>
       <dsp:spPr>
         <a:xfrm>
-          <a:off x="684446" y="6102"/>
-          <a:ext cx="9921590" cy="1096405"/>
+          <a:off x="515624" y="6225"/>
+          <a:ext cx="10031506" cy="1125186"/>
         </a:xfrm>
         <a:prstGeom prst="rect">
           <a:avLst/>
@@ -3107,12 +3236,12 @@
         <a:fontRef idx="minor"/>
       </dsp:style>
       <dsp:txBody>
-        <a:bodyPr spcFirstLastPara="0" vert="horz" wrap="square" lIns="116036" tIns="116036" rIns="116036" bIns="116036" numCol="1" spcCol="1270" anchor="ctr" anchorCtr="0">
+        <a:bodyPr spcFirstLastPara="0" vert="horz" wrap="square" lIns="119082" tIns="119082" rIns="119082" bIns="119082" numCol="1" spcCol="1270" anchor="ctr" anchorCtr="0">
           <a:noAutofit/>
         </a:bodyPr>
         <a:lstStyle/>
         <a:p>
-          <a:pPr marL="0" lvl="0" indent="0" algn="l" defTabSz="1111250">
+          <a:pPr marL="0" lvl="0" indent="0" algn="l" defTabSz="622300">
             <a:lnSpc>
               <a:spcPct val="100000"/>
             </a:lnSpc>
@@ -3125,14 +3254,68 @@
             <a:buNone/>
           </a:pPr>
           <a:r>
-            <a:rPr lang="en-US" sz="2500" kern="1200" dirty="0"/>
-            <a:t>Jeni – Clean up/Flask connection/Charts</a:t>
+            <a:rPr lang="en-US" sz="1400" b="1" kern="1200" dirty="0"/>
+            <a:t>Jeni </a:t>
+          </a:r>
+        </a:p>
+        <a:p>
+          <a:pPr marL="0" lvl="0" indent="0" algn="l" defTabSz="622300">
+            <a:lnSpc>
+              <a:spcPct val="100000"/>
+            </a:lnSpc>
+            <a:spcBef>
+              <a:spcPct val="0"/>
+            </a:spcBef>
+            <a:spcAft>
+              <a:spcPct val="35000"/>
+            </a:spcAft>
+            <a:buNone/>
+          </a:pPr>
+          <a:r>
+            <a:rPr lang="en-US" sz="1400" kern="1200" dirty="0"/>
+            <a:t>Data clean up</a:t>
+          </a:r>
+        </a:p>
+        <a:p>
+          <a:pPr marL="0" lvl="0" indent="0" algn="l" defTabSz="622300">
+            <a:lnSpc>
+              <a:spcPct val="100000"/>
+            </a:lnSpc>
+            <a:spcBef>
+              <a:spcPct val="0"/>
+            </a:spcBef>
+            <a:spcAft>
+              <a:spcPct val="35000"/>
+            </a:spcAft>
+            <a:buNone/>
+          </a:pPr>
+          <a:r>
+            <a:rPr lang="en-US" sz="1400" kern="1200" dirty="0"/>
+            <a:t>Flask connection</a:t>
+          </a:r>
+        </a:p>
+        <a:p>
+          <a:pPr marL="0" lvl="0" indent="0" algn="l" defTabSz="622300">
+            <a:lnSpc>
+              <a:spcPct val="100000"/>
+            </a:lnSpc>
+            <a:spcBef>
+              <a:spcPct val="0"/>
+            </a:spcBef>
+            <a:spcAft>
+              <a:spcPct val="35000"/>
+            </a:spcAft>
+            <a:buNone/>
+          </a:pPr>
+          <a:r>
+            <a:rPr lang="en-US" sz="1400" kern="1200" dirty="0"/>
+            <a:t>Charts</a:t>
           </a:r>
         </a:p>
       </dsp:txBody>
       <dsp:txXfrm>
-        <a:off x="684446" y="6102"/>
-        <a:ext cx="9921590" cy="1096405"/>
+        <a:off x="515624" y="6225"/>
+        <a:ext cx="10031506" cy="1125186"/>
       </dsp:txXfrm>
     </dsp:sp>
     <dsp:sp modelId="{1C052A02-AD1E-4A07-82A5-6D182D275BC2}">
@@ -3142,8 +3325,8 @@
       </dsp:nvSpPr>
       <dsp:spPr>
         <a:xfrm>
-          <a:off x="-193141" y="1376609"/>
-          <a:ext cx="10412896" cy="1096405"/>
+          <a:off x="-118303" y="1376824"/>
+          <a:ext cx="10412896" cy="902126"/>
         </a:xfrm>
         <a:prstGeom prst="roundRect">
           <a:avLst>
@@ -3184,8 +3367,8 @@
       </dsp:nvSpPr>
       <dsp:spPr>
         <a:xfrm>
-          <a:off x="138521" y="1623300"/>
-          <a:ext cx="603023" cy="603023"/>
+          <a:off x="138658" y="1565197"/>
+          <a:ext cx="497140" cy="496169"/>
         </a:xfrm>
         <a:prstGeom prst="rect">
           <a:avLst/>
@@ -3233,8 +3416,8 @@
       </dsp:nvSpPr>
       <dsp:spPr>
         <a:xfrm>
-          <a:off x="753393" y="1376609"/>
-          <a:ext cx="9783698" cy="1096405"/>
+          <a:off x="585334" y="1362218"/>
+          <a:ext cx="9892086" cy="1125186"/>
         </a:xfrm>
         <a:prstGeom prst="rect">
           <a:avLst/>
@@ -3258,12 +3441,12 @@
         <a:fontRef idx="minor"/>
       </dsp:style>
       <dsp:txBody>
-        <a:bodyPr spcFirstLastPara="0" vert="horz" wrap="square" lIns="116036" tIns="116036" rIns="116036" bIns="116036" numCol="1" spcCol="1270" anchor="ctr" anchorCtr="0">
+        <a:bodyPr spcFirstLastPara="0" vert="horz" wrap="square" lIns="119082" tIns="119082" rIns="119082" bIns="119082" numCol="1" spcCol="1270" anchor="ctr" anchorCtr="0">
           <a:noAutofit/>
         </a:bodyPr>
         <a:lstStyle/>
         <a:p>
-          <a:pPr marL="0" lvl="0" indent="0" algn="l" defTabSz="1111250">
+          <a:pPr marL="0" lvl="0" indent="0" algn="l" defTabSz="622300">
             <a:lnSpc>
               <a:spcPct val="100000"/>
             </a:lnSpc>
@@ -3276,14 +3459,50 @@
             <a:buNone/>
           </a:pPr>
           <a:r>
-            <a:rPr lang="en-US" sz="2500" kern="1200" dirty="0"/>
-            <a:t>Allison – Java for table/Flask set up</a:t>
+            <a:rPr lang="en-US" sz="1400" b="1" kern="1200" dirty="0"/>
+            <a:t>Allison </a:t>
+          </a:r>
+        </a:p>
+        <a:p>
+          <a:pPr marL="0" lvl="0" indent="0" algn="l" defTabSz="622300">
+            <a:lnSpc>
+              <a:spcPct val="100000"/>
+            </a:lnSpc>
+            <a:spcBef>
+              <a:spcPct val="0"/>
+            </a:spcBef>
+            <a:spcAft>
+              <a:spcPct val="35000"/>
+            </a:spcAft>
+            <a:buNone/>
+          </a:pPr>
+          <a:r>
+            <a:rPr lang="en-US" sz="1400" kern="1200" dirty="0"/>
+            <a:t>Java for table</a:t>
+          </a:r>
+        </a:p>
+        <a:p>
+          <a:pPr marL="0" lvl="0" indent="0" algn="l" defTabSz="622300">
+            <a:lnSpc>
+              <a:spcPct val="100000"/>
+            </a:lnSpc>
+            <a:spcBef>
+              <a:spcPct val="0"/>
+            </a:spcBef>
+            <a:spcAft>
+              <a:spcPct val="35000"/>
+            </a:spcAft>
+            <a:buNone/>
+          </a:pPr>
+          <a:r>
+            <a:rPr lang="en-US" sz="1400" kern="1200" dirty="0"/>
+            <a:t>Flask set up</a:t>
           </a:r>
         </a:p>
       </dsp:txBody>
       <dsp:txXfrm>
-        <a:off x="753393" y="1376609"/>
-        <a:ext cx="9783698" cy="1096405"/>
+        <a:off x="585334" y="1362218"/>
+        <a:ext cx="9892086" cy="1125186"/>
       </dsp:txXfrm>
     </dsp:sp>
     <dsp:sp modelId="{9AED59AB-AACC-4AFE-920B-B76A856BEB87}">
@@ -3293,8 +3512,8 @@
       </dsp:nvSpPr>
       <dsp:spPr>
         <a:xfrm>
-          <a:off x="-193141" y="2747116"/>
-          <a:ext cx="10412896" cy="1096405"/>
+          <a:off x="-134235" y="2718212"/>
+          <a:ext cx="10412896" cy="902126"/>
         </a:xfrm>
         <a:prstGeom prst="roundRect">
           <a:avLst>
@@ -3335,8 +3554,8 @@
       </dsp:nvSpPr>
       <dsp:spPr>
         <a:xfrm>
-          <a:off x="138521" y="2993807"/>
-          <a:ext cx="603023" cy="603023"/>
+          <a:off x="138658" y="2921191"/>
+          <a:ext cx="497140" cy="496169"/>
         </a:xfrm>
         <a:prstGeom prst="rect">
           <a:avLst/>
@@ -3384,8 +3603,8 @@
       </dsp:nvSpPr>
       <dsp:spPr>
         <a:xfrm>
-          <a:off x="838615" y="2747116"/>
-          <a:ext cx="9613252" cy="1096405"/>
+          <a:off x="671501" y="2718212"/>
+          <a:ext cx="9719752" cy="1125186"/>
         </a:xfrm>
         <a:prstGeom prst="rect">
           <a:avLst/>
@@ -3409,12 +3628,12 @@
         <a:fontRef idx="minor"/>
       </dsp:style>
       <dsp:txBody>
-        <a:bodyPr spcFirstLastPara="0" vert="horz" wrap="square" lIns="116036" tIns="116036" rIns="116036" bIns="116036" numCol="1" spcCol="1270" anchor="ctr" anchorCtr="0">
+        <a:bodyPr spcFirstLastPara="0" vert="horz" wrap="square" lIns="119082" tIns="119082" rIns="119082" bIns="119082" numCol="1" spcCol="1270" anchor="ctr" anchorCtr="0">
           <a:noAutofit/>
         </a:bodyPr>
         <a:lstStyle/>
         <a:p>
-          <a:pPr marL="0" lvl="0" indent="0" algn="l" defTabSz="1111250">
+          <a:pPr marL="0" lvl="0" indent="0" algn="l" defTabSz="622300">
             <a:lnSpc>
               <a:spcPct val="100000"/>
             </a:lnSpc>
@@ -3427,23 +3646,59 @@
             <a:buNone/>
           </a:pPr>
           <a:r>
-            <a:rPr lang="en-US" sz="2500" kern="1200" dirty="0" err="1"/>
+            <a:rPr lang="en-US" sz="1400" b="1" kern="1200" dirty="0" err="1"/>
             <a:t>Lenn</a:t>
           </a:r>
           <a:r>
-            <a:rPr lang="en-US" sz="2500" kern="1200" dirty="0"/>
-            <a:t> – Html design/Incorporating Anime </a:t>
+            <a:rPr lang="en-US" sz="1400" b="1" kern="1200" dirty="0"/>
+            <a:t> </a:t>
+          </a:r>
+        </a:p>
+        <a:p>
+          <a:pPr marL="0" lvl="0" indent="0" algn="l" defTabSz="622300">
+            <a:lnSpc>
+              <a:spcPct val="100000"/>
+            </a:lnSpc>
+            <a:spcBef>
+              <a:spcPct val="0"/>
+            </a:spcBef>
+            <a:spcAft>
+              <a:spcPct val="35000"/>
+            </a:spcAft>
+            <a:buNone/>
+          </a:pPr>
+          <a:r>
+            <a:rPr lang="en-US" sz="1400" kern="1200" dirty="0"/>
+            <a:t>Html design</a:t>
+          </a:r>
+        </a:p>
+        <a:p>
+          <a:pPr marL="0" lvl="0" indent="0" algn="l" defTabSz="622300">
+            <a:lnSpc>
+              <a:spcPct val="100000"/>
+            </a:lnSpc>
+            <a:spcBef>
+              <a:spcPct val="0"/>
+            </a:spcBef>
+            <a:spcAft>
+              <a:spcPct val="35000"/>
+            </a:spcAft>
+            <a:buNone/>
+          </a:pPr>
+          <a:r>
+            <a:rPr lang="en-US" sz="1400" kern="1200" dirty="0"/>
+            <a:t>Incorporating Anime </a:t>
           </a:r>
           <a:r>
-            <a:rPr lang="en-US" sz="2500" kern="1200" dirty="0" err="1"/>
+            <a:rPr lang="en-US" sz="1400" kern="1200" dirty="0" err="1"/>
             <a:t>js</a:t>
           </a:r>
-          <a:endParaRPr lang="en-US" sz="2500" kern="1200" dirty="0"/>
+          <a:endParaRPr lang="en-US" sz="1400" kern="1200" dirty="0"/>
         </a:p>
       </dsp:txBody>
       <dsp:txXfrm>
-        <a:off x="838615" y="2747116"/>
-        <a:ext cx="9613252" cy="1096405"/>
+        <a:off x="671501" y="2718212"/>
+        <a:ext cx="9719752" cy="1125186"/>
       </dsp:txXfrm>
     </dsp:sp>
   </dsp:spTree>
@@ -11295,7 +11550,7 @@
         </p:nvSpPr>
         <p:spPr>
           <a:xfrm>
-            <a:off x="1066800" y="642594"/>
+            <a:off x="622917" y="527185"/>
             <a:ext cx="10058400" cy="1371600"/>
           </a:xfrm>
         </p:spPr>
@@ -11328,7 +11583,7 @@
             <p:ph idx="1"/>
             <p:extLst>
               <p:ext uri="{D42A27DB-BD31-4B8C-83A1-F6EECF244321}">
-                <p14:modId xmlns:p14="http://schemas.microsoft.com/office/powerpoint/2010/main" val="4052776212"/>
+                <p14:modId xmlns:p14="http://schemas.microsoft.com/office/powerpoint/2010/main" val="1270787391"/>
               </p:ext>
             </p:extLst>
           </p:nvPr>
@@ -11465,7 +11720,9 @@
           </a:xfrm>
         </p:spPr>
         <p:txBody>
-          <a:bodyPr/>
+          <a:bodyPr>
+            <a:normAutofit lnSpcReduction="10000"/>
+          </a:bodyPr>
           <a:lstStyle/>
           <a:p>
             <a:pPr marL="285750" indent="-285750">
@@ -11514,7 +11771,15 @@
             </a:pPr>
             <a:r>
               <a:rPr lang="en-US" dirty="0"/>
-              <a:t>The additional data behind our set assisted with definitions of all columns</a:t>
+              <a:t>The additional information behind </a:t>
+            </a:r>
+            <a:r>
+              <a:rPr lang="en-US"/>
+              <a:t>our data </a:t>
+            </a:r>
+            <a:r>
+              <a:rPr lang="en-US" dirty="0"/>
+              <a:t>assisted with definitions of all columns</a:t>
             </a:r>
           </a:p>
           <a:p>

</xml_diff>